<commit_message>
Project 1 version 1.1 on 2020-08-08
</commit_message>
<xml_diff>
--- a/Project-1-SAT-and-ACT-Analysis/SAT & ACT Analysis_presentation.pptx
+++ b/Project-1-SAT-and-ACT-Analysis/SAT & ACT Analysis_presentation.pptx
@@ -10,9 +10,10 @@
     <p:sldId id="261" r:id="rId7"/>
     <p:sldId id="262" r:id="rId8"/>
     <p:sldId id="267" r:id="rId9"/>
-    <p:sldId id="266" r:id="rId10"/>
-    <p:sldId id="269" r:id="rId11"/>
-    <p:sldId id="270" r:id="rId12"/>
+    <p:sldId id="271" r:id="rId10"/>
+    <p:sldId id="266" r:id="rId11"/>
+    <p:sldId id="272" r:id="rId12"/>
+    <p:sldId id="273" r:id="rId13"/>
   </p:sldIdLst>
   <p:sldSz cx="12192000" cy="6858000"/>
   <p:notesSz cx="6858000" cy="9144000"/>
@@ -363,7 +364,7 @@
           <a:p>
             <a:fld id="{9184DA70-C731-4C70-880D-CCD4705E623C}" type="datetime1">
               <a:rPr lang="en-US" smtClean="0"/>
-              <a:t>8/7/2020</a:t>
+              <a:t>8/8/2020</a:t>
             </a:fld>
             <a:endParaRPr lang="en-US" dirty="0"/>
           </a:p>
@@ -551,7 +552,7 @@
           <a:p>
             <a:fld id="{B612A279-0833-481D-8C56-F67FD0AC6C50}" type="datetime1">
               <a:rPr lang="en-US" smtClean="0"/>
-              <a:t>8/7/2020</a:t>
+              <a:t>8/8/2020</a:t>
             </a:fld>
             <a:endParaRPr lang="en-US" dirty="0"/>
           </a:p>
@@ -793,7 +794,7 @@
           <a:p>
             <a:fld id="{6587DA83-5663-4C9C-B9AA-0B40A3DAFF81}" type="datetime1">
               <a:rPr lang="en-US" smtClean="0"/>
-              <a:t>8/7/2020</a:t>
+              <a:t>8/8/2020</a:t>
             </a:fld>
             <a:endParaRPr lang="en-US" dirty="0"/>
           </a:p>
@@ -981,7 +982,7 @@
           <a:p>
             <a:fld id="{4BE1D723-8F53-4F53-90B0-1982A396982E}" type="datetime1">
               <a:rPr lang="en-US" smtClean="0"/>
-              <a:t>8/7/2020</a:t>
+              <a:t>8/8/2020</a:t>
             </a:fld>
             <a:endParaRPr lang="en-US" dirty="0"/>
           </a:p>
@@ -1354,7 +1355,7 @@
           <a:p>
             <a:fld id="{97669AF7-7BEB-44E4-9852-375E34362B5B}" type="datetime1">
               <a:rPr lang="en-US" smtClean="0"/>
-              <a:t>8/7/2020</a:t>
+              <a:t>8/8/2020</a:t>
             </a:fld>
             <a:endParaRPr lang="en-US" dirty="0"/>
           </a:p>
@@ -1609,7 +1610,7 @@
           <a:p>
             <a:fld id="{BAAAC38D-0552-4C82-B593-E6124DFADBE2}" type="datetime1">
               <a:rPr lang="en-US" smtClean="0"/>
-              <a:t>8/7/2020</a:t>
+              <a:t>8/8/2020</a:t>
             </a:fld>
             <a:endParaRPr lang="en-US" dirty="0"/>
           </a:p>
@@ -2006,7 +2007,7 @@
           <a:p>
             <a:fld id="{D9DF0F1C-5577-4ACB-BB62-DF8F3C494C7E}" type="datetime1">
               <a:rPr lang="en-US" smtClean="0"/>
-              <a:t>8/7/2020</a:t>
+              <a:t>8/8/2020</a:t>
             </a:fld>
             <a:endParaRPr lang="en-US" dirty="0"/>
           </a:p>
@@ -2142,7 +2143,7 @@
           <a:p>
             <a:fld id="{1775B394-D9F9-4F0C-B15D-605F45CB9E9F}" type="datetime1">
               <a:rPr lang="en-US" smtClean="0"/>
-              <a:t>8/7/2020</a:t>
+              <a:t>8/8/2020</a:t>
             </a:fld>
             <a:endParaRPr lang="en-US" dirty="0"/>
           </a:p>
@@ -2299,7 +2300,7 @@
           <a:p>
             <a:fld id="{39667345-2558-425A-8533-9BFDBCE15005}" type="datetime1">
               <a:rPr lang="en-US" smtClean="0"/>
-              <a:t>8/7/2020</a:t>
+              <a:t>8/8/2020</a:t>
             </a:fld>
             <a:endParaRPr lang="en-US" dirty="0"/>
           </a:p>
@@ -2628,7 +2629,7 @@
           <a:p>
             <a:fld id="{92BEA474-078D-4E9B-9B14-09A87B19DC46}" type="datetime1">
               <a:rPr lang="en-US" smtClean="0"/>
-              <a:t>8/7/2020</a:t>
+              <a:t>8/8/2020</a:t>
             </a:fld>
             <a:endParaRPr lang="en-US" dirty="0"/>
           </a:p>
@@ -2978,7 +2979,7 @@
           <a:p>
             <a:fld id="{4907D986-8816-4272-A432-0437A28A9828}" type="datetime1">
               <a:rPr lang="en-US" smtClean="0"/>
-              <a:t>8/7/2020</a:t>
+              <a:t>8/8/2020</a:t>
             </a:fld>
             <a:endParaRPr lang="en-US" dirty="0"/>
           </a:p>
@@ -3239,7 +3240,7 @@
           <a:p>
             <a:fld id="{62D6E202-B606-4609-B914-27C9371A1F6D}" type="datetime1">
               <a:rPr lang="en-US" smtClean="0"/>
-              <a:t>8/7/2020</a:t>
+              <a:t>8/8/2020</a:t>
             </a:fld>
             <a:endParaRPr lang="en-US" dirty="0"/>
           </a:p>
@@ -4063,11 +4064,13 @@
         </p:nvSpPr>
         <p:spPr/>
         <p:txBody>
-          <a:bodyPr/>
+          <a:bodyPr>
+            <a:normAutofit/>
+          </a:bodyPr>
           <a:lstStyle/>
           <a:p>
             <a:r>
-              <a:rPr lang="en-SG" dirty="0"/>
+              <a:rPr lang="en-SG" sz="3200" dirty="0"/>
               <a:t>Problem Statement</a:t>
             </a:r>
           </a:p>
@@ -4175,150 +4178,251 @@
         </p:nvSpPr>
         <p:spPr/>
         <p:txBody>
-          <a:bodyPr/>
-          <a:lstStyle/>
-          <a:p>
-            <a:r>
-              <a:rPr lang="en-SG" dirty="0"/>
-              <a:t>Data</a:t>
-            </a:r>
-          </a:p>
-        </p:txBody>
-      </p:sp>
-      <p:sp>
-        <p:nvSpPr>
-          <p:cNvPr id="3" name="Content Placeholder 2">
-            <a:extLst>
-              <a:ext uri="{FF2B5EF4-FFF2-40B4-BE49-F238E27FC236}">
-                <a16:creationId xmlns:a16="http://schemas.microsoft.com/office/drawing/2014/main" id="{35398530-8476-4157-A4C9-1670A41D9635}"/>
-              </a:ext>
-            </a:extLst>
-          </p:cNvPr>
-          <p:cNvSpPr>
-            <a:spLocks noGrp="1"/>
-          </p:cNvSpPr>
-          <p:nvPr>
-            <p:ph idx="1"/>
-          </p:nvPr>
-        </p:nvSpPr>
-        <p:spPr/>
-        <p:txBody>
           <a:bodyPr>
             <a:normAutofit/>
           </a:bodyPr>
           <a:lstStyle/>
           <a:p>
+            <a:r>
+              <a:rPr lang="en-SG" sz="3200" dirty="0"/>
+              <a:t>Data</a:t>
+            </a:r>
+          </a:p>
+        </p:txBody>
+      </p:sp>
+      <p:sp>
+        <p:nvSpPr>
+          <p:cNvPr id="3" name="Content Placeholder 2">
+            <a:extLst>
+              <a:ext uri="{FF2B5EF4-FFF2-40B4-BE49-F238E27FC236}">
+                <a16:creationId xmlns:a16="http://schemas.microsoft.com/office/drawing/2014/main" id="{35398530-8476-4157-A4C9-1670A41D9635}"/>
+              </a:ext>
+            </a:extLst>
+          </p:cNvPr>
+          <p:cNvSpPr>
+            <a:spLocks noGrp="1"/>
+          </p:cNvSpPr>
+          <p:nvPr>
+            <p:ph idx="1"/>
+          </p:nvPr>
+        </p:nvSpPr>
+        <p:spPr>
+          <a:xfrm>
+            <a:off x="1216404" y="2108201"/>
+            <a:ext cx="9939276" cy="3760891"/>
+          </a:xfrm>
+        </p:spPr>
+        <p:txBody>
+          <a:bodyPr>
+            <a:normAutofit/>
+          </a:bodyPr>
+          <a:lstStyle/>
+          <a:p>
             <a:pPr marL="0" indent="0">
+              <a:lnSpc>
+                <a:spcPct val="90000"/>
+              </a:lnSpc>
+              <a:spcBef>
+                <a:spcPct val="0"/>
+              </a:spcBef>
               <a:buNone/>
             </a:pPr>
             <a:r>
-              <a:rPr lang="en-SG" sz="2200" dirty="0"/>
+              <a:rPr lang="en-SG" sz="1600" spc="-50" dirty="0">
+                <a:latin typeface="Arial" panose="020B0604020202020204" pitchFamily="34" charset="0"/>
+                <a:ea typeface="+mj-ea"/>
+                <a:cs typeface="Arial" panose="020B0604020202020204" pitchFamily="34" charset="0"/>
+              </a:rPr>
               <a:t>In this analysis, the following data for </a:t>
             </a:r>
             <a:r>
-              <a:rPr lang="en-SG" sz="2200" b="1" dirty="0">
+              <a:rPr lang="en-SG" sz="1600" spc="-50" dirty="0">
                 <a:solidFill>
                   <a:srgbClr val="0070C0"/>
                 </a:solidFill>
+                <a:latin typeface="Arial" panose="020B0604020202020204" pitchFamily="34" charset="0"/>
+                <a:ea typeface="+mj-ea"/>
+                <a:cs typeface="Arial" panose="020B0604020202020204" pitchFamily="34" charset="0"/>
               </a:rPr>
               <a:t>SAT</a:t>
             </a:r>
             <a:r>
-              <a:rPr lang="en-SG" sz="2200" b="1" dirty="0"/>
-              <a:t> </a:t>
-            </a:r>
-            <a:r>
-              <a:rPr lang="en-SG" sz="2200" dirty="0"/>
-              <a:t>and </a:t>
-            </a:r>
-            <a:r>
-              <a:rPr lang="en-SG" sz="2200" b="1" dirty="0">
+              <a:rPr lang="en-SG" sz="1600" spc="-50" dirty="0">
+                <a:latin typeface="Arial" panose="020B0604020202020204" pitchFamily="34" charset="0"/>
+                <a:ea typeface="+mj-ea"/>
+                <a:cs typeface="Arial" panose="020B0604020202020204" pitchFamily="34" charset="0"/>
+              </a:rPr>
+              <a:t> and </a:t>
+            </a:r>
+            <a:r>
+              <a:rPr lang="en-SG" sz="1600" spc="-50" dirty="0">
                 <a:solidFill>
                   <a:srgbClr val="0070C0"/>
                 </a:solidFill>
+                <a:latin typeface="Arial" panose="020B0604020202020204" pitchFamily="34" charset="0"/>
+                <a:ea typeface="+mj-ea"/>
+                <a:cs typeface="Arial" panose="020B0604020202020204" pitchFamily="34" charset="0"/>
               </a:rPr>
               <a:t>ACT</a:t>
             </a:r>
             <a:r>
-              <a:rPr lang="en-SG" sz="2200" dirty="0"/>
+              <a:rPr lang="en-SG" sz="1600" spc="-50" dirty="0">
+                <a:latin typeface="Arial" panose="020B0604020202020204" pitchFamily="34" charset="0"/>
+                <a:ea typeface="+mj-ea"/>
+                <a:cs typeface="Arial" panose="020B0604020202020204" pitchFamily="34" charset="0"/>
+              </a:rPr>
               <a:t> in the year  </a:t>
             </a:r>
             <a:r>
-              <a:rPr lang="en-SG" sz="2200" b="1" dirty="0">
+              <a:rPr lang="en-SG" sz="1600" spc="-50" dirty="0">
                 <a:solidFill>
                   <a:srgbClr val="0070C0"/>
                 </a:solidFill>
+                <a:latin typeface="Arial" panose="020B0604020202020204" pitchFamily="34" charset="0"/>
+                <a:ea typeface="+mj-ea"/>
+                <a:cs typeface="Arial" panose="020B0604020202020204" pitchFamily="34" charset="0"/>
               </a:rPr>
               <a:t>2017</a:t>
             </a:r>
             <a:r>
-              <a:rPr lang="en-SG" sz="2200" dirty="0"/>
+              <a:rPr lang="en-SG" sz="1600" spc="-50" dirty="0">
+                <a:latin typeface="Arial" panose="020B0604020202020204" pitchFamily="34" charset="0"/>
+                <a:ea typeface="+mj-ea"/>
+                <a:cs typeface="Arial" panose="020B0604020202020204" pitchFamily="34" charset="0"/>
+              </a:rPr>
               <a:t> and </a:t>
             </a:r>
             <a:r>
-              <a:rPr lang="en-SG" sz="2200" b="1" dirty="0">
+              <a:rPr lang="en-SG" sz="1600" spc="-50" dirty="0">
                 <a:solidFill>
                   <a:srgbClr val="0070C0"/>
                 </a:solidFill>
+                <a:latin typeface="Arial" panose="020B0604020202020204" pitchFamily="34" charset="0"/>
+                <a:ea typeface="+mj-ea"/>
+                <a:cs typeface="Arial" panose="020B0604020202020204" pitchFamily="34" charset="0"/>
               </a:rPr>
               <a:t>2018</a:t>
             </a:r>
             <a:r>
-              <a:rPr lang="en-SG" sz="2200" dirty="0"/>
+              <a:rPr lang="en-SG" sz="1600" spc="-50" dirty="0">
+                <a:latin typeface="Arial" panose="020B0604020202020204" pitchFamily="34" charset="0"/>
+                <a:ea typeface="+mj-ea"/>
+                <a:cs typeface="Arial" panose="020B0604020202020204" pitchFamily="34" charset="0"/>
+              </a:rPr>
               <a:t> are analysed:</a:t>
             </a:r>
           </a:p>
           <a:p>
-            <a:pPr>
+            <a:pPr marL="0" indent="0">
+              <a:lnSpc>
+                <a:spcPct val="90000"/>
+              </a:lnSpc>
+              <a:spcBef>
+                <a:spcPct val="0"/>
+              </a:spcBef>
+              <a:buNone/>
+            </a:pPr>
+            <a:endParaRPr lang="en-SG" sz="1600" spc="-50" dirty="0">
+              <a:latin typeface="Arial" panose="020B0604020202020204" pitchFamily="34" charset="0"/>
+              <a:ea typeface="+mj-ea"/>
+              <a:cs typeface="Arial" panose="020B0604020202020204" pitchFamily="34" charset="0"/>
+            </a:endParaRPr>
+          </a:p>
+          <a:p>
+            <a:pPr marL="342900" indent="-342900">
+              <a:lnSpc>
+                <a:spcPct val="90000"/>
+              </a:lnSpc>
+              <a:spcBef>
+                <a:spcPct val="0"/>
+              </a:spcBef>
               <a:buClrTx/>
               <a:buFont typeface="Arial" panose="020B0604020202020204" pitchFamily="34" charset="0"/>
               <a:buChar char="•"/>
             </a:pPr>
             <a:r>
-              <a:rPr lang="en-SG" sz="2200" dirty="0"/>
+              <a:rPr lang="en-SG" sz="1600" spc="-50" dirty="0">
+                <a:latin typeface="Arial" panose="020B0604020202020204" pitchFamily="34" charset="0"/>
+                <a:ea typeface="+mj-ea"/>
+                <a:cs typeface="Arial" panose="020B0604020202020204" pitchFamily="34" charset="0"/>
+              </a:rPr>
               <a:t> </a:t>
             </a:r>
             <a:r>
-              <a:rPr lang="en-SG" sz="2200" b="1" dirty="0">
+              <a:rPr lang="en-SG" sz="1600" spc="-50" dirty="0">
                 <a:solidFill>
                   <a:srgbClr val="0070C0"/>
                 </a:solidFill>
+                <a:latin typeface="Arial" panose="020B0604020202020204" pitchFamily="34" charset="0"/>
+                <a:ea typeface="+mj-ea"/>
+                <a:cs typeface="Arial" panose="020B0604020202020204" pitchFamily="34" charset="0"/>
               </a:rPr>
-              <a:t>Participation Rate</a:t>
-            </a:r>
-            <a:r>
-              <a:rPr lang="en-SG" sz="2200" dirty="0">
-                <a:solidFill>
-                  <a:srgbClr val="0070C0"/>
-                </a:solidFill>
+              <a:t>Participation Rate </a:t>
+            </a:r>
+            <a:r>
+              <a:rPr lang="en-SG" sz="1600" spc="-50" dirty="0">
+                <a:latin typeface="Arial" panose="020B0604020202020204" pitchFamily="34" charset="0"/>
+                <a:ea typeface="+mj-ea"/>
+                <a:cs typeface="Arial" panose="020B0604020202020204" pitchFamily="34" charset="0"/>
               </a:rPr>
-              <a:t> </a:t>
-            </a:r>
-            <a:r>
-              <a:rPr lang="en-SG" sz="2200" dirty="0"/>
               <a:t>of each test by state</a:t>
             </a:r>
           </a:p>
           <a:p>
-            <a:pPr>
+            <a:pPr marL="342900" indent="-342900">
+              <a:lnSpc>
+                <a:spcPct val="90000"/>
+              </a:lnSpc>
+              <a:spcBef>
+                <a:spcPct val="0"/>
+              </a:spcBef>
               <a:buClrTx/>
               <a:buFont typeface="Arial" panose="020B0604020202020204" pitchFamily="34" charset="0"/>
               <a:buChar char="•"/>
             </a:pPr>
-            <a:r>
-              <a:rPr lang="en-SG" sz="2200" dirty="0"/>
+            <a:endParaRPr lang="en-SG" sz="1600" spc="-50" dirty="0">
+              <a:latin typeface="Arial" panose="020B0604020202020204" pitchFamily="34" charset="0"/>
+              <a:ea typeface="+mj-ea"/>
+              <a:cs typeface="Arial" panose="020B0604020202020204" pitchFamily="34" charset="0"/>
+            </a:endParaRPr>
+          </a:p>
+          <a:p>
+            <a:pPr marL="342900" indent="-342900">
+              <a:lnSpc>
+                <a:spcPct val="90000"/>
+              </a:lnSpc>
+              <a:spcBef>
+                <a:spcPct val="0"/>
+              </a:spcBef>
+              <a:buClrTx/>
+              <a:buFont typeface="Arial" panose="020B0604020202020204" pitchFamily="34" charset="0"/>
+              <a:buChar char="•"/>
+            </a:pPr>
+            <a:r>
+              <a:rPr lang="en-SG" sz="1600" spc="-50" dirty="0">
+                <a:latin typeface="Arial" panose="020B0604020202020204" pitchFamily="34" charset="0"/>
+                <a:ea typeface="+mj-ea"/>
+                <a:cs typeface="Arial" panose="020B0604020202020204" pitchFamily="34" charset="0"/>
+              </a:rPr>
               <a:t> </a:t>
             </a:r>
             <a:r>
-              <a:rPr lang="en-SG" sz="2200" b="1" dirty="0">
+              <a:rPr lang="en-SG" sz="1600" spc="-50" dirty="0">
                 <a:solidFill>
                   <a:srgbClr val="0070C0"/>
                 </a:solidFill>
+                <a:latin typeface="Arial" panose="020B0604020202020204" pitchFamily="34" charset="0"/>
+                <a:ea typeface="+mj-ea"/>
+                <a:cs typeface="Arial" panose="020B0604020202020204" pitchFamily="34" charset="0"/>
               </a:rPr>
               <a:t>Average Test Scores </a:t>
             </a:r>
             <a:r>
-              <a:rPr lang="en-SG" sz="2200" dirty="0"/>
+              <a:rPr lang="en-SG" sz="1600" spc="-50" dirty="0">
+                <a:latin typeface="Arial" panose="020B0604020202020204" pitchFamily="34" charset="0"/>
+                <a:ea typeface="+mj-ea"/>
+                <a:cs typeface="Arial" panose="020B0604020202020204" pitchFamily="34" charset="0"/>
+              </a:rPr>
               <a:t>of each test by state</a:t>
             </a:r>
           </a:p>
@@ -4327,20 +4431,29 @@
               <a:buClrTx/>
               <a:buNone/>
             </a:pPr>
-            <a:endParaRPr lang="en-SG" sz="2200" dirty="0"/>
+            <a:endParaRPr lang="en-SG" sz="1800" dirty="0">
+              <a:latin typeface="Arial" panose="020B0604020202020204" pitchFamily="34" charset="0"/>
+              <a:cs typeface="Arial" panose="020B0604020202020204" pitchFamily="34" charset="0"/>
+            </a:endParaRPr>
           </a:p>
           <a:p>
             <a:pPr marL="0" indent="0">
               <a:buClrTx/>
               <a:buNone/>
             </a:pPr>
-            <a:endParaRPr lang="en-SG" sz="2200" dirty="0"/>
+            <a:endParaRPr lang="en-SG" sz="1800" dirty="0">
+              <a:latin typeface="Arial" panose="020B0604020202020204" pitchFamily="34" charset="0"/>
+              <a:cs typeface="Arial" panose="020B0604020202020204" pitchFamily="34" charset="0"/>
+            </a:endParaRPr>
           </a:p>
           <a:p>
             <a:pPr marL="0" indent="0">
               <a:buNone/>
             </a:pPr>
-            <a:endParaRPr lang="en-SG" sz="2200" dirty="0"/>
+            <a:endParaRPr lang="en-SG" sz="1800" dirty="0">
+              <a:latin typeface="Arial" panose="020B0604020202020204" pitchFamily="34" charset="0"/>
+              <a:cs typeface="Arial" panose="020B0604020202020204" pitchFamily="34" charset="0"/>
+            </a:endParaRPr>
           </a:p>
         </p:txBody>
       </p:sp>
@@ -4404,17 +4517,29 @@
           <a:p>
             <a:r>
               <a:rPr lang="en-SG" sz="2400" dirty="0"/>
-              <a:t>In both 2017 and 2018, ACT had higher median participation rate vs. SAT. </a:t>
+              <a:t>In both 2017 and 2018, </a:t>
+            </a:r>
+            <a:r>
+              <a:rPr lang="en-SG" sz="2400" dirty="0">
+                <a:solidFill>
+                  <a:srgbClr val="C00000"/>
+                </a:solidFill>
+              </a:rPr>
+              <a:t>ACT had higher median participation rate </a:t>
+            </a:r>
+            <a:r>
+              <a:rPr lang="en-SG" sz="2400" dirty="0"/>
+              <a:t>vs. SAT. </a:t>
             </a:r>
           </a:p>
         </p:txBody>
       </p:sp>
       <p:pic>
         <p:nvPicPr>
-          <p:cNvPr id="1026" name="Picture 2">
+          <p:cNvPr id="3" name="Picture 2">
             <a:extLst>
               <a:ext uri="{FF2B5EF4-FFF2-40B4-BE49-F238E27FC236}">
-                <a16:creationId xmlns:a16="http://schemas.microsoft.com/office/drawing/2014/main" id="{CD799521-0AF6-4504-BE01-D33C454FB525}"/>
+                <a16:creationId xmlns:a16="http://schemas.microsoft.com/office/drawing/2014/main" id="{6F05C204-E7A9-421C-8DB9-47C637D63FF0}"/>
               </a:ext>
             </a:extLst>
           </p:cNvPr>
@@ -4438,8 +4563,8 @@
         </p:blipFill>
         <p:spPr bwMode="auto">
           <a:xfrm>
-            <a:off x="2488758" y="2054957"/>
-            <a:ext cx="6650715" cy="4178866"/>
+            <a:off x="2665062" y="2106237"/>
+            <a:ext cx="6551193" cy="4116333"/>
           </a:xfrm>
           <a:prstGeom prst="rect">
             <a:avLst/>
@@ -4458,10 +4583,10 @@
       </p:pic>
       <p:cxnSp>
         <p:nvCxnSpPr>
-          <p:cNvPr id="6" name="Straight Connector 5">
+          <p:cNvPr id="7" name="Straight Connector 6">
             <a:extLst>
               <a:ext uri="{FF2B5EF4-FFF2-40B4-BE49-F238E27FC236}">
-                <a16:creationId xmlns:a16="http://schemas.microsoft.com/office/drawing/2014/main" id="{60B5B5B1-D250-4F1F-B66D-B569AC8C010E}"/>
+                <a16:creationId xmlns:a16="http://schemas.microsoft.com/office/drawing/2014/main" id="{CA49A7EF-1EDC-479D-B193-78FD5D070FDF}"/>
               </a:ext>
             </a:extLst>
           </p:cNvPr>
@@ -4470,7 +4595,7 @@
         </p:nvCxnSpPr>
         <p:spPr>
           <a:xfrm>
-            <a:off x="5971429" y="2496710"/>
+            <a:off x="6087664" y="2496710"/>
             <a:ext cx="0" cy="3348000"/>
           </a:xfrm>
           <a:prstGeom prst="line">
@@ -4559,18 +4684,26 @@
           <a:lstStyle/>
           <a:p>
             <a:r>
+              <a:rPr lang="en-SG" sz="2400" dirty="0">
+                <a:solidFill>
+                  <a:srgbClr val="C00000"/>
+                </a:solidFill>
+              </a:rPr>
+              <a:t>A third of the states had 100% ACT participation in 2017 and 2018</a:t>
+            </a:r>
+            <a:r>
               <a:rPr lang="en-SG" sz="2400" dirty="0"/>
-              <a:t>A third of the states had 100% ACT participation in 2017 and 2018. Mirroring this, a similar proportion of states have low SAT participation rate in both years. Notably, the number of states with strong SAT participation has increased in 2018.</a:t>
+              <a:t>. Mirroring this, a similar proportion of states have low SAT participation rate in both years. Notably, the number of states with strong SAT participation has increased in 2018.</a:t>
             </a:r>
           </a:p>
         </p:txBody>
       </p:sp>
       <p:pic>
         <p:nvPicPr>
-          <p:cNvPr id="1026" name="Picture 2">
+          <p:cNvPr id="2050" name="Picture 2">
             <a:extLst>
               <a:ext uri="{FF2B5EF4-FFF2-40B4-BE49-F238E27FC236}">
-                <a16:creationId xmlns:a16="http://schemas.microsoft.com/office/drawing/2014/main" id="{3A2AA48E-E851-4F56-AD6E-138246E95347}"/>
+                <a16:creationId xmlns:a16="http://schemas.microsoft.com/office/drawing/2014/main" id="{8BB027FC-5917-40A8-B7BB-0D9347509498}"/>
               </a:ext>
             </a:extLst>
           </p:cNvPr>
@@ -4594,8 +4727,8 @@
         </p:blipFill>
         <p:spPr bwMode="auto">
           <a:xfrm>
-            <a:off x="2661492" y="1944589"/>
-            <a:ext cx="5064413" cy="4425215"/>
+            <a:off x="2647591" y="1929971"/>
+            <a:ext cx="5068020" cy="4430159"/>
           </a:xfrm>
           <a:prstGeom prst="rect">
             <a:avLst/>
@@ -4614,10 +4747,10 @@
       </p:pic>
       <p:sp>
         <p:nvSpPr>
-          <p:cNvPr id="5" name="Rectangle 4">
+          <p:cNvPr id="3" name="Rectangle 2">
             <a:extLst>
               <a:ext uri="{FF2B5EF4-FFF2-40B4-BE49-F238E27FC236}">
-                <a16:creationId xmlns:a16="http://schemas.microsoft.com/office/drawing/2014/main" id="{42086896-8C73-4B2E-8FE8-A47CAD96C398}"/>
+                <a16:creationId xmlns:a16="http://schemas.microsoft.com/office/drawing/2014/main" id="{D55204F4-A94B-459D-9E55-BCCB3298CC4F}"/>
               </a:ext>
             </a:extLst>
           </p:cNvPr>
@@ -4666,10 +4799,10 @@
       </p:sp>
       <p:sp>
         <p:nvSpPr>
-          <p:cNvPr id="6" name="Rectangle 5">
+          <p:cNvPr id="4" name="Rectangle 3">
             <a:extLst>
               <a:ext uri="{FF2B5EF4-FFF2-40B4-BE49-F238E27FC236}">
-                <a16:creationId xmlns:a16="http://schemas.microsoft.com/office/drawing/2014/main" id="{55FF46E7-933D-4005-BBAC-1BE811A7D0C2}"/>
+                <a16:creationId xmlns:a16="http://schemas.microsoft.com/office/drawing/2014/main" id="{BB9E1D0B-63B7-4B73-B7F3-56CB73F6E607}"/>
               </a:ext>
             </a:extLst>
           </p:cNvPr>
@@ -4718,10 +4851,10 @@
       </p:sp>
       <p:sp>
         <p:nvSpPr>
-          <p:cNvPr id="8" name="Rectangle 7">
+          <p:cNvPr id="7" name="Rectangle 6">
             <a:extLst>
               <a:ext uri="{FF2B5EF4-FFF2-40B4-BE49-F238E27FC236}">
-                <a16:creationId xmlns:a16="http://schemas.microsoft.com/office/drawing/2014/main" id="{37D42BA1-76A7-41EA-8A04-32E99AA53FB5}"/>
+                <a16:creationId xmlns:a16="http://schemas.microsoft.com/office/drawing/2014/main" id="{E22EB551-8431-4067-A325-B79C99C44341}"/>
               </a:ext>
             </a:extLst>
           </p:cNvPr>
@@ -4770,10 +4903,10 @@
       </p:sp>
       <p:sp>
         <p:nvSpPr>
-          <p:cNvPr id="10" name="Rectangle 9">
+          <p:cNvPr id="9" name="Rectangle 8">
             <a:extLst>
               <a:ext uri="{FF2B5EF4-FFF2-40B4-BE49-F238E27FC236}">
-                <a16:creationId xmlns:a16="http://schemas.microsoft.com/office/drawing/2014/main" id="{F16C8196-3371-40D6-B0C8-62CF46F05FF3}"/>
+                <a16:creationId xmlns:a16="http://schemas.microsoft.com/office/drawing/2014/main" id="{4BC62EC9-8218-47C0-8B3D-E1F90A7A0C10}"/>
               </a:ext>
             </a:extLst>
           </p:cNvPr>
@@ -4822,10 +4955,10 @@
       </p:sp>
       <p:sp>
         <p:nvSpPr>
-          <p:cNvPr id="12" name="Rectangle 11">
+          <p:cNvPr id="15" name="Rectangle 14">
             <a:extLst>
               <a:ext uri="{FF2B5EF4-FFF2-40B4-BE49-F238E27FC236}">
-                <a16:creationId xmlns:a16="http://schemas.microsoft.com/office/drawing/2014/main" id="{C7BDC657-B41C-44EB-92C9-7F3F3189BC22}"/>
+                <a16:creationId xmlns:a16="http://schemas.microsoft.com/office/drawing/2014/main" id="{0E57EA83-DEF3-4266-91F1-93235F16583D}"/>
               </a:ext>
             </a:extLst>
           </p:cNvPr>
@@ -4902,83 +5035,12 @@
           <a:chExt cx="0" cy="0"/>
         </a:xfrm>
       </p:grpSpPr>
-      <p:sp>
-        <p:nvSpPr>
-          <p:cNvPr id="2" name="Title 1">
-            <a:extLst>
-              <a:ext uri="{FF2B5EF4-FFF2-40B4-BE49-F238E27FC236}">
-                <a16:creationId xmlns:a16="http://schemas.microsoft.com/office/drawing/2014/main" id="{31DC815F-F1F3-45F8-94FE-7FAF7F2CC93D}"/>
-              </a:ext>
-            </a:extLst>
-          </p:cNvPr>
-          <p:cNvSpPr>
-            <a:spLocks noGrp="1"/>
-          </p:cNvSpPr>
-          <p:nvPr>
-            <p:ph type="title"/>
-          </p:nvPr>
-        </p:nvSpPr>
-        <p:spPr>
-          <a:xfrm>
-            <a:off x="1097280" y="236111"/>
-            <a:ext cx="10400306" cy="1594237"/>
-          </a:xfrm>
-        </p:spPr>
-        <p:txBody>
-          <a:bodyPr>
-            <a:noAutofit/>
-          </a:bodyPr>
-          <a:lstStyle/>
-          <a:p>
-            <a:r>
-              <a:rPr lang="en-SG" sz="2400" dirty="0"/>
-              <a:t>Sharp increase in SAT participation rate seen for </a:t>
-            </a:r>
-            <a:r>
-              <a:rPr lang="en-SG" sz="2400" dirty="0">
-                <a:solidFill>
-                  <a:srgbClr val="339933"/>
-                </a:solidFill>
-              </a:rPr>
-              <a:t>Colorado</a:t>
-            </a:r>
-            <a:r>
-              <a:rPr lang="en-SG" sz="2400" dirty="0"/>
-              <a:t> and </a:t>
-            </a:r>
-            <a:r>
-              <a:rPr lang="en-SG" sz="2400" dirty="0">
-                <a:solidFill>
-                  <a:srgbClr val="339933"/>
-                </a:solidFill>
-              </a:rPr>
-              <a:t>Illinois</a:t>
-            </a:r>
-            <a:r>
-              <a:rPr lang="en-SG" sz="2400" dirty="0"/>
-              <a:t>, along with decline in ACT participation, indicates conversion from ACT to SAT. </a:t>
-            </a:r>
-            <a:r>
-              <a:rPr lang="en-SG" sz="2400" dirty="0">
-                <a:solidFill>
-                  <a:srgbClr val="339933"/>
-                </a:solidFill>
-              </a:rPr>
-              <a:t>Rhode Island </a:t>
-            </a:r>
-            <a:r>
-              <a:rPr lang="en-SG" sz="2400" dirty="0"/>
-              <a:t>also saw a notable increase in SAT participation. </a:t>
-            </a:r>
-          </a:p>
-        </p:txBody>
-      </p:sp>
       <p:pic>
         <p:nvPicPr>
-          <p:cNvPr id="3075" name="Picture 3">
+          <p:cNvPr id="1026" name="Picture 2">
             <a:extLst>
               <a:ext uri="{FF2B5EF4-FFF2-40B4-BE49-F238E27FC236}">
-                <a16:creationId xmlns:a16="http://schemas.microsoft.com/office/drawing/2014/main" id="{78D52FCA-E506-4D0D-9AD5-D6F85DB3714D}"/>
+                <a16:creationId xmlns:a16="http://schemas.microsoft.com/office/drawing/2014/main" id="{A307D9F2-AC0B-4B46-9950-C013CB59B37A}"/>
               </a:ext>
             </a:extLst>
           </p:cNvPr>
@@ -5002,8 +5064,8 @@
         </p:blipFill>
         <p:spPr bwMode="auto">
           <a:xfrm>
-            <a:off x="437487" y="2317350"/>
-            <a:ext cx="10553700" cy="3590925"/>
+            <a:off x="916257" y="223460"/>
+            <a:ext cx="6827160" cy="6061103"/>
           </a:xfrm>
           <a:prstGeom prst="rect">
             <a:avLst/>
@@ -5020,6 +5082,407 @@
           </a:extLst>
         </p:spPr>
       </p:pic>
+      <p:sp>
+        <p:nvSpPr>
+          <p:cNvPr id="2" name="Rectangle 1">
+            <a:extLst>
+              <a:ext uri="{FF2B5EF4-FFF2-40B4-BE49-F238E27FC236}">
+                <a16:creationId xmlns:a16="http://schemas.microsoft.com/office/drawing/2014/main" id="{5FA12E85-0EC0-48D0-897D-CDF335F8A307}"/>
+              </a:ext>
+            </a:extLst>
+          </p:cNvPr>
+          <p:cNvSpPr/>
+          <p:nvPr/>
+        </p:nvSpPr>
+        <p:spPr>
+          <a:xfrm>
+            <a:off x="2038027" y="2665709"/>
+            <a:ext cx="681926" cy="232474"/>
+          </a:xfrm>
+          <a:prstGeom prst="rect">
+            <a:avLst/>
+          </a:prstGeom>
+          <a:noFill/>
+          <a:ln w="22225">
+            <a:solidFill>
+              <a:srgbClr val="FFFF00"/>
+            </a:solidFill>
+          </a:ln>
+        </p:spPr>
+        <p:style>
+          <a:lnRef idx="2">
+            <a:schemeClr val="accent1">
+              <a:shade val="50000"/>
+            </a:schemeClr>
+          </a:lnRef>
+          <a:fillRef idx="1">
+            <a:schemeClr val="accent1"/>
+          </a:fillRef>
+          <a:effectRef idx="0">
+            <a:schemeClr val="accent1"/>
+          </a:effectRef>
+          <a:fontRef idx="minor">
+            <a:schemeClr val="lt1"/>
+          </a:fontRef>
+        </p:style>
+        <p:txBody>
+          <a:bodyPr rtlCol="0" anchor="ctr"/>
+          <a:lstStyle/>
+          <a:p>
+            <a:pPr algn="ctr"/>
+            <a:endParaRPr lang="en-SG" dirty="0">
+              <a:highlight>
+                <a:srgbClr val="008000"/>
+              </a:highlight>
+            </a:endParaRPr>
+          </a:p>
+        </p:txBody>
+      </p:sp>
+      <p:sp>
+        <p:nvSpPr>
+          <p:cNvPr id="3" name="Rectangle 2">
+            <a:extLst>
+              <a:ext uri="{FF2B5EF4-FFF2-40B4-BE49-F238E27FC236}">
+                <a16:creationId xmlns:a16="http://schemas.microsoft.com/office/drawing/2014/main" id="{66D958F2-3A70-4CB0-8A69-5679AD8D427D}"/>
+              </a:ext>
+            </a:extLst>
+          </p:cNvPr>
+          <p:cNvSpPr/>
+          <p:nvPr/>
+        </p:nvSpPr>
+        <p:spPr>
+          <a:xfrm>
+            <a:off x="4065722" y="3794502"/>
+            <a:ext cx="227309" cy="1141708"/>
+          </a:xfrm>
+          <a:prstGeom prst="rect">
+            <a:avLst/>
+          </a:prstGeom>
+          <a:noFill/>
+          <a:ln w="22225">
+            <a:solidFill>
+              <a:srgbClr val="FFFF00"/>
+            </a:solidFill>
+          </a:ln>
+        </p:spPr>
+        <p:style>
+          <a:lnRef idx="2">
+            <a:schemeClr val="accent1">
+              <a:shade val="50000"/>
+            </a:schemeClr>
+          </a:lnRef>
+          <a:fillRef idx="1">
+            <a:schemeClr val="accent1"/>
+          </a:fillRef>
+          <a:effectRef idx="0">
+            <a:schemeClr val="accent1"/>
+          </a:effectRef>
+          <a:fontRef idx="minor">
+            <a:schemeClr val="lt1"/>
+          </a:fontRef>
+        </p:style>
+        <p:txBody>
+          <a:bodyPr rtlCol="0" anchor="ctr"/>
+          <a:lstStyle/>
+          <a:p>
+            <a:pPr algn="ctr"/>
+            <a:endParaRPr lang="en-SG" dirty="0">
+              <a:highlight>
+                <a:srgbClr val="008000"/>
+              </a:highlight>
+            </a:endParaRPr>
+          </a:p>
+        </p:txBody>
+      </p:sp>
+      <p:sp>
+        <p:nvSpPr>
+          <p:cNvPr id="6" name="Title 1">
+            <a:extLst>
+              <a:ext uri="{FF2B5EF4-FFF2-40B4-BE49-F238E27FC236}">
+                <a16:creationId xmlns:a16="http://schemas.microsoft.com/office/drawing/2014/main" id="{DDF927DC-2AAA-493C-B083-84B2C5739B0F}"/>
+              </a:ext>
+            </a:extLst>
+          </p:cNvPr>
+          <p:cNvSpPr txBox="1">
+            <a:spLocks/>
+          </p:cNvSpPr>
+          <p:nvPr/>
+        </p:nvSpPr>
+        <p:spPr>
+          <a:xfrm>
+            <a:off x="8183104" y="883402"/>
+            <a:ext cx="3758339" cy="4471261"/>
+          </a:xfrm>
+          <a:prstGeom prst="rect">
+            <a:avLst/>
+          </a:prstGeom>
+        </p:spPr>
+        <p:txBody>
+          <a:bodyPr>
+            <a:normAutofit/>
+          </a:bodyPr>
+          <a:lstStyle>
+            <a:lvl1pPr algn="l" defTabSz="914400" rtl="0" eaLnBrk="1" latinLnBrk="0" hangingPunct="1">
+              <a:lnSpc>
+                <a:spcPct val="90000"/>
+              </a:lnSpc>
+              <a:spcBef>
+                <a:spcPct val="0"/>
+              </a:spcBef>
+              <a:buNone/>
+              <a:defRPr sz="4700" i="0" kern="1200" spc="-50" baseline="0">
+                <a:solidFill>
+                  <a:schemeClr val="tx1">
+                    <a:lumMod val="75000"/>
+                    <a:lumOff val="25000"/>
+                  </a:schemeClr>
+                </a:solidFill>
+                <a:latin typeface="+mj-lt"/>
+                <a:ea typeface="+mj-ea"/>
+                <a:cs typeface="+mj-cs"/>
+              </a:defRPr>
+            </a:lvl1pPr>
+          </a:lstStyle>
+          <a:p>
+            <a:r>
+              <a:rPr lang="en-SG" sz="2200" dirty="0"/>
+              <a:t>No evidence of prior year test score as a driver of SAT participation</a:t>
+            </a:r>
+          </a:p>
+          <a:p>
+            <a:endParaRPr lang="en-SG" sz="2200" dirty="0"/>
+          </a:p>
+          <a:p>
+            <a:endParaRPr lang="en-SG" sz="2200" dirty="0"/>
+          </a:p>
+          <a:p>
+            <a:pPr marL="342900" indent="-342900">
+              <a:buFont typeface="Arial" panose="020B0604020202020204" pitchFamily="34" charset="0"/>
+              <a:buChar char="•"/>
+            </a:pPr>
+            <a:r>
+              <a:rPr lang="en-SG" sz="1600" dirty="0">
+                <a:latin typeface="Arial" panose="020B0604020202020204" pitchFamily="34" charset="0"/>
+                <a:cs typeface="Arial" panose="020B0604020202020204" pitchFamily="34" charset="0"/>
+              </a:rPr>
+              <a:t>High SAT scores in 2017 does not correlate to high SAT participation rate in 2018.</a:t>
+            </a:r>
+          </a:p>
+          <a:p>
+            <a:pPr marL="342900" indent="-342900">
+              <a:buFont typeface="Arial" panose="020B0604020202020204" pitchFamily="34" charset="0"/>
+              <a:buChar char="•"/>
+            </a:pPr>
+            <a:endParaRPr lang="en-SG" sz="1600" dirty="0">
+              <a:latin typeface="Arial" panose="020B0604020202020204" pitchFamily="34" charset="0"/>
+              <a:cs typeface="Arial" panose="020B0604020202020204" pitchFamily="34" charset="0"/>
+            </a:endParaRPr>
+          </a:p>
+          <a:p>
+            <a:pPr marL="342900" indent="-342900">
+              <a:buFont typeface="Arial" panose="020B0604020202020204" pitchFamily="34" charset="0"/>
+              <a:buChar char="•"/>
+            </a:pPr>
+            <a:r>
+              <a:rPr lang="en-SG" sz="1600" dirty="0">
+                <a:latin typeface="Arial" panose="020B0604020202020204" pitchFamily="34" charset="0"/>
+                <a:cs typeface="Arial" panose="020B0604020202020204" pitchFamily="34" charset="0"/>
+              </a:rPr>
+              <a:t>Similarly, low ACT scores in 2017 also does not correlate to high SAT 2018 participation.</a:t>
+            </a:r>
+          </a:p>
+          <a:p>
+            <a:endParaRPr lang="en-SG" sz="2200" dirty="0"/>
+          </a:p>
+          <a:p>
+            <a:endParaRPr lang="en-SG" sz="2200" dirty="0"/>
+          </a:p>
+        </p:txBody>
+      </p:sp>
+      <p:cxnSp>
+        <p:nvCxnSpPr>
+          <p:cNvPr id="7" name="Straight Connector 6">
+            <a:extLst>
+              <a:ext uri="{FF2B5EF4-FFF2-40B4-BE49-F238E27FC236}">
+                <a16:creationId xmlns:a16="http://schemas.microsoft.com/office/drawing/2014/main" id="{96F9B6AA-A1F9-4105-AA5A-32F9E89E7455}"/>
+              </a:ext>
+            </a:extLst>
+          </p:cNvPr>
+          <p:cNvCxnSpPr/>
+          <p:nvPr/>
+        </p:nvCxnSpPr>
+        <p:spPr>
+          <a:xfrm>
+            <a:off x="8296712" y="2013358"/>
+            <a:ext cx="3431097" cy="0"/>
+          </a:xfrm>
+          <a:prstGeom prst="line">
+            <a:avLst/>
+          </a:prstGeom>
+        </p:spPr>
+        <p:style>
+          <a:lnRef idx="1">
+            <a:schemeClr val="dk1"/>
+          </a:lnRef>
+          <a:fillRef idx="0">
+            <a:schemeClr val="dk1"/>
+          </a:fillRef>
+          <a:effectRef idx="0">
+            <a:schemeClr val="dk1"/>
+          </a:effectRef>
+          <a:fontRef idx="minor">
+            <a:schemeClr val="tx1"/>
+          </a:fontRef>
+        </p:style>
+      </p:cxnSp>
+    </p:spTree>
+    <p:extLst>
+      <p:ext uri="{BB962C8B-B14F-4D97-AF65-F5344CB8AC3E}">
+        <p14:creationId xmlns:p14="http://schemas.microsoft.com/office/powerpoint/2010/main" val="2643659148"/>
+      </p:ext>
+    </p:extLst>
+  </p:cSld>
+  <p:clrMapOvr>
+    <a:masterClrMapping/>
+  </p:clrMapOvr>
+</p:sld>
+</file>
+
+<file path=ppt/slides/slide7.xml><?xml version="1.0" encoding="utf-8"?>
+<p:sld xmlns:a="http://schemas.openxmlformats.org/drawingml/2006/main" xmlns:r="http://schemas.openxmlformats.org/officeDocument/2006/relationships" xmlns:p="http://schemas.openxmlformats.org/presentationml/2006/main">
+  <p:cSld>
+    <p:spTree>
+      <p:nvGrpSpPr>
+        <p:cNvPr id="1" name=""/>
+        <p:cNvGrpSpPr/>
+        <p:nvPr/>
+      </p:nvGrpSpPr>
+      <p:grpSpPr>
+        <a:xfrm>
+          <a:off x="0" y="0"/>
+          <a:ext cx="0" cy="0"/>
+          <a:chOff x="0" y="0"/>
+          <a:chExt cx="0" cy="0"/>
+        </a:xfrm>
+      </p:grpSpPr>
+      <p:pic>
+        <p:nvPicPr>
+          <p:cNvPr id="3074" name="Picture 2">
+            <a:extLst>
+              <a:ext uri="{FF2B5EF4-FFF2-40B4-BE49-F238E27FC236}">
+                <a16:creationId xmlns:a16="http://schemas.microsoft.com/office/drawing/2014/main" id="{C261E5C7-09F4-4107-9074-15AEE697F42D}"/>
+              </a:ext>
+            </a:extLst>
+          </p:cNvPr>
+          <p:cNvPicPr>
+            <a:picLocks noChangeAspect="1" noChangeArrowheads="1"/>
+          </p:cNvPicPr>
+          <p:nvPr/>
+        </p:nvPicPr>
+        <p:blipFill>
+          <a:blip r:embed="rId2">
+            <a:extLst>
+              <a:ext uri="{28A0092B-C50C-407E-A947-70E740481C1C}">
+                <a14:useLocalDpi xmlns:a14="http://schemas.microsoft.com/office/drawing/2010/main" val="0"/>
+              </a:ext>
+            </a:extLst>
+          </a:blip>
+          <a:srcRect/>
+          <a:stretch>
+            <a:fillRect/>
+          </a:stretch>
+        </p:blipFill>
+        <p:spPr bwMode="auto">
+          <a:xfrm>
+            <a:off x="857147" y="1984178"/>
+            <a:ext cx="10078566" cy="4411647"/>
+          </a:xfrm>
+          <a:prstGeom prst="rect">
+            <a:avLst/>
+          </a:prstGeom>
+          <a:noFill/>
+          <a:extLst>
+            <a:ext uri="{909E8E84-426E-40DD-AFC4-6F175D3DCCD1}">
+              <a14:hiddenFill xmlns:a14="http://schemas.microsoft.com/office/drawing/2010/main">
+                <a:solidFill>
+                  <a:srgbClr val="FFFFFF"/>
+                </a:solidFill>
+              </a14:hiddenFill>
+            </a:ext>
+          </a:extLst>
+        </p:spPr>
+      </p:pic>
+      <p:sp>
+        <p:nvSpPr>
+          <p:cNvPr id="2" name="Title 1">
+            <a:extLst>
+              <a:ext uri="{FF2B5EF4-FFF2-40B4-BE49-F238E27FC236}">
+                <a16:creationId xmlns:a16="http://schemas.microsoft.com/office/drawing/2014/main" id="{31DC815F-F1F3-45F8-94FE-7FAF7F2CC93D}"/>
+              </a:ext>
+            </a:extLst>
+          </p:cNvPr>
+          <p:cNvSpPr>
+            <a:spLocks noGrp="1"/>
+          </p:cNvSpPr>
+          <p:nvPr>
+            <p:ph type="title"/>
+          </p:nvPr>
+        </p:nvSpPr>
+        <p:spPr>
+          <a:xfrm>
+            <a:off x="1097280" y="236111"/>
+            <a:ext cx="10400306" cy="1594237"/>
+          </a:xfrm>
+        </p:spPr>
+        <p:txBody>
+          <a:bodyPr>
+            <a:noAutofit/>
+          </a:bodyPr>
+          <a:lstStyle/>
+          <a:p>
+            <a:r>
+              <a:rPr lang="en-SG" sz="2400" dirty="0"/>
+              <a:t>Sharp increase in SAT participation rate seen for </a:t>
+            </a:r>
+            <a:r>
+              <a:rPr lang="en-SG" sz="2400" dirty="0">
+                <a:solidFill>
+                  <a:srgbClr val="339933"/>
+                </a:solidFill>
+              </a:rPr>
+              <a:t>Colorado</a:t>
+            </a:r>
+            <a:r>
+              <a:rPr lang="en-SG" sz="2400" dirty="0"/>
+              <a:t> and </a:t>
+            </a:r>
+            <a:r>
+              <a:rPr lang="en-SG" sz="2400" dirty="0">
+                <a:solidFill>
+                  <a:srgbClr val="339933"/>
+                </a:solidFill>
+              </a:rPr>
+              <a:t>Illinois</a:t>
+            </a:r>
+            <a:r>
+              <a:rPr lang="en-SG" sz="2400" dirty="0"/>
+              <a:t>, along with decline in ACT participation, indicates conversion from ACT to SAT. </a:t>
+            </a:r>
+            <a:r>
+              <a:rPr lang="en-SG" sz="2400" dirty="0">
+                <a:solidFill>
+                  <a:srgbClr val="339933"/>
+                </a:solidFill>
+              </a:rPr>
+              <a:t>Rhode Island </a:t>
+            </a:r>
+            <a:r>
+              <a:rPr lang="en-SG" sz="2400" dirty="0"/>
+              <a:t>also saw a notable increase in SAT participation. </a:t>
+            </a:r>
+          </a:p>
+        </p:txBody>
+      </p:sp>
       <p:grpSp>
         <p:nvGrpSpPr>
           <p:cNvPr id="5" name="Group 4">
@@ -5034,7 +5497,7 @@
         </p:nvGrpSpPr>
         <p:grpSpPr>
           <a:xfrm>
-            <a:off x="8790527" y="2317350"/>
+            <a:off x="8751782" y="2193365"/>
             <a:ext cx="1633204" cy="935497"/>
             <a:chOff x="2477192" y="2331405"/>
             <a:chExt cx="1633204" cy="935497"/>
@@ -5209,7 +5672,7 @@
         </p:nvGrpSpPr>
         <p:grpSpPr>
           <a:xfrm>
-            <a:off x="10484080" y="2317350"/>
+            <a:off x="10445335" y="2193365"/>
             <a:ext cx="1636154" cy="935497"/>
             <a:chOff x="2429486" y="2331405"/>
             <a:chExt cx="1636154" cy="935497"/>
@@ -5386,7 +5849,7 @@
         </p:nvGrpSpPr>
         <p:grpSpPr>
           <a:xfrm>
-            <a:off x="7074976" y="3314329"/>
+            <a:off x="7183462" y="3236839"/>
             <a:ext cx="1715551" cy="875673"/>
             <a:chOff x="2350089" y="2102063"/>
             <a:chExt cx="1715551" cy="875673"/>
@@ -5554,192 +6017,6 @@
 </p:sld>
 </file>
 
-<file path=ppt/slides/slide7.xml><?xml version="1.0" encoding="utf-8"?>
-<p:sld xmlns:a="http://schemas.openxmlformats.org/drawingml/2006/main" xmlns:r="http://schemas.openxmlformats.org/officeDocument/2006/relationships" xmlns:p="http://schemas.openxmlformats.org/presentationml/2006/main">
-  <p:cSld>
-    <p:spTree>
-      <p:nvGrpSpPr>
-        <p:cNvPr id="1" name=""/>
-        <p:cNvGrpSpPr/>
-        <p:nvPr/>
-      </p:nvGrpSpPr>
-      <p:grpSpPr>
-        <a:xfrm>
-          <a:off x="0" y="0"/>
-          <a:ext cx="0" cy="0"/>
-          <a:chOff x="0" y="0"/>
-          <a:chExt cx="0" cy="0"/>
-        </a:xfrm>
-      </p:grpSpPr>
-      <p:sp>
-        <p:nvSpPr>
-          <p:cNvPr id="2" name="Title 1">
-            <a:extLst>
-              <a:ext uri="{FF2B5EF4-FFF2-40B4-BE49-F238E27FC236}">
-                <a16:creationId xmlns:a16="http://schemas.microsoft.com/office/drawing/2014/main" id="{F6A82A7B-B0FE-4127-B624-3952B2B373CF}"/>
-              </a:ext>
-            </a:extLst>
-          </p:cNvPr>
-          <p:cNvSpPr>
-            <a:spLocks noGrp="1"/>
-          </p:cNvSpPr>
-          <p:nvPr>
-            <p:ph type="title"/>
-          </p:nvPr>
-        </p:nvSpPr>
-        <p:spPr/>
-        <p:txBody>
-          <a:bodyPr>
-            <a:normAutofit/>
-          </a:bodyPr>
-          <a:lstStyle/>
-          <a:p>
-            <a:r>
-              <a:rPr lang="en-SG" sz="2400" dirty="0"/>
-              <a:t>State contracts and state funded test are key driver of SAT participation rate in Colorado, Illinois and Rhode Island in 2018.</a:t>
-            </a:r>
-          </a:p>
-        </p:txBody>
-      </p:sp>
-      <p:sp>
-        <p:nvSpPr>
-          <p:cNvPr id="3" name="Content Placeholder 2">
-            <a:extLst>
-              <a:ext uri="{FF2B5EF4-FFF2-40B4-BE49-F238E27FC236}">
-                <a16:creationId xmlns:a16="http://schemas.microsoft.com/office/drawing/2014/main" id="{945D4FA7-6B59-49E8-A66F-C1598F864DFD}"/>
-              </a:ext>
-            </a:extLst>
-          </p:cNvPr>
-          <p:cNvSpPr>
-            <a:spLocks noGrp="1"/>
-          </p:cNvSpPr>
-          <p:nvPr>
-            <p:ph idx="1"/>
-          </p:nvPr>
-        </p:nvSpPr>
-        <p:spPr>
-          <a:xfrm>
-            <a:off x="1201118" y="2108201"/>
-            <a:ext cx="9954561" cy="3760891"/>
-          </a:xfrm>
-        </p:spPr>
-        <p:txBody>
-          <a:bodyPr>
-            <a:normAutofit/>
-          </a:bodyPr>
-          <a:lstStyle/>
-          <a:p>
-            <a:pPr>
-              <a:buClr>
-                <a:schemeClr val="tx1">
-                  <a:lumMod val="75000"/>
-                  <a:lumOff val="25000"/>
-                </a:schemeClr>
-              </a:buClr>
-              <a:buFont typeface="Arial" panose="020B0604020202020204" pitchFamily="34" charset="0"/>
-              <a:buChar char="•"/>
-            </a:pPr>
-            <a:r>
-              <a:rPr lang="en-US" sz="1600" dirty="0"/>
-              <a:t>In 2017-2018, 10 states (Colorado, Connecticut, Delaware, Idaho, Illinois, Maine, Michigan, New Hampshire, Rhode Island, and West Virginia) and the District of Columbia covered the cost of the SAT for all their public school students. </a:t>
-            </a:r>
-          </a:p>
-          <a:p>
-            <a:pPr>
-              <a:buClr>
-                <a:schemeClr val="tx1">
-                  <a:lumMod val="75000"/>
-                  <a:lumOff val="25000"/>
-                </a:schemeClr>
-              </a:buClr>
-              <a:buFont typeface="Arial" panose="020B0604020202020204" pitchFamily="34" charset="0"/>
-              <a:buChar char="•"/>
-            </a:pPr>
-            <a:r>
-              <a:rPr lang="en-US" sz="1600" dirty="0"/>
-              <a:t>Three years prior to that, only three states and the District of Columbia did so.</a:t>
-            </a:r>
-            <a:endParaRPr lang="en-SG" sz="1800" dirty="0"/>
-          </a:p>
-        </p:txBody>
-      </p:sp>
-      <p:sp>
-        <p:nvSpPr>
-          <p:cNvPr id="4" name="TextBox 3">
-            <a:extLst>
-              <a:ext uri="{FF2B5EF4-FFF2-40B4-BE49-F238E27FC236}">
-                <a16:creationId xmlns:a16="http://schemas.microsoft.com/office/drawing/2014/main" id="{1655C586-156D-473D-95E5-7EC83B6A91F1}"/>
-              </a:ext>
-            </a:extLst>
-          </p:cNvPr>
-          <p:cNvSpPr txBox="1"/>
-          <p:nvPr/>
-        </p:nvSpPr>
-        <p:spPr>
-          <a:xfrm>
-            <a:off x="1201118" y="5414629"/>
-            <a:ext cx="7435049" cy="769441"/>
-          </a:xfrm>
-          <a:prstGeom prst="rect">
-            <a:avLst/>
-          </a:prstGeom>
-          <a:noFill/>
-        </p:spPr>
-        <p:txBody>
-          <a:bodyPr wrap="none" rtlCol="0">
-            <a:spAutoFit/>
-          </a:bodyPr>
-          <a:lstStyle/>
-          <a:p>
-            <a:r>
-              <a:rPr lang="en-SG" sz="1100" dirty="0"/>
-              <a:t>Source:</a:t>
-            </a:r>
-          </a:p>
-          <a:p>
-            <a:r>
-              <a:rPr lang="en-SG" sz="1100" dirty="0">
-                <a:hlinkClick r:id="rId2"/>
-              </a:rPr>
-              <a:t>https://www.edweek.org/ew/articles/2018/10/31/sat-scores-rise-as-number-of-test-takers.html</a:t>
-            </a:r>
-            <a:endParaRPr lang="en-SG" sz="1100" dirty="0"/>
-          </a:p>
-          <a:p>
-            <a:r>
-              <a:rPr lang="en-SG" sz="1100" dirty="0">
-                <a:hlinkClick r:id="rId3"/>
-              </a:rPr>
-              <a:t>https://www.chicagotribune.com/news/ct-illinois-chooses-sat-met-20160211-story.html</a:t>
-            </a:r>
-            <a:endParaRPr lang="en-SG" sz="1100" dirty="0"/>
-          </a:p>
-          <a:p>
-            <a:r>
-              <a:rPr lang="en-SG" sz="1100" dirty="0">
-                <a:hlinkClick r:id="rId4"/>
-              </a:rPr>
-              <a:t>https://co.chalkbeat.org/2015/12/23/21092477/goodbye-act-hello-sat-a-significant-change-for-colorado-high-schoolers</a:t>
-            </a:r>
-            <a:endParaRPr lang="en-SG" sz="1100" dirty="0">
-              <a:hlinkClick r:id="rId3"/>
-            </a:endParaRPr>
-          </a:p>
-        </p:txBody>
-      </p:sp>
-    </p:spTree>
-    <p:extLst>
-      <p:ext uri="{BB962C8B-B14F-4D97-AF65-F5344CB8AC3E}">
-        <p14:creationId xmlns:p14="http://schemas.microsoft.com/office/powerpoint/2010/main" val="1598755457"/>
-      </p:ext>
-    </p:extLst>
-  </p:cSld>
-  <p:clrMapOvr>
-    <a:masterClrMapping/>
-  </p:clrMapOvr>
-</p:sld>
-</file>
-
 <file path=ppt/slides/slide8.xml><?xml version="1.0" encoding="utf-8"?>
 <p:sld xmlns:a="http://schemas.openxmlformats.org/drawingml/2006/main" xmlns:r="http://schemas.openxmlformats.org/officeDocument/2006/relationships" xmlns:p="http://schemas.openxmlformats.org/presentationml/2006/main">
   <p:cSld>
@@ -5762,7 +6039,7 @@
           <p:cNvPr id="2" name="Title 1">
             <a:extLst>
               <a:ext uri="{FF2B5EF4-FFF2-40B4-BE49-F238E27FC236}">
-                <a16:creationId xmlns:a16="http://schemas.microsoft.com/office/drawing/2014/main" id="{9A3BFCF1-5B4C-4F2A-A4F9-500BA344B9B4}"/>
+                <a16:creationId xmlns:a16="http://schemas.microsoft.com/office/drawing/2014/main" id="{A0B4BA6F-6C08-4C54-AF18-2E7C52AEE0BB}"/>
               </a:ext>
             </a:extLst>
           </p:cNvPr>
@@ -5773,7 +6050,12 @@
             <p:ph type="title"/>
           </p:nvPr>
         </p:nvSpPr>
-        <p:spPr/>
+        <p:spPr>
+          <a:xfrm>
+            <a:off x="1097279" y="286603"/>
+            <a:ext cx="10345303" cy="1450757"/>
+          </a:xfrm>
+        </p:spPr>
         <p:txBody>
           <a:bodyPr>
             <a:normAutofit/>
@@ -5781,18 +6063,179 @@
           <a:lstStyle/>
           <a:p>
             <a:r>
-              <a:rPr lang="en-SG" sz="2800" dirty="0"/>
-              <a:t>Conclusion &amp; Recommendation</a:t>
-            </a:r>
-          </a:p>
-        </p:txBody>
-      </p:sp>
-      <p:sp>
-        <p:nvSpPr>
-          <p:cNvPr id="4" name="TextBox 3">
+              <a:rPr lang="en-SG" sz="2400" dirty="0">
+                <a:solidFill>
+                  <a:srgbClr val="339933"/>
+                </a:solidFill>
+              </a:rPr>
+              <a:t>State contracts </a:t>
+            </a:r>
+            <a:r>
+              <a:rPr lang="en-SG" sz="2400" dirty="0"/>
+              <a:t>and </a:t>
+            </a:r>
+            <a:r>
+              <a:rPr lang="en-SG" sz="2400" dirty="0">
+                <a:solidFill>
+                  <a:srgbClr val="339933"/>
+                </a:solidFill>
+              </a:rPr>
+              <a:t>state funded test </a:t>
+            </a:r>
+            <a:r>
+              <a:rPr lang="en-SG" sz="2400" dirty="0"/>
+              <a:t>are key driver of SAT participation rate in Colorado, Illinois and Rhode Island in 2018.</a:t>
+            </a:r>
+          </a:p>
+        </p:txBody>
+      </p:sp>
+      <p:sp>
+        <p:nvSpPr>
+          <p:cNvPr id="3" name="Content Placeholder 2">
             <a:extLst>
               <a:ext uri="{FF2B5EF4-FFF2-40B4-BE49-F238E27FC236}">
-                <a16:creationId xmlns:a16="http://schemas.microsoft.com/office/drawing/2014/main" id="{0A89C934-15A6-4391-B8B3-52FF6FBF07E6}"/>
+                <a16:creationId xmlns:a16="http://schemas.microsoft.com/office/drawing/2014/main" id="{35398530-8476-4157-A4C9-1670A41D9635}"/>
+              </a:ext>
+            </a:extLst>
+          </p:cNvPr>
+          <p:cNvSpPr>
+            <a:spLocks noGrp="1"/>
+          </p:cNvSpPr>
+          <p:nvPr>
+            <p:ph idx="1"/>
+          </p:nvPr>
+        </p:nvSpPr>
+        <p:spPr>
+          <a:xfrm>
+            <a:off x="1216404" y="2108201"/>
+            <a:ext cx="9939276" cy="3760891"/>
+          </a:xfrm>
+        </p:spPr>
+        <p:txBody>
+          <a:bodyPr>
+            <a:normAutofit/>
+          </a:bodyPr>
+          <a:lstStyle/>
+          <a:p>
+            <a:pPr marL="0" indent="0">
+              <a:lnSpc>
+                <a:spcPct val="90000"/>
+              </a:lnSpc>
+              <a:spcBef>
+                <a:spcPct val="0"/>
+              </a:spcBef>
+              <a:buNone/>
+            </a:pPr>
+            <a:endParaRPr lang="en-SG" sz="1600" spc="-50" dirty="0">
+              <a:latin typeface="Arial" panose="020B0604020202020204" pitchFamily="34" charset="0"/>
+              <a:ea typeface="+mj-ea"/>
+              <a:cs typeface="Arial" panose="020B0604020202020204" pitchFamily="34" charset="0"/>
+            </a:endParaRPr>
+          </a:p>
+          <a:p>
+            <a:pPr marL="342900" indent="-342900">
+              <a:lnSpc>
+                <a:spcPct val="90000"/>
+              </a:lnSpc>
+              <a:spcBef>
+                <a:spcPct val="0"/>
+              </a:spcBef>
+              <a:buClrTx/>
+              <a:buFont typeface="Arial" panose="020B0604020202020204" pitchFamily="34" charset="0"/>
+              <a:buChar char="•"/>
+            </a:pPr>
+            <a:r>
+              <a:rPr lang="en-US" sz="1600" spc="-50" dirty="0">
+                <a:latin typeface="Arial" panose="020B0604020202020204" pitchFamily="34" charset="0"/>
+                <a:ea typeface="+mj-ea"/>
+                <a:cs typeface="Arial" panose="020B0604020202020204" pitchFamily="34" charset="0"/>
+              </a:rPr>
+              <a:t>In 2017-2018, 10 states (Colorado, Connecticut, Delaware, Idaho, Illinois, Maine, Michigan, New Hampshire, Rhode Island, and West Virginia) and the District of Columbia covered the cost of the SAT for all their public school students. </a:t>
+            </a:r>
+          </a:p>
+          <a:p>
+            <a:pPr marL="0" indent="0">
+              <a:lnSpc>
+                <a:spcPct val="90000"/>
+              </a:lnSpc>
+              <a:spcBef>
+                <a:spcPct val="0"/>
+              </a:spcBef>
+              <a:buClrTx/>
+              <a:buNone/>
+            </a:pPr>
+            <a:endParaRPr lang="en-SG" sz="1600" spc="-50" dirty="0">
+              <a:latin typeface="Arial" panose="020B0604020202020204" pitchFamily="34" charset="0"/>
+              <a:ea typeface="+mj-ea"/>
+              <a:cs typeface="Arial" panose="020B0604020202020204" pitchFamily="34" charset="0"/>
+            </a:endParaRPr>
+          </a:p>
+          <a:p>
+            <a:pPr marL="342900" indent="-342900">
+              <a:lnSpc>
+                <a:spcPct val="90000"/>
+              </a:lnSpc>
+              <a:spcBef>
+                <a:spcPct val="0"/>
+              </a:spcBef>
+              <a:buClrTx/>
+              <a:buFont typeface="Arial" panose="020B0604020202020204" pitchFamily="34" charset="0"/>
+              <a:buChar char="•"/>
+            </a:pPr>
+            <a:r>
+              <a:rPr lang="en-SG" sz="1600" spc="-50" dirty="0">
+                <a:latin typeface="Arial" panose="020B0604020202020204" pitchFamily="34" charset="0"/>
+                <a:ea typeface="+mj-ea"/>
+                <a:cs typeface="Arial" panose="020B0604020202020204" pitchFamily="34" charset="0"/>
+              </a:rPr>
+              <a:t> </a:t>
+            </a:r>
+            <a:r>
+              <a:rPr lang="en-US" sz="1600" spc="-50" dirty="0">
+                <a:latin typeface="Arial" panose="020B0604020202020204" pitchFamily="34" charset="0"/>
+                <a:ea typeface="+mj-ea"/>
+                <a:cs typeface="Arial" panose="020B0604020202020204" pitchFamily="34" charset="0"/>
+              </a:rPr>
+              <a:t>Three years prior to that, only three states and the District of Columbia did so.</a:t>
+            </a:r>
+          </a:p>
+          <a:p>
+            <a:pPr marL="0" indent="0">
+              <a:buClrTx/>
+              <a:buNone/>
+            </a:pPr>
+            <a:endParaRPr lang="en-SG" sz="1800" dirty="0">
+              <a:latin typeface="Arial" panose="020B0604020202020204" pitchFamily="34" charset="0"/>
+              <a:cs typeface="Arial" panose="020B0604020202020204" pitchFamily="34" charset="0"/>
+            </a:endParaRPr>
+          </a:p>
+          <a:p>
+            <a:pPr marL="0" indent="0">
+              <a:buClrTx/>
+              <a:buNone/>
+            </a:pPr>
+            <a:endParaRPr lang="en-SG" sz="1800" dirty="0">
+              <a:latin typeface="Arial" panose="020B0604020202020204" pitchFamily="34" charset="0"/>
+              <a:cs typeface="Arial" panose="020B0604020202020204" pitchFamily="34" charset="0"/>
+            </a:endParaRPr>
+          </a:p>
+          <a:p>
+            <a:pPr marL="0" indent="0">
+              <a:buNone/>
+            </a:pPr>
+            <a:endParaRPr lang="en-SG" sz="1800" dirty="0">
+              <a:latin typeface="Arial" panose="020B0604020202020204" pitchFamily="34" charset="0"/>
+              <a:cs typeface="Arial" panose="020B0604020202020204" pitchFamily="34" charset="0"/>
+            </a:endParaRPr>
+          </a:p>
+        </p:txBody>
+      </p:sp>
+      <p:sp>
+        <p:nvSpPr>
+          <p:cNvPr id="5" name="TextBox 4">
+            <a:extLst>
+              <a:ext uri="{FF2B5EF4-FFF2-40B4-BE49-F238E27FC236}">
+                <a16:creationId xmlns:a16="http://schemas.microsoft.com/office/drawing/2014/main" id="{535917DC-F7AB-4045-9217-CCEE00210E5F}"/>
               </a:ext>
             </a:extLst>
           </p:cNvPr>
@@ -5801,8 +6244,8 @@
         </p:nvSpPr>
         <p:spPr>
           <a:xfrm>
-            <a:off x="1097280" y="5709097"/>
-            <a:ext cx="5756704" cy="430887"/>
+            <a:off x="1201118" y="5414629"/>
+            <a:ext cx="7516801" cy="1107996"/>
           </a:xfrm>
           <a:prstGeom prst="rect">
             <a:avLst/>
@@ -5816,343 +6259,399 @@
           <a:lstStyle/>
           <a:p>
             <a:r>
-              <a:rPr lang="en-SG" sz="1100" dirty="0"/>
+              <a:rPr lang="en-SG" sz="1100" dirty="0">
+                <a:latin typeface="Arial" panose="020B0604020202020204" pitchFamily="34" charset="0"/>
+                <a:cs typeface="Arial" panose="020B0604020202020204" pitchFamily="34" charset="0"/>
+              </a:rPr>
               <a:t>Source:</a:t>
             </a:r>
           </a:p>
           <a:p>
             <a:r>
               <a:rPr lang="en-SG" sz="1100" dirty="0">
+                <a:latin typeface="Arial" panose="020B0604020202020204" pitchFamily="34" charset="0"/>
+                <a:cs typeface="Arial" panose="020B0604020202020204" pitchFamily="34" charset="0"/>
                 <a:hlinkClick r:id="rId2"/>
               </a:rPr>
+              <a:t>https://www.edweek.org/ew/articles/2018/10/31/sat-scores-rise-as-number-of-test-takers.html</a:t>
+            </a:r>
+            <a:endParaRPr lang="en-SG" sz="1100" dirty="0">
+              <a:latin typeface="Arial" panose="020B0604020202020204" pitchFamily="34" charset="0"/>
+              <a:cs typeface="Arial" panose="020B0604020202020204" pitchFamily="34" charset="0"/>
+            </a:endParaRPr>
+          </a:p>
+          <a:p>
+            <a:r>
+              <a:rPr lang="en-SG" sz="1100" dirty="0">
+                <a:latin typeface="Arial" panose="020B0604020202020204" pitchFamily="34" charset="0"/>
+                <a:cs typeface="Arial" panose="020B0604020202020204" pitchFamily="34" charset="0"/>
+                <a:hlinkClick r:id="rId3"/>
+              </a:rPr>
+              <a:t>https://www.chicagotribune.com/news/ct-illinois-chooses-sat-met-20160211-story.html</a:t>
+            </a:r>
+            <a:endParaRPr lang="en-SG" sz="1100" dirty="0">
+              <a:latin typeface="Arial" panose="020B0604020202020204" pitchFamily="34" charset="0"/>
+              <a:cs typeface="Arial" panose="020B0604020202020204" pitchFamily="34" charset="0"/>
+            </a:endParaRPr>
+          </a:p>
+          <a:p>
+            <a:r>
+              <a:rPr lang="en-SG" sz="1100" dirty="0">
+                <a:latin typeface="Arial" panose="020B0604020202020204" pitchFamily="34" charset="0"/>
+                <a:cs typeface="Arial" panose="020B0604020202020204" pitchFamily="34" charset="0"/>
+                <a:hlinkClick r:id="rId4"/>
+              </a:rPr>
+              <a:t>https://co.chalkbeat.org/2015/12/23/21092477/goodbye-act-hello-sat-a-significant-change-for-colorado-high-schoolers</a:t>
+            </a:r>
+            <a:endParaRPr lang="en-SG" sz="1100" dirty="0">
+              <a:latin typeface="Arial" panose="020B0604020202020204" pitchFamily="34" charset="0"/>
+              <a:cs typeface="Arial" panose="020B0604020202020204" pitchFamily="34" charset="0"/>
+            </a:endParaRPr>
+          </a:p>
+          <a:p>
+            <a:r>
+              <a:rPr lang="en-SG" sz="1100" dirty="0">
+                <a:latin typeface="Arial" panose="020B0604020202020204" pitchFamily="34" charset="0"/>
+                <a:cs typeface="Arial" panose="020B0604020202020204" pitchFamily="34" charset="0"/>
+                <a:hlinkClick r:id="rId5"/>
+              </a:rPr>
               <a:t>https://www.edweek.org/ew/section/multimedia/states-require-students-take-sat-or-act.html</a:t>
             </a:r>
+            <a:endParaRPr lang="en-SG" sz="1100" dirty="0">
+              <a:latin typeface="Arial" panose="020B0604020202020204" pitchFamily="34" charset="0"/>
+              <a:cs typeface="Arial" panose="020B0604020202020204" pitchFamily="34" charset="0"/>
+              <a:hlinkClick r:id="rId3"/>
+            </a:endParaRPr>
+          </a:p>
+          <a:p>
             <a:endParaRPr lang="en-SG" sz="1100" dirty="0">
               <a:hlinkClick r:id="rId3"/>
             </a:endParaRPr>
           </a:p>
         </p:txBody>
       </p:sp>
-      <p:sp>
-        <p:nvSpPr>
-          <p:cNvPr id="5" name="Content Placeholder 2">
+    </p:spTree>
+    <p:extLst>
+      <p:ext uri="{BB962C8B-B14F-4D97-AF65-F5344CB8AC3E}">
+        <p14:creationId xmlns:p14="http://schemas.microsoft.com/office/powerpoint/2010/main" val="3443089902"/>
+      </p:ext>
+    </p:extLst>
+  </p:cSld>
+  <p:clrMapOvr>
+    <a:masterClrMapping/>
+  </p:clrMapOvr>
+</p:sld>
+</file>
+
+<file path=ppt/slides/slide9.xml><?xml version="1.0" encoding="utf-8"?>
+<p:sld xmlns:a="http://schemas.openxmlformats.org/drawingml/2006/main" xmlns:r="http://schemas.openxmlformats.org/officeDocument/2006/relationships" xmlns:p="http://schemas.openxmlformats.org/presentationml/2006/main">
+  <p:cSld>
+    <p:spTree>
+      <p:nvGrpSpPr>
+        <p:cNvPr id="1" name=""/>
+        <p:cNvGrpSpPr/>
+        <p:nvPr/>
+      </p:nvGrpSpPr>
+      <p:grpSpPr>
+        <a:xfrm>
+          <a:off x="0" y="0"/>
+          <a:ext cx="0" cy="0"/>
+          <a:chOff x="0" y="0"/>
+          <a:chExt cx="0" cy="0"/>
+        </a:xfrm>
+      </p:grpSpPr>
+      <p:sp>
+        <p:nvSpPr>
+          <p:cNvPr id="2" name="Title 1">
             <a:extLst>
               <a:ext uri="{FF2B5EF4-FFF2-40B4-BE49-F238E27FC236}">
-                <a16:creationId xmlns:a16="http://schemas.microsoft.com/office/drawing/2014/main" id="{38077FE2-83F0-4827-9870-317EB89CD78F}"/>
+                <a16:creationId xmlns:a16="http://schemas.microsoft.com/office/drawing/2014/main" id="{A0B4BA6F-6C08-4C54-AF18-2E7C52AEE0BB}"/>
               </a:ext>
             </a:extLst>
           </p:cNvPr>
-          <p:cNvSpPr txBox="1">
-            <a:spLocks/>
-          </p:cNvSpPr>
-          <p:nvPr/>
-        </p:nvSpPr>
-        <p:spPr>
-          <a:xfrm>
-            <a:off x="1201118" y="2108201"/>
-            <a:ext cx="9954561" cy="3760891"/>
-          </a:xfrm>
-          <a:prstGeom prst="rect">
-            <a:avLst/>
-          </a:prstGeom>
-        </p:spPr>
+          <p:cNvSpPr>
+            <a:spLocks noGrp="1"/>
+          </p:cNvSpPr>
+          <p:nvPr>
+            <p:ph type="title"/>
+          </p:nvPr>
+        </p:nvSpPr>
+        <p:spPr/>
         <p:txBody>
           <a:bodyPr>
             <a:normAutofit/>
           </a:bodyPr>
-          <a:lstStyle>
-            <a:lvl1pPr marL="91440" indent="-91440" algn="l" defTabSz="914400" rtl="0" eaLnBrk="1" latinLnBrk="0" hangingPunct="1">
-              <a:lnSpc>
-                <a:spcPct val="110000"/>
-              </a:lnSpc>
-              <a:spcBef>
-                <a:spcPts val="1200"/>
-              </a:spcBef>
-              <a:spcAft>
-                <a:spcPts val="200"/>
-              </a:spcAft>
-              <a:buClr>
-                <a:schemeClr val="accent1"/>
-              </a:buClr>
-              <a:buSzPct val="100000"/>
-              <a:buFont typeface="Calibri" panose="020F0502020204030204" pitchFamily="34" charset="0"/>
-              <a:buChar char=" "/>
-              <a:defRPr sz="1900" kern="1200">
-                <a:solidFill>
-                  <a:schemeClr val="tx1">
-                    <a:lumMod val="75000"/>
-                    <a:lumOff val="25000"/>
-                  </a:schemeClr>
-                </a:solidFill>
-                <a:latin typeface="+mn-lt"/>
-                <a:ea typeface="+mn-ea"/>
-                <a:cs typeface="+mn-cs"/>
-              </a:defRPr>
-            </a:lvl1pPr>
-            <a:lvl2pPr marL="384048" indent="-182880" algn="l" defTabSz="914400" rtl="0" eaLnBrk="1" latinLnBrk="0" hangingPunct="1">
-              <a:lnSpc>
-                <a:spcPct val="100000"/>
-              </a:lnSpc>
-              <a:spcBef>
-                <a:spcPts val="200"/>
-              </a:spcBef>
-              <a:spcAft>
-                <a:spcPts val="400"/>
-              </a:spcAft>
-              <a:buClrTx/>
-              <a:buFont typeface="Calibri" pitchFamily="34" charset="0"/>
-              <a:buChar char="◦"/>
-              <a:defRPr sz="1700" kern="1200">
-                <a:solidFill>
-                  <a:schemeClr val="tx1">
-                    <a:lumMod val="75000"/>
-                    <a:lumOff val="25000"/>
-                  </a:schemeClr>
-                </a:solidFill>
-                <a:latin typeface="+mn-lt"/>
-                <a:ea typeface="+mn-ea"/>
-                <a:cs typeface="+mn-cs"/>
-              </a:defRPr>
-            </a:lvl2pPr>
-            <a:lvl3pPr marL="566928" indent="-182880" algn="l" defTabSz="914400" rtl="0" eaLnBrk="1" latinLnBrk="0" hangingPunct="1">
-              <a:lnSpc>
-                <a:spcPct val="100000"/>
-              </a:lnSpc>
-              <a:spcBef>
-                <a:spcPts val="200"/>
-              </a:spcBef>
-              <a:spcAft>
-                <a:spcPts val="400"/>
-              </a:spcAft>
-              <a:buClrTx/>
-              <a:buFont typeface="Calibri" pitchFamily="34" charset="0"/>
-              <a:buChar char="◦"/>
-              <a:defRPr sz="1300" kern="1200">
-                <a:solidFill>
-                  <a:schemeClr val="tx1">
-                    <a:lumMod val="75000"/>
-                    <a:lumOff val="25000"/>
-                  </a:schemeClr>
-                </a:solidFill>
-                <a:latin typeface="+mn-lt"/>
-                <a:ea typeface="+mn-ea"/>
-                <a:cs typeface="+mn-cs"/>
-              </a:defRPr>
-            </a:lvl3pPr>
-            <a:lvl4pPr marL="749808" indent="-182880" algn="l" defTabSz="914400" rtl="0" eaLnBrk="1" latinLnBrk="0" hangingPunct="1">
-              <a:lnSpc>
-                <a:spcPct val="100000"/>
-              </a:lnSpc>
-              <a:spcBef>
-                <a:spcPts val="200"/>
-              </a:spcBef>
-              <a:spcAft>
-                <a:spcPts val="400"/>
-              </a:spcAft>
-              <a:buClrTx/>
-              <a:buFont typeface="Calibri" pitchFamily="34" charset="0"/>
-              <a:buChar char="◦"/>
-              <a:defRPr sz="1300" kern="1200">
-                <a:solidFill>
-                  <a:schemeClr val="tx1">
-                    <a:lumMod val="75000"/>
-                    <a:lumOff val="25000"/>
-                  </a:schemeClr>
-                </a:solidFill>
-                <a:latin typeface="+mn-lt"/>
-                <a:ea typeface="+mn-ea"/>
-                <a:cs typeface="+mn-cs"/>
-              </a:defRPr>
-            </a:lvl4pPr>
-            <a:lvl5pPr marL="932688" indent="-182880" algn="l" defTabSz="914400" rtl="0" eaLnBrk="1" latinLnBrk="0" hangingPunct="1">
-              <a:lnSpc>
-                <a:spcPct val="100000"/>
-              </a:lnSpc>
-              <a:spcBef>
-                <a:spcPts val="200"/>
-              </a:spcBef>
-              <a:spcAft>
-                <a:spcPts val="400"/>
-              </a:spcAft>
-              <a:buClrTx/>
-              <a:buFont typeface="Calibri" pitchFamily="34" charset="0"/>
-              <a:buChar char="◦"/>
-              <a:defRPr sz="1300" kern="1200">
-                <a:solidFill>
-                  <a:schemeClr val="tx1">
-                    <a:lumMod val="75000"/>
-                    <a:lumOff val="25000"/>
-                  </a:schemeClr>
-                </a:solidFill>
-                <a:latin typeface="+mn-lt"/>
-                <a:ea typeface="+mn-ea"/>
-                <a:cs typeface="+mn-cs"/>
-              </a:defRPr>
-            </a:lvl5pPr>
-            <a:lvl6pPr marL="1100000" indent="-228600" algn="l" defTabSz="914400" rtl="0" eaLnBrk="1" latinLnBrk="0" hangingPunct="1">
+          <a:lstStyle/>
+          <a:p>
+            <a:r>
+              <a:rPr lang="en-SG" sz="3200" dirty="0"/>
+              <a:t>Conclusion &amp; Recommendation</a:t>
+            </a:r>
+          </a:p>
+        </p:txBody>
+      </p:sp>
+      <p:sp>
+        <p:nvSpPr>
+          <p:cNvPr id="3" name="Content Placeholder 2">
+            <a:extLst>
+              <a:ext uri="{FF2B5EF4-FFF2-40B4-BE49-F238E27FC236}">
+                <a16:creationId xmlns:a16="http://schemas.microsoft.com/office/drawing/2014/main" id="{35398530-8476-4157-A4C9-1670A41D9635}"/>
+              </a:ext>
+            </a:extLst>
+          </p:cNvPr>
+          <p:cNvSpPr>
+            <a:spLocks noGrp="1"/>
+          </p:cNvSpPr>
+          <p:nvPr>
+            <p:ph idx="1"/>
+          </p:nvPr>
+        </p:nvSpPr>
+        <p:spPr>
+          <a:xfrm>
+            <a:off x="1216404" y="2108201"/>
+            <a:ext cx="9939276" cy="3760891"/>
+          </a:xfrm>
+        </p:spPr>
+        <p:txBody>
+          <a:bodyPr>
+            <a:normAutofit/>
+          </a:bodyPr>
+          <a:lstStyle/>
+          <a:p>
+            <a:pPr marL="0" indent="0">
               <a:lnSpc>
                 <a:spcPct val="90000"/>
               </a:lnSpc>
               <a:spcBef>
-                <a:spcPts val="200"/>
+                <a:spcPct val="0"/>
               </a:spcBef>
-              <a:spcAft>
-                <a:spcPts val="400"/>
-              </a:spcAft>
-              <a:buClr>
-                <a:schemeClr val="accent1"/>
-              </a:buClr>
-              <a:buFont typeface="Calibri" pitchFamily="34" charset="0"/>
-              <a:buChar char="◦"/>
-              <a:defRPr sz="1400" kern="1200">
-                <a:solidFill>
-                  <a:schemeClr val="tx1">
-                    <a:lumMod val="75000"/>
-                    <a:lumOff val="25000"/>
-                  </a:schemeClr>
-                </a:solidFill>
-                <a:latin typeface="+mn-lt"/>
-                <a:ea typeface="+mn-ea"/>
-                <a:cs typeface="+mn-cs"/>
-              </a:defRPr>
-            </a:lvl6pPr>
-            <a:lvl7pPr marL="1300000" indent="-228600" algn="l" defTabSz="914400" rtl="0" eaLnBrk="1" latinLnBrk="0" hangingPunct="1">
+              <a:buNone/>
+            </a:pPr>
+            <a:endParaRPr lang="en-SG" sz="1600" spc="-50" dirty="0">
+              <a:latin typeface="Arial" panose="020B0604020202020204" pitchFamily="34" charset="0"/>
+              <a:ea typeface="+mj-ea"/>
+              <a:cs typeface="Arial" panose="020B0604020202020204" pitchFamily="34" charset="0"/>
+            </a:endParaRPr>
+          </a:p>
+          <a:p>
+            <a:pPr marL="342900" indent="-342900">
               <a:lnSpc>
                 <a:spcPct val="90000"/>
               </a:lnSpc>
               <a:spcBef>
-                <a:spcPts val="200"/>
+                <a:spcPct val="0"/>
               </a:spcBef>
-              <a:spcAft>
-                <a:spcPts val="400"/>
-              </a:spcAft>
-              <a:buClr>
-                <a:schemeClr val="accent1"/>
-              </a:buClr>
-              <a:buFont typeface="Calibri" pitchFamily="34" charset="0"/>
-              <a:buChar char="◦"/>
-              <a:defRPr sz="1400" kern="1200">
-                <a:solidFill>
-                  <a:schemeClr val="tx1">
-                    <a:lumMod val="75000"/>
-                    <a:lumOff val="25000"/>
-                  </a:schemeClr>
-                </a:solidFill>
-                <a:latin typeface="+mn-lt"/>
-                <a:ea typeface="+mn-ea"/>
-                <a:cs typeface="+mn-cs"/>
-              </a:defRPr>
-            </a:lvl7pPr>
-            <a:lvl8pPr marL="1500000" indent="-228600" algn="l" defTabSz="914400" rtl="0" eaLnBrk="1" latinLnBrk="0" hangingPunct="1">
+              <a:buClrTx/>
+              <a:buFont typeface="Arial" panose="020B0604020202020204" pitchFamily="34" charset="0"/>
+              <a:buChar char="•"/>
+            </a:pPr>
+            <a:r>
+              <a:rPr lang="en-SG" sz="1600" spc="-50" dirty="0">
+                <a:latin typeface="Arial" panose="020B0604020202020204" pitchFamily="34" charset="0"/>
+                <a:ea typeface="+mj-ea"/>
+                <a:cs typeface="Arial" panose="020B0604020202020204" pitchFamily="34" charset="0"/>
+              </a:rPr>
+              <a:t>State </a:t>
+            </a:r>
+            <a:r>
+              <a:rPr lang="en-US" sz="1600" dirty="0">
+                <a:latin typeface="Arial" panose="020B0604020202020204" pitchFamily="34" charset="0"/>
+                <a:cs typeface="Arial" panose="020B0604020202020204" pitchFamily="34" charset="0"/>
+              </a:rPr>
+              <a:t>contracts and state funded test are key drivers to SAT participation. </a:t>
+            </a:r>
+          </a:p>
+          <a:p>
+            <a:pPr marL="342900" indent="-342900">
               <a:lnSpc>
                 <a:spcPct val="90000"/>
               </a:lnSpc>
               <a:spcBef>
-                <a:spcPts val="200"/>
+                <a:spcPct val="0"/>
               </a:spcBef>
-              <a:spcAft>
-                <a:spcPts val="400"/>
-              </a:spcAft>
-              <a:buClr>
-                <a:schemeClr val="accent1"/>
-              </a:buClr>
-              <a:buFont typeface="Calibri" pitchFamily="34" charset="0"/>
-              <a:buChar char="◦"/>
-              <a:defRPr sz="1400" kern="1200">
-                <a:solidFill>
-                  <a:schemeClr val="tx1">
-                    <a:lumMod val="75000"/>
-                    <a:lumOff val="25000"/>
-                  </a:schemeClr>
-                </a:solidFill>
-                <a:latin typeface="+mn-lt"/>
-                <a:ea typeface="+mn-ea"/>
-                <a:cs typeface="+mn-cs"/>
-              </a:defRPr>
-            </a:lvl8pPr>
-            <a:lvl9pPr marL="1700000" indent="-228600" algn="l" defTabSz="914400" rtl="0" eaLnBrk="1" latinLnBrk="0" hangingPunct="1">
+              <a:buClrTx/>
+              <a:buFont typeface="Arial" panose="020B0604020202020204" pitchFamily="34" charset="0"/>
+              <a:buChar char="•"/>
+            </a:pPr>
+            <a:endParaRPr lang="en-SG" sz="1600" spc="-50" dirty="0">
+              <a:latin typeface="Arial" panose="020B0604020202020204" pitchFamily="34" charset="0"/>
+              <a:ea typeface="+mj-ea"/>
+              <a:cs typeface="Arial" panose="020B0604020202020204" pitchFamily="34" charset="0"/>
+            </a:endParaRPr>
+          </a:p>
+          <a:p>
+            <a:pPr marL="342900" indent="-342900">
               <a:lnSpc>
                 <a:spcPct val="90000"/>
               </a:lnSpc>
               <a:spcBef>
-                <a:spcPts val="200"/>
+                <a:spcPct val="0"/>
               </a:spcBef>
-              <a:spcAft>
-                <a:spcPts val="400"/>
-              </a:spcAft>
-              <a:buClr>
-                <a:schemeClr val="accent1"/>
-              </a:buClr>
-              <a:buFont typeface="Calibri" pitchFamily="34" charset="0"/>
-              <a:buChar char="◦"/>
-              <a:defRPr sz="1400" kern="1200">
-                <a:solidFill>
-                  <a:schemeClr val="tx1">
-                    <a:lumMod val="75000"/>
-                    <a:lumOff val="25000"/>
-                  </a:schemeClr>
-                </a:solidFill>
-                <a:latin typeface="+mn-lt"/>
-                <a:ea typeface="+mn-ea"/>
-                <a:cs typeface="+mn-cs"/>
-              </a:defRPr>
-            </a:lvl9pPr>
-          </a:lstStyle>
-          <a:p>
-            <a:pPr>
-              <a:buClr>
-                <a:schemeClr val="tx1">
-                  <a:lumMod val="75000"/>
-                  <a:lumOff val="25000"/>
-                </a:schemeClr>
-              </a:buClr>
+              <a:buClrTx/>
               <a:buFont typeface="Arial" panose="020B0604020202020204" pitchFamily="34" charset="0"/>
               <a:buChar char="•"/>
             </a:pPr>
             <a:r>
-              <a:rPr lang="en-US" sz="1600" dirty="0"/>
-              <a:t>State contracts and state funded test are key drivers to SAT participation. </a:t>
-            </a:r>
-          </a:p>
-          <a:p>
-            <a:pPr>
-              <a:buClr>
-                <a:schemeClr val="tx1">
-                  <a:lumMod val="75000"/>
-                  <a:lumOff val="25000"/>
-                </a:schemeClr>
-              </a:buClr>
+              <a:rPr lang="en-SG" sz="1600" spc="-50" dirty="0">
+                <a:latin typeface="Arial" panose="020B0604020202020204" pitchFamily="34" charset="0"/>
+                <a:ea typeface="+mj-ea"/>
+                <a:cs typeface="Arial" panose="020B0604020202020204" pitchFamily="34" charset="0"/>
+              </a:rPr>
+              <a:t>It is </a:t>
+            </a:r>
+            <a:r>
+              <a:rPr lang="en-US" sz="1600" dirty="0">
+                <a:latin typeface="Arial" panose="020B0604020202020204" pitchFamily="34" charset="0"/>
+                <a:cs typeface="Arial" panose="020B0604020202020204" pitchFamily="34" charset="0"/>
+              </a:rPr>
+              <a:t>recommended that the College Board focuses on developing </a:t>
+            </a:r>
+            <a:r>
+              <a:rPr lang="en-US" sz="1600" dirty="0">
+                <a:solidFill>
+                  <a:srgbClr val="339933"/>
+                </a:solidFill>
+                <a:latin typeface="Arial" panose="020B0604020202020204" pitchFamily="34" charset="0"/>
+                <a:cs typeface="Arial" panose="020B0604020202020204" pitchFamily="34" charset="0"/>
+              </a:rPr>
+              <a:t>partnership with states that do not have any prevailing contract awarded to either the College Board or ACT</a:t>
+            </a:r>
+            <a:r>
+              <a:rPr lang="en-US" sz="1600" dirty="0">
+                <a:latin typeface="Arial" panose="020B0604020202020204" pitchFamily="34" charset="0"/>
+                <a:cs typeface="Arial" panose="020B0604020202020204" pitchFamily="34" charset="0"/>
+              </a:rPr>
+              <a:t>, and currently have </a:t>
+            </a:r>
+            <a:r>
+              <a:rPr lang="en-US" sz="1600" dirty="0">
+                <a:solidFill>
+                  <a:srgbClr val="339933"/>
+                </a:solidFill>
+                <a:latin typeface="Arial" panose="020B0604020202020204" pitchFamily="34" charset="0"/>
+                <a:cs typeface="Arial" panose="020B0604020202020204" pitchFamily="34" charset="0"/>
+              </a:rPr>
+              <a:t>low SAT participation in 2018</a:t>
+            </a:r>
+            <a:r>
+              <a:rPr lang="en-US" sz="1600" dirty="0">
+                <a:latin typeface="Arial" panose="020B0604020202020204" pitchFamily="34" charset="0"/>
+                <a:cs typeface="Arial" panose="020B0604020202020204" pitchFamily="34" charset="0"/>
+              </a:rPr>
+              <a:t>.</a:t>
+            </a:r>
+          </a:p>
+          <a:p>
+            <a:pPr marL="342900" indent="-342900">
+              <a:lnSpc>
+                <a:spcPct val="90000"/>
+              </a:lnSpc>
+              <a:spcBef>
+                <a:spcPct val="0"/>
+              </a:spcBef>
+              <a:buClrTx/>
               <a:buFont typeface="Arial" panose="020B0604020202020204" pitchFamily="34" charset="0"/>
               <a:buChar char="•"/>
             </a:pPr>
-            <a:r>
-              <a:rPr lang="en-US" sz="1600" dirty="0"/>
-              <a:t>It is recommended that the College Board focuses on developing partnership with states that do not have any prevailing contract awarded to either the College Board or ACT, and currently have low SAT participation in 2018.</a:t>
-            </a:r>
-          </a:p>
-          <a:p>
-            <a:pPr>
-              <a:buClr>
-                <a:schemeClr val="tx1">
-                  <a:lumMod val="75000"/>
-                  <a:lumOff val="25000"/>
-                </a:schemeClr>
-              </a:buClr>
+            <a:endParaRPr lang="en-US" sz="1600" dirty="0">
+              <a:latin typeface="Arial" panose="020B0604020202020204" pitchFamily="34" charset="0"/>
+              <a:cs typeface="Arial" panose="020B0604020202020204" pitchFamily="34" charset="0"/>
+            </a:endParaRPr>
+          </a:p>
+          <a:p>
+            <a:pPr marL="342900" indent="-342900">
+              <a:lnSpc>
+                <a:spcPct val="90000"/>
+              </a:lnSpc>
+              <a:spcBef>
+                <a:spcPct val="0"/>
+              </a:spcBef>
+              <a:buClrTx/>
               <a:buFont typeface="Arial" panose="020B0604020202020204" pitchFamily="34" charset="0"/>
               <a:buChar char="•"/>
             </a:pPr>
             <a:r>
-              <a:rPr lang="en-US" sz="1600" dirty="0"/>
+              <a:rPr lang="en-US" sz="1600" dirty="0">
+                <a:latin typeface="Arial" panose="020B0604020202020204" pitchFamily="34" charset="0"/>
+                <a:cs typeface="Arial" panose="020B0604020202020204" pitchFamily="34" charset="0"/>
+              </a:rPr>
               <a:t>Examples of such states include Iowa, Kansas, and South Dakota.</a:t>
             </a:r>
-            <a:endParaRPr lang="en-SG" sz="1800" dirty="0"/>
+            <a:endParaRPr lang="en-SG" sz="1800" dirty="0">
+              <a:latin typeface="Arial" panose="020B0604020202020204" pitchFamily="34" charset="0"/>
+              <a:cs typeface="Arial" panose="020B0604020202020204" pitchFamily="34" charset="0"/>
+            </a:endParaRPr>
+          </a:p>
+          <a:p>
+            <a:pPr marL="342900" indent="-342900">
+              <a:lnSpc>
+                <a:spcPct val="90000"/>
+              </a:lnSpc>
+              <a:spcBef>
+                <a:spcPct val="0"/>
+              </a:spcBef>
+              <a:buClrTx/>
+              <a:buFont typeface="Arial" panose="020B0604020202020204" pitchFamily="34" charset="0"/>
+              <a:buChar char="•"/>
+            </a:pPr>
+            <a:endParaRPr lang="en-US" sz="1600" dirty="0">
+              <a:latin typeface="Arial" panose="020B0604020202020204" pitchFamily="34" charset="0"/>
+              <a:cs typeface="Arial" panose="020B0604020202020204" pitchFamily="34" charset="0"/>
+            </a:endParaRPr>
+          </a:p>
+          <a:p>
+            <a:pPr marL="342900" indent="-342900">
+              <a:lnSpc>
+                <a:spcPct val="90000"/>
+              </a:lnSpc>
+              <a:spcBef>
+                <a:spcPct val="0"/>
+              </a:spcBef>
+              <a:buClrTx/>
+              <a:buFont typeface="Arial" panose="020B0604020202020204" pitchFamily="34" charset="0"/>
+              <a:buChar char="•"/>
+            </a:pPr>
+            <a:endParaRPr lang="en-SG" sz="1600" spc="-50" dirty="0">
+              <a:latin typeface="Arial" panose="020B0604020202020204" pitchFamily="34" charset="0"/>
+              <a:ea typeface="+mj-ea"/>
+              <a:cs typeface="Arial" panose="020B0604020202020204" pitchFamily="34" charset="0"/>
+            </a:endParaRPr>
+          </a:p>
+          <a:p>
+            <a:pPr marL="0" indent="0">
+              <a:buClrTx/>
+              <a:buNone/>
+            </a:pPr>
+            <a:endParaRPr lang="en-SG" sz="1800" dirty="0">
+              <a:latin typeface="Arial" panose="020B0604020202020204" pitchFamily="34" charset="0"/>
+              <a:cs typeface="Arial" panose="020B0604020202020204" pitchFamily="34" charset="0"/>
+            </a:endParaRPr>
+          </a:p>
+          <a:p>
+            <a:pPr marL="0" indent="0">
+              <a:buClrTx/>
+              <a:buNone/>
+            </a:pPr>
+            <a:endParaRPr lang="en-SG" sz="1800" dirty="0">
+              <a:latin typeface="Arial" panose="020B0604020202020204" pitchFamily="34" charset="0"/>
+              <a:cs typeface="Arial" panose="020B0604020202020204" pitchFamily="34" charset="0"/>
+            </a:endParaRPr>
+          </a:p>
+          <a:p>
+            <a:pPr marL="0" indent="0">
+              <a:buNone/>
+            </a:pPr>
+            <a:endParaRPr lang="en-SG" sz="1800" dirty="0">
+              <a:latin typeface="Arial" panose="020B0604020202020204" pitchFamily="34" charset="0"/>
+              <a:cs typeface="Arial" panose="020B0604020202020204" pitchFamily="34" charset="0"/>
+            </a:endParaRPr>
           </a:p>
         </p:txBody>
       </p:sp>
     </p:spTree>
     <p:extLst>
       <p:ext uri="{BB962C8B-B14F-4D97-AF65-F5344CB8AC3E}">
-        <p14:creationId xmlns:p14="http://schemas.microsoft.com/office/powerpoint/2010/main" val="3321744210"/>
+        <p14:creationId xmlns:p14="http://schemas.microsoft.com/office/powerpoint/2010/main" val="2033524727"/>
       </p:ext>
     </p:extLst>
   </p:cSld>

</xml_diff>

<commit_message>
version 1.4 on 2020-08-11
</commit_message>
<xml_diff>
--- a/Project-1-SAT-and-ACT-Analysis/SAT & ACT Analysis_presentation.pptx
+++ b/Project-1-SAT-and-ACT-Analysis/SAT & ACT Analysis_presentation.pptx
@@ -5,7 +5,7 @@
     <p:sldMasterId id="2147483659" r:id="rId1"/>
   </p:sldMasterIdLst>
   <p:notesMasterIdLst>
-    <p:notesMasterId r:id="rId18"/>
+    <p:notesMasterId r:id="rId19"/>
   </p:notesMasterIdLst>
   <p:sldIdLst>
     <p:sldId id="256" r:id="rId2"/>
@@ -15,39 +15,40 @@
     <p:sldId id="259" r:id="rId6"/>
     <p:sldId id="270" r:id="rId7"/>
     <p:sldId id="268" r:id="rId8"/>
-    <p:sldId id="269" r:id="rId9"/>
-    <p:sldId id="260" r:id="rId10"/>
-    <p:sldId id="261" r:id="rId11"/>
-    <p:sldId id="262" r:id="rId12"/>
-    <p:sldId id="264" r:id="rId13"/>
-    <p:sldId id="265" r:id="rId14"/>
-    <p:sldId id="272" r:id="rId15"/>
-    <p:sldId id="266" r:id="rId16"/>
-    <p:sldId id="271" r:id="rId17"/>
+    <p:sldId id="271" r:id="rId9"/>
+    <p:sldId id="269" r:id="rId10"/>
+    <p:sldId id="260" r:id="rId11"/>
+    <p:sldId id="261" r:id="rId12"/>
+    <p:sldId id="262" r:id="rId13"/>
+    <p:sldId id="273" r:id="rId14"/>
+    <p:sldId id="264" r:id="rId15"/>
+    <p:sldId id="265" r:id="rId16"/>
+    <p:sldId id="272" r:id="rId17"/>
+    <p:sldId id="266" r:id="rId18"/>
   </p:sldIdLst>
   <p:sldSz cx="12192000" cy="6858000"/>
   <p:notesSz cx="6858000" cy="9144000"/>
   <p:embeddedFontLst>
     <p:embeddedFont>
       <p:font typeface="Bookman Old Style" panose="02050604050505020204" pitchFamily="18" charset="0"/>
-      <p:regular r:id="rId19"/>
-      <p:bold r:id="rId20"/>
-      <p:italic r:id="rId21"/>
-      <p:boldItalic r:id="rId22"/>
+      <p:regular r:id="rId20"/>
+      <p:bold r:id="rId21"/>
+      <p:italic r:id="rId22"/>
+      <p:boldItalic r:id="rId23"/>
     </p:embeddedFont>
     <p:embeddedFont>
       <p:font typeface="Calibri" panose="020F0502020204030204" pitchFamily="34" charset="0"/>
-      <p:regular r:id="rId23"/>
-      <p:bold r:id="rId24"/>
-      <p:italic r:id="rId25"/>
-      <p:boldItalic r:id="rId26"/>
+      <p:regular r:id="rId24"/>
+      <p:bold r:id="rId25"/>
+      <p:italic r:id="rId26"/>
+      <p:boldItalic r:id="rId27"/>
     </p:embeddedFont>
     <p:embeddedFont>
       <p:font typeface="Libre Franklin" panose="00000500000000000000" charset="0"/>
-      <p:regular r:id="rId27"/>
-      <p:bold r:id="rId28"/>
-      <p:italic r:id="rId29"/>
-      <p:boldItalic r:id="rId30"/>
+      <p:regular r:id="rId28"/>
+      <p:bold r:id="rId29"/>
+      <p:italic r:id="rId30"/>
+      <p:boldItalic r:id="rId31"/>
     </p:embeddedFont>
   </p:embeddedFontLst>
   <p:defaultTextStyle>
@@ -837,6 +838,214 @@
   <p:cSld>
     <p:spTree>
       <p:nvGrpSpPr>
+        <p:cNvPr id="1" name="Shape 136"/>
+        <p:cNvGrpSpPr/>
+        <p:nvPr/>
+      </p:nvGrpSpPr>
+      <p:grpSpPr>
+        <a:xfrm>
+          <a:off x="0" y="0"/>
+          <a:ext cx="0" cy="0"/>
+          <a:chOff x="0" y="0"/>
+          <a:chExt cx="0" cy="0"/>
+        </a:xfrm>
+      </p:grpSpPr>
+      <p:sp>
+        <p:nvSpPr>
+          <p:cNvPr id="137" name="Google Shape;137;p6:notes"/>
+          <p:cNvSpPr txBox="1">
+            <a:spLocks noGrp="1"/>
+          </p:cNvSpPr>
+          <p:nvPr>
+            <p:ph type="body" idx="1"/>
+          </p:nvPr>
+        </p:nvSpPr>
+        <p:spPr>
+          <a:xfrm>
+            <a:off x="685800" y="4343400"/>
+            <a:ext cx="5486400" cy="4114800"/>
+          </a:xfrm>
+          <a:prstGeom prst="rect">
+            <a:avLst/>
+          </a:prstGeom>
+        </p:spPr>
+        <p:txBody>
+          <a:bodyPr spcFirstLastPara="1" wrap="square" lIns="91425" tIns="91425" rIns="91425" bIns="91425" anchor="t" anchorCtr="0">
+            <a:noAutofit/>
+          </a:bodyPr>
+          <a:lstStyle/>
+          <a:p>
+            <a:pPr marL="0" lvl="0" indent="0" algn="l" rtl="0">
+              <a:spcBef>
+                <a:spcPts val="0"/>
+              </a:spcBef>
+              <a:spcAft>
+                <a:spcPts val="0"/>
+              </a:spcAft>
+              <a:buNone/>
+            </a:pPr>
+            <a:endParaRPr dirty="0"/>
+          </a:p>
+        </p:txBody>
+      </p:sp>
+      <p:sp>
+        <p:nvSpPr>
+          <p:cNvPr id="138" name="Google Shape;138;p6:notes"/>
+          <p:cNvSpPr>
+            <a:spLocks noGrp="1" noRot="1" noChangeAspect="1"/>
+          </p:cNvSpPr>
+          <p:nvPr>
+            <p:ph type="sldImg" idx="2"/>
+          </p:nvPr>
+        </p:nvSpPr>
+        <p:spPr>
+          <a:xfrm>
+            <a:off x="381000" y="685800"/>
+            <a:ext cx="6096000" cy="3429000"/>
+          </a:xfrm>
+          <a:custGeom>
+            <a:avLst/>
+            <a:gdLst/>
+            <a:ahLst/>
+            <a:cxnLst/>
+            <a:rect l="l" t="t" r="r" b="b"/>
+            <a:pathLst>
+              <a:path w="120000" h="120000" extrusionOk="0">
+                <a:moveTo>
+                  <a:pt x="0" y="0"/>
+                </a:moveTo>
+                <a:lnTo>
+                  <a:pt x="120000" y="0"/>
+                </a:lnTo>
+                <a:lnTo>
+                  <a:pt x="120000" y="120000"/>
+                </a:lnTo>
+                <a:lnTo>
+                  <a:pt x="0" y="120000"/>
+                </a:lnTo>
+                <a:close/>
+              </a:path>
+            </a:pathLst>
+          </a:custGeom>
+        </p:spPr>
+      </p:sp>
+    </p:spTree>
+  </p:cSld>
+  <p:clrMapOvr>
+    <a:masterClrMapping/>
+  </p:clrMapOvr>
+</p:notes>
+</file>
+
+<file path=ppt/notesSlides/notesSlide11.xml><?xml version="1.0" encoding="utf-8"?>
+<p:notes xmlns:a="http://schemas.openxmlformats.org/drawingml/2006/main" xmlns:r="http://schemas.openxmlformats.org/officeDocument/2006/relationships" xmlns:p="http://schemas.openxmlformats.org/presentationml/2006/main" showMasterSp="0" showMasterPhAnim="0">
+  <p:cSld>
+    <p:spTree>
+      <p:nvGrpSpPr>
+        <p:cNvPr id="1" name="Shape 186"/>
+        <p:cNvGrpSpPr/>
+        <p:nvPr/>
+      </p:nvGrpSpPr>
+      <p:grpSpPr>
+        <a:xfrm>
+          <a:off x="0" y="0"/>
+          <a:ext cx="0" cy="0"/>
+          <a:chOff x="0" y="0"/>
+          <a:chExt cx="0" cy="0"/>
+        </a:xfrm>
+      </p:grpSpPr>
+      <p:sp>
+        <p:nvSpPr>
+          <p:cNvPr id="187" name="Google Shape;187;g8fb88c448d_3_7:notes"/>
+          <p:cNvSpPr txBox="1">
+            <a:spLocks noGrp="1"/>
+          </p:cNvSpPr>
+          <p:nvPr>
+            <p:ph type="body" idx="1"/>
+          </p:nvPr>
+        </p:nvSpPr>
+        <p:spPr>
+          <a:xfrm>
+            <a:off x="685800" y="4343400"/>
+            <a:ext cx="5486400" cy="4114800"/>
+          </a:xfrm>
+          <a:prstGeom prst="rect">
+            <a:avLst/>
+          </a:prstGeom>
+        </p:spPr>
+        <p:txBody>
+          <a:bodyPr spcFirstLastPara="1" wrap="square" lIns="91425" tIns="91425" rIns="91425" bIns="91425" anchor="t" anchorCtr="0">
+            <a:noAutofit/>
+          </a:bodyPr>
+          <a:lstStyle/>
+          <a:p>
+            <a:pPr marL="0" lvl="0" indent="0" algn="l" rtl="0">
+              <a:spcBef>
+                <a:spcPts val="0"/>
+              </a:spcBef>
+              <a:spcAft>
+                <a:spcPts val="0"/>
+              </a:spcAft>
+              <a:buNone/>
+            </a:pPr>
+            <a:endParaRPr dirty="0"/>
+          </a:p>
+        </p:txBody>
+      </p:sp>
+      <p:sp>
+        <p:nvSpPr>
+          <p:cNvPr id="188" name="Google Shape;188;g8fb88c448d_3_7:notes"/>
+          <p:cNvSpPr>
+            <a:spLocks noGrp="1" noRot="1" noChangeAspect="1"/>
+          </p:cNvSpPr>
+          <p:nvPr>
+            <p:ph type="sldImg" idx="2"/>
+          </p:nvPr>
+        </p:nvSpPr>
+        <p:spPr>
+          <a:xfrm>
+            <a:off x="381000" y="685800"/>
+            <a:ext cx="6096000" cy="3429000"/>
+          </a:xfrm>
+          <a:custGeom>
+            <a:avLst/>
+            <a:gdLst/>
+            <a:ahLst/>
+            <a:cxnLst/>
+            <a:rect l="l" t="t" r="r" b="b"/>
+            <a:pathLst>
+              <a:path w="120000" h="120000" extrusionOk="0">
+                <a:moveTo>
+                  <a:pt x="0" y="0"/>
+                </a:moveTo>
+                <a:lnTo>
+                  <a:pt x="120000" y="0"/>
+                </a:lnTo>
+                <a:lnTo>
+                  <a:pt x="120000" y="120000"/>
+                </a:lnTo>
+                <a:lnTo>
+                  <a:pt x="0" y="120000"/>
+                </a:lnTo>
+                <a:close/>
+              </a:path>
+            </a:pathLst>
+          </a:custGeom>
+        </p:spPr>
+      </p:sp>
+    </p:spTree>
+  </p:cSld>
+  <p:clrMapOvr>
+    <a:masterClrMapping/>
+  </p:clrMapOvr>
+</p:notes>
+</file>
+
+<file path=ppt/notesSlides/notesSlide12.xml><?xml version="1.0" encoding="utf-8"?>
+<p:notes xmlns:a="http://schemas.openxmlformats.org/drawingml/2006/main" xmlns:r="http://schemas.openxmlformats.org/officeDocument/2006/relationships" xmlns:p="http://schemas.openxmlformats.org/presentationml/2006/main" showMasterSp="0" showMasterPhAnim="0">
+  <p:cSld>
+    <p:spTree>
+      <p:nvGrpSpPr>
         <p:cNvPr id="1" name="Shape 158"/>
         <p:cNvGrpSpPr/>
         <p:nvPr/>
@@ -936,7 +1145,7 @@
 </p:notes>
 </file>
 
-<file path=ppt/notesSlides/notesSlide11.xml><?xml version="1.0" encoding="utf-8"?>
+<file path=ppt/notesSlides/notesSlide13.xml><?xml version="1.0" encoding="utf-8"?>
 <p:notes xmlns:a="http://schemas.openxmlformats.org/drawingml/2006/main" xmlns:r="http://schemas.openxmlformats.org/officeDocument/2006/relationships" xmlns:p="http://schemas.openxmlformats.org/presentationml/2006/main" showMasterSp="0" showMasterPhAnim="0">
   <p:cSld>
     <p:spTree>
@@ -1040,7 +1249,7 @@
 </p:notes>
 </file>
 
-<file path=ppt/notesSlides/notesSlide12.xml><?xml version="1.0" encoding="utf-8"?>
+<file path=ppt/notesSlides/notesSlide14.xml><?xml version="1.0" encoding="utf-8"?>
 <p:notes xmlns:a="http://schemas.openxmlformats.org/drawingml/2006/main" xmlns:r="http://schemas.openxmlformats.org/officeDocument/2006/relationships" xmlns:p="http://schemas.openxmlformats.org/presentationml/2006/main" showMasterSp="0" showMasterPhAnim="0">
   <p:cSld>
     <p:spTree>
@@ -1137,115 +1346,6 @@
         </p:spPr>
       </p:sp>
     </p:spTree>
-  </p:cSld>
-  <p:clrMapOvr>
-    <a:masterClrMapping/>
-  </p:clrMapOvr>
-</p:notes>
-</file>
-
-<file path=ppt/notesSlides/notesSlide13.xml><?xml version="1.0" encoding="utf-8"?>
-<p:notes xmlns:a="http://schemas.openxmlformats.org/drawingml/2006/main" xmlns:r="http://schemas.openxmlformats.org/officeDocument/2006/relationships" xmlns:p="http://schemas.openxmlformats.org/presentationml/2006/main" showMasterSp="0" showMasterPhAnim="0">
-  <p:cSld>
-    <p:spTree>
-      <p:nvGrpSpPr>
-        <p:cNvPr id="1" name="Shape 181"/>
-        <p:cNvGrpSpPr/>
-        <p:nvPr/>
-      </p:nvGrpSpPr>
-      <p:grpSpPr>
-        <a:xfrm>
-          <a:off x="0" y="0"/>
-          <a:ext cx="0" cy="0"/>
-          <a:chOff x="0" y="0"/>
-          <a:chExt cx="0" cy="0"/>
-        </a:xfrm>
-      </p:grpSpPr>
-      <p:sp>
-        <p:nvSpPr>
-          <p:cNvPr id="182" name="Google Shape;182;p9:notes"/>
-          <p:cNvSpPr txBox="1">
-            <a:spLocks noGrp="1"/>
-          </p:cNvSpPr>
-          <p:nvPr>
-            <p:ph type="body" idx="1"/>
-          </p:nvPr>
-        </p:nvSpPr>
-        <p:spPr>
-          <a:xfrm>
-            <a:off x="685800" y="4343400"/>
-            <a:ext cx="5486400" cy="4114800"/>
-          </a:xfrm>
-          <a:prstGeom prst="rect">
-            <a:avLst/>
-          </a:prstGeom>
-        </p:spPr>
-        <p:txBody>
-          <a:bodyPr spcFirstLastPara="1" wrap="square" lIns="91425" tIns="91425" rIns="91425" bIns="91425" anchor="t" anchorCtr="0">
-            <a:noAutofit/>
-          </a:bodyPr>
-          <a:lstStyle/>
-          <a:p>
-            <a:pPr marL="0" lvl="0" indent="0" algn="l" rtl="0">
-              <a:spcBef>
-                <a:spcPts val="0"/>
-              </a:spcBef>
-              <a:spcAft>
-                <a:spcPts val="0"/>
-              </a:spcAft>
-              <a:buNone/>
-            </a:pPr>
-            <a:endParaRPr dirty="0"/>
-          </a:p>
-        </p:txBody>
-      </p:sp>
-      <p:sp>
-        <p:nvSpPr>
-          <p:cNvPr id="183" name="Google Shape;183;p9:notes"/>
-          <p:cNvSpPr>
-            <a:spLocks noGrp="1" noRot="1" noChangeAspect="1"/>
-          </p:cNvSpPr>
-          <p:nvPr>
-            <p:ph type="sldImg" idx="2"/>
-          </p:nvPr>
-        </p:nvSpPr>
-        <p:spPr>
-          <a:xfrm>
-            <a:off x="381000" y="685800"/>
-            <a:ext cx="6096000" cy="3429000"/>
-          </a:xfrm>
-          <a:custGeom>
-            <a:avLst/>
-            <a:gdLst/>
-            <a:ahLst/>
-            <a:cxnLst/>
-            <a:rect l="l" t="t" r="r" b="b"/>
-            <a:pathLst>
-              <a:path w="120000" h="120000" extrusionOk="0">
-                <a:moveTo>
-                  <a:pt x="0" y="0"/>
-                </a:moveTo>
-                <a:lnTo>
-                  <a:pt x="120000" y="0"/>
-                </a:lnTo>
-                <a:lnTo>
-                  <a:pt x="120000" y="120000"/>
-                </a:lnTo>
-                <a:lnTo>
-                  <a:pt x="0" y="120000"/>
-                </a:lnTo>
-                <a:close/>
-              </a:path>
-            </a:pathLst>
-          </a:custGeom>
-        </p:spPr>
-      </p:sp>
-    </p:spTree>
-    <p:extLst>
-      <p:ext uri="{BB962C8B-B14F-4D97-AF65-F5344CB8AC3E}">
-        <p14:creationId xmlns:p14="http://schemas.microsoft.com/office/powerpoint/2010/main" val="356866076"/>
-      </p:ext>
-    </p:extLst>
   </p:cSld>
   <p:clrMapOvr>
     <a:masterClrMapping/>
@@ -1512,40 +1612,6 @@
               </a:spcAft>
               <a:buNone/>
             </a:pPr>
-            <a:r>
-              <a:rPr lang="en-SG"/>
-              <a:t>Sources:</a:t>
-            </a:r>
-          </a:p>
-          <a:p>
-            <a:pPr marL="0" lvl="0" indent="0" algn="l" rtl="0">
-              <a:spcBef>
-                <a:spcPts val="0"/>
-              </a:spcBef>
-              <a:spcAft>
-                <a:spcPts val="0"/>
-              </a:spcAft>
-              <a:buNone/>
-            </a:pPr>
-            <a:r>
-              <a:rPr lang="en-SG" dirty="0"/>
-              <a:t>https://blog.collegevine.com/here-are-the-average-sat-scores-by-state/</a:t>
-            </a:r>
-          </a:p>
-          <a:p>
-            <a:pPr marL="0" lvl="0" indent="0" algn="l" rtl="0">
-              <a:spcBef>
-                <a:spcPts val="0"/>
-              </a:spcBef>
-              <a:spcAft>
-                <a:spcPts val="0"/>
-              </a:spcAft>
-              <a:buNone/>
-            </a:pPr>
-            <a:r>
-              <a:rPr lang="en-SG" dirty="0"/>
-              <a:t>https://www.act.org/content/dam/act/unsecured/documents/cccr2017/ACT_2017-Average_Scores_by_State.pdf</a:t>
-            </a:r>
             <a:endParaRPr dirty="0"/>
           </a:p>
         </p:txBody>
@@ -1650,40 +1716,6 @@
               </a:spcAft>
               <a:buNone/>
             </a:pPr>
-            <a:r>
-              <a:rPr lang="en-SG"/>
-              <a:t>Sources:</a:t>
-            </a:r>
-          </a:p>
-          <a:p>
-            <a:pPr marL="0" lvl="0" indent="0" algn="l" rtl="0">
-              <a:spcBef>
-                <a:spcPts val="0"/>
-              </a:spcBef>
-              <a:spcAft>
-                <a:spcPts val="0"/>
-              </a:spcAft>
-              <a:buNone/>
-            </a:pPr>
-            <a:r>
-              <a:rPr lang="en-SG" dirty="0"/>
-              <a:t>https://blog.collegevine.com/here-are-the-average-sat-scores-by-state/</a:t>
-            </a:r>
-          </a:p>
-          <a:p>
-            <a:pPr marL="0" lvl="0" indent="0" algn="l" rtl="0">
-              <a:spcBef>
-                <a:spcPts val="0"/>
-              </a:spcBef>
-              <a:spcAft>
-                <a:spcPts val="0"/>
-              </a:spcAft>
-              <a:buNone/>
-            </a:pPr>
-            <a:r>
-              <a:rPr lang="en-SG" dirty="0"/>
-              <a:t>https://www.act.org/content/dam/act/unsecured/documents/cccr2017/ACT_2017-Average_Scores_by_State.pdf</a:t>
-            </a:r>
             <a:endParaRPr dirty="0"/>
           </a:p>
         </p:txBody>
@@ -1856,6 +1888,115 @@
   <p:cSld>
     <p:spTree>
       <p:nvGrpSpPr>
+        <p:cNvPr id="1" name="Shape 181"/>
+        <p:cNvGrpSpPr/>
+        <p:nvPr/>
+      </p:nvGrpSpPr>
+      <p:grpSpPr>
+        <a:xfrm>
+          <a:off x="0" y="0"/>
+          <a:ext cx="0" cy="0"/>
+          <a:chOff x="0" y="0"/>
+          <a:chExt cx="0" cy="0"/>
+        </a:xfrm>
+      </p:grpSpPr>
+      <p:sp>
+        <p:nvSpPr>
+          <p:cNvPr id="182" name="Google Shape;182;p9:notes"/>
+          <p:cNvSpPr txBox="1">
+            <a:spLocks noGrp="1"/>
+          </p:cNvSpPr>
+          <p:nvPr>
+            <p:ph type="body" idx="1"/>
+          </p:nvPr>
+        </p:nvSpPr>
+        <p:spPr>
+          <a:xfrm>
+            <a:off x="685800" y="4343400"/>
+            <a:ext cx="5486400" cy="4114800"/>
+          </a:xfrm>
+          <a:prstGeom prst="rect">
+            <a:avLst/>
+          </a:prstGeom>
+        </p:spPr>
+        <p:txBody>
+          <a:bodyPr spcFirstLastPara="1" wrap="square" lIns="91425" tIns="91425" rIns="91425" bIns="91425" anchor="t" anchorCtr="0">
+            <a:noAutofit/>
+          </a:bodyPr>
+          <a:lstStyle/>
+          <a:p>
+            <a:pPr marL="0" lvl="0" indent="0" algn="l" rtl="0">
+              <a:spcBef>
+                <a:spcPts val="0"/>
+              </a:spcBef>
+              <a:spcAft>
+                <a:spcPts val="0"/>
+              </a:spcAft>
+              <a:buNone/>
+            </a:pPr>
+            <a:endParaRPr dirty="0"/>
+          </a:p>
+        </p:txBody>
+      </p:sp>
+      <p:sp>
+        <p:nvSpPr>
+          <p:cNvPr id="183" name="Google Shape;183;p9:notes"/>
+          <p:cNvSpPr>
+            <a:spLocks noGrp="1" noRot="1" noChangeAspect="1"/>
+          </p:cNvSpPr>
+          <p:nvPr>
+            <p:ph type="sldImg" idx="2"/>
+          </p:nvPr>
+        </p:nvSpPr>
+        <p:spPr>
+          <a:xfrm>
+            <a:off x="381000" y="685800"/>
+            <a:ext cx="6096000" cy="3429000"/>
+          </a:xfrm>
+          <a:custGeom>
+            <a:avLst/>
+            <a:gdLst/>
+            <a:ahLst/>
+            <a:cxnLst/>
+            <a:rect l="l" t="t" r="r" b="b"/>
+            <a:pathLst>
+              <a:path w="120000" h="120000" extrusionOk="0">
+                <a:moveTo>
+                  <a:pt x="0" y="0"/>
+                </a:moveTo>
+                <a:lnTo>
+                  <a:pt x="120000" y="0"/>
+                </a:lnTo>
+                <a:lnTo>
+                  <a:pt x="120000" y="120000"/>
+                </a:lnTo>
+                <a:lnTo>
+                  <a:pt x="0" y="120000"/>
+                </a:lnTo>
+                <a:close/>
+              </a:path>
+            </a:pathLst>
+          </a:custGeom>
+        </p:spPr>
+      </p:sp>
+    </p:spTree>
+    <p:extLst>
+      <p:ext uri="{BB962C8B-B14F-4D97-AF65-F5344CB8AC3E}">
+        <p14:creationId xmlns:p14="http://schemas.microsoft.com/office/powerpoint/2010/main" val="1658742011"/>
+      </p:ext>
+    </p:extLst>
+  </p:cSld>
+  <p:clrMapOvr>
+    <a:masterClrMapping/>
+  </p:clrMapOvr>
+</p:notes>
+</file>
+
+<file path=ppt/notesSlides/notesSlide8.xml><?xml version="1.0" encoding="utf-8"?>
+<p:notes xmlns:a="http://schemas.openxmlformats.org/drawingml/2006/main" xmlns:r="http://schemas.openxmlformats.org/officeDocument/2006/relationships" xmlns:p="http://schemas.openxmlformats.org/presentationml/2006/main" showMasterSp="0" showMasterPhAnim="0">
+  <p:cSld>
+    <p:spTree>
+      <p:nvGrpSpPr>
         <p:cNvPr id="1" name="Shape 118"/>
         <p:cNvGrpSpPr/>
         <p:nvPr/>
@@ -1955,7 +2096,7 @@
 </p:notes>
 </file>
 
-<file path=ppt/notesSlides/notesSlide8.xml><?xml version="1.0" encoding="utf-8"?>
+<file path=ppt/notesSlides/notesSlide9.xml><?xml version="1.0" encoding="utf-8"?>
 <p:notes xmlns:a="http://schemas.openxmlformats.org/drawingml/2006/main" xmlns:r="http://schemas.openxmlformats.org/officeDocument/2006/relationships" xmlns:p="http://schemas.openxmlformats.org/presentationml/2006/main" showMasterSp="0" showMasterPhAnim="0">
   <p:cSld>
     <p:spTree>
@@ -2050,110 +2191,6 @@
             <a:endParaRPr dirty="0"/>
           </a:p>
         </p:txBody>
-      </p:sp>
-    </p:spTree>
-  </p:cSld>
-  <p:clrMapOvr>
-    <a:masterClrMapping/>
-  </p:clrMapOvr>
-</p:notes>
-</file>
-
-<file path=ppt/notesSlides/notesSlide9.xml><?xml version="1.0" encoding="utf-8"?>
-<p:notes xmlns:a="http://schemas.openxmlformats.org/drawingml/2006/main" xmlns:r="http://schemas.openxmlformats.org/officeDocument/2006/relationships" xmlns:p="http://schemas.openxmlformats.org/presentationml/2006/main" showMasterSp="0" showMasterPhAnim="0">
-  <p:cSld>
-    <p:spTree>
-      <p:nvGrpSpPr>
-        <p:cNvPr id="1" name="Shape 136"/>
-        <p:cNvGrpSpPr/>
-        <p:nvPr/>
-      </p:nvGrpSpPr>
-      <p:grpSpPr>
-        <a:xfrm>
-          <a:off x="0" y="0"/>
-          <a:ext cx="0" cy="0"/>
-          <a:chOff x="0" y="0"/>
-          <a:chExt cx="0" cy="0"/>
-        </a:xfrm>
-      </p:grpSpPr>
-      <p:sp>
-        <p:nvSpPr>
-          <p:cNvPr id="137" name="Google Shape;137;p6:notes"/>
-          <p:cNvSpPr txBox="1">
-            <a:spLocks noGrp="1"/>
-          </p:cNvSpPr>
-          <p:nvPr>
-            <p:ph type="body" idx="1"/>
-          </p:nvPr>
-        </p:nvSpPr>
-        <p:spPr>
-          <a:xfrm>
-            <a:off x="685800" y="4343400"/>
-            <a:ext cx="5486400" cy="4114800"/>
-          </a:xfrm>
-          <a:prstGeom prst="rect">
-            <a:avLst/>
-          </a:prstGeom>
-        </p:spPr>
-        <p:txBody>
-          <a:bodyPr spcFirstLastPara="1" wrap="square" lIns="91425" tIns="91425" rIns="91425" bIns="91425" anchor="t" anchorCtr="0">
-            <a:noAutofit/>
-          </a:bodyPr>
-          <a:lstStyle/>
-          <a:p>
-            <a:pPr marL="0" lvl="0" indent="0" algn="l" rtl="0">
-              <a:spcBef>
-                <a:spcPts val="0"/>
-              </a:spcBef>
-              <a:spcAft>
-                <a:spcPts val="0"/>
-              </a:spcAft>
-              <a:buNone/>
-            </a:pPr>
-            <a:endParaRPr dirty="0"/>
-          </a:p>
-        </p:txBody>
-      </p:sp>
-      <p:sp>
-        <p:nvSpPr>
-          <p:cNvPr id="138" name="Google Shape;138;p6:notes"/>
-          <p:cNvSpPr>
-            <a:spLocks noGrp="1" noRot="1" noChangeAspect="1"/>
-          </p:cNvSpPr>
-          <p:nvPr>
-            <p:ph type="sldImg" idx="2"/>
-          </p:nvPr>
-        </p:nvSpPr>
-        <p:spPr>
-          <a:xfrm>
-            <a:off x="381000" y="685800"/>
-            <a:ext cx="6096000" cy="3429000"/>
-          </a:xfrm>
-          <a:custGeom>
-            <a:avLst/>
-            <a:gdLst/>
-            <a:ahLst/>
-            <a:cxnLst/>
-            <a:rect l="l" t="t" r="r" b="b"/>
-            <a:pathLst>
-              <a:path w="120000" h="120000" extrusionOk="0">
-                <a:moveTo>
-                  <a:pt x="0" y="0"/>
-                </a:moveTo>
-                <a:lnTo>
-                  <a:pt x="120000" y="0"/>
-                </a:lnTo>
-                <a:lnTo>
-                  <a:pt x="120000" y="120000"/>
-                </a:lnTo>
-                <a:lnTo>
-                  <a:pt x="0" y="120000"/>
-                </a:lnTo>
-                <a:close/>
-              </a:path>
-            </a:pathLst>
-          </a:custGeom>
-        </p:spPr>
       </p:sp>
     </p:spTree>
   </p:cSld>
@@ -13161,6 +13198,150 @@
   <p:cSld>
     <p:spTree>
       <p:nvGrpSpPr>
+        <p:cNvPr id="1" name="Shape 121"/>
+        <p:cNvGrpSpPr/>
+        <p:nvPr/>
+      </p:nvGrpSpPr>
+      <p:grpSpPr>
+        <a:xfrm>
+          <a:off x="0" y="0"/>
+          <a:ext cx="0" cy="0"/>
+          <a:chOff x="0" y="0"/>
+          <a:chExt cx="0" cy="0"/>
+        </a:xfrm>
+      </p:grpSpPr>
+      <p:sp>
+        <p:nvSpPr>
+          <p:cNvPr id="122" name="Google Shape;122;p17"/>
+          <p:cNvSpPr txBox="1">
+            <a:spLocks noGrp="1"/>
+          </p:cNvSpPr>
+          <p:nvPr>
+            <p:ph type="title"/>
+          </p:nvPr>
+        </p:nvSpPr>
+        <p:spPr>
+          <a:xfrm>
+            <a:off x="1097280" y="286603"/>
+            <a:ext cx="10278476" cy="1450757"/>
+          </a:xfrm>
+          <a:prstGeom prst="rect">
+            <a:avLst/>
+          </a:prstGeom>
+          <a:noFill/>
+          <a:ln>
+            <a:noFill/>
+          </a:ln>
+        </p:spPr>
+        <p:txBody>
+          <a:bodyPr spcFirstLastPara="1" wrap="square" lIns="91425" tIns="45700" rIns="91425" bIns="45700" anchor="b" anchorCtr="0">
+            <a:noAutofit/>
+          </a:bodyPr>
+          <a:lstStyle/>
+          <a:p>
+            <a:pPr marL="0" lvl="0" indent="0" algn="l" rtl="0">
+              <a:lnSpc>
+                <a:spcPct val="90000"/>
+              </a:lnSpc>
+              <a:spcBef>
+                <a:spcPts val="0"/>
+              </a:spcBef>
+              <a:spcAft>
+                <a:spcPts val="0"/>
+              </a:spcAft>
+              <a:buClr>
+                <a:srgbClr val="3F3F3F"/>
+              </a:buClr>
+              <a:buSzPts val="2400"/>
+              <a:buFont typeface="Bookman Old Style"/>
+              <a:buNone/>
+            </a:pPr>
+            <a:r>
+              <a:rPr lang="en-SG" sz="2400"/>
+              <a:t>In both 2017 and 2018, the </a:t>
+            </a:r>
+            <a:r>
+              <a:rPr lang="en-SG" sz="2400">
+                <a:solidFill>
+                  <a:srgbClr val="C00000"/>
+                </a:solidFill>
+              </a:rPr>
+              <a:t>ACT had a higher median participation rate </a:t>
+            </a:r>
+            <a:r>
+              <a:rPr lang="en-SG" sz="2400"/>
+              <a:t>than the SAT. </a:t>
+            </a:r>
+            <a:endParaRPr/>
+          </a:p>
+        </p:txBody>
+      </p:sp>
+      <p:pic>
+        <p:nvPicPr>
+          <p:cNvPr id="123" name="Google Shape;123;p17"/>
+          <p:cNvPicPr preferRelativeResize="0"/>
+          <p:nvPr/>
+        </p:nvPicPr>
+        <p:blipFill rotWithShape="1">
+          <a:blip r:embed="rId3">
+            <a:alphaModFix/>
+          </a:blip>
+          <a:srcRect/>
+          <a:stretch/>
+        </p:blipFill>
+        <p:spPr>
+          <a:xfrm>
+            <a:off x="2665062" y="2106237"/>
+            <a:ext cx="6551193" cy="4116333"/>
+          </a:xfrm>
+          <a:prstGeom prst="rect">
+            <a:avLst/>
+          </a:prstGeom>
+          <a:noFill/>
+          <a:ln>
+            <a:noFill/>
+          </a:ln>
+        </p:spPr>
+      </p:pic>
+      <p:cxnSp>
+        <p:nvCxnSpPr>
+          <p:cNvPr id="124" name="Google Shape;124;p17"/>
+          <p:cNvCxnSpPr/>
+          <p:nvPr/>
+        </p:nvCxnSpPr>
+        <p:spPr>
+          <a:xfrm>
+            <a:off x="6087664" y="2496710"/>
+            <a:ext cx="0" cy="3348000"/>
+          </a:xfrm>
+          <a:prstGeom prst="straightConnector1">
+            <a:avLst/>
+          </a:prstGeom>
+          <a:noFill/>
+          <a:ln w="12700" cap="flat" cmpd="sng">
+            <a:solidFill>
+              <a:srgbClr val="A5A5A5"/>
+            </a:solidFill>
+            <a:prstDash val="dash"/>
+            <a:round/>
+            <a:headEnd type="none" w="sm" len="sm"/>
+            <a:tailEnd type="none" w="sm" len="sm"/>
+          </a:ln>
+        </p:spPr>
+      </p:cxnSp>
+    </p:spTree>
+  </p:cSld>
+  <p:clrMapOvr>
+    <a:masterClrMapping/>
+  </p:clrMapOvr>
+</p:sld>
+</file>
+
+<file path=ppt/slides/slide11.xml><?xml version="1.0" encoding="utf-8"?>
+<p:sld xmlns:a="http://schemas.openxmlformats.org/drawingml/2006/main" xmlns:r="http://schemas.openxmlformats.org/officeDocument/2006/relationships" xmlns:p="http://schemas.openxmlformats.org/presentationml/2006/main">
+  <p:cSld>
+    <p:spTree>
+      <p:nvGrpSpPr>
         <p:cNvPr id="1" name="Shape 128"/>
         <p:cNvGrpSpPr/>
         <p:nvPr/>
@@ -13416,8 +13597,8 @@
         </p:nvSpPr>
         <p:spPr>
           <a:xfrm>
-            <a:off x="6451859" y="3543929"/>
-            <a:ext cx="223200" cy="2403000"/>
+            <a:off x="6451859" y="3512745"/>
+            <a:ext cx="223200" cy="2434184"/>
           </a:xfrm>
           <a:prstGeom prst="rect">
             <a:avLst/>
@@ -13574,7 +13755,7 @@
 </p:sld>
 </file>
 
-<file path=ppt/slides/slide11.xml><?xml version="1.0" encoding="utf-8"?>
+<file path=ppt/slides/slide12.xml><?xml version="1.0" encoding="utf-8"?>
 <p:sld xmlns:a="http://schemas.openxmlformats.org/drawingml/2006/main" xmlns:r="http://schemas.openxmlformats.org/officeDocument/2006/relationships" xmlns:p="http://schemas.openxmlformats.org/presentationml/2006/main">
   <p:cSld>
     <p:spTree>
@@ -14093,7 +14274,787 @@
 </p:sld>
 </file>
 
-<file path=ppt/slides/slide12.xml><?xml version="1.0" encoding="utf-8"?>
+<file path=ppt/slides/slide13.xml><?xml version="1.0" encoding="utf-8"?>
+<p:sld xmlns:a="http://schemas.openxmlformats.org/drawingml/2006/main" xmlns:r="http://schemas.openxmlformats.org/officeDocument/2006/relationships" xmlns:p="http://schemas.openxmlformats.org/presentationml/2006/main">
+  <p:cSld>
+    <p:spTree>
+      <p:nvGrpSpPr>
+        <p:cNvPr id="1" name="Shape 189"/>
+        <p:cNvGrpSpPr/>
+        <p:nvPr/>
+      </p:nvGrpSpPr>
+      <p:grpSpPr>
+        <a:xfrm>
+          <a:off x="0" y="0"/>
+          <a:ext cx="0" cy="0"/>
+          <a:chOff x="0" y="0"/>
+          <a:chExt cx="0" cy="0"/>
+        </a:xfrm>
+      </p:grpSpPr>
+      <p:pic>
+        <p:nvPicPr>
+          <p:cNvPr id="190" name="Google Shape;190;p25"/>
+          <p:cNvPicPr preferRelativeResize="0"/>
+          <p:nvPr/>
+        </p:nvPicPr>
+        <p:blipFill rotWithShape="1">
+          <a:blip r:embed="rId3">
+            <a:alphaModFix/>
+          </a:blip>
+          <a:srcRect/>
+          <a:stretch/>
+        </p:blipFill>
+        <p:spPr>
+          <a:xfrm>
+            <a:off x="916257" y="214407"/>
+            <a:ext cx="6827159" cy="6061103"/>
+          </a:xfrm>
+          <a:prstGeom prst="rect">
+            <a:avLst/>
+          </a:prstGeom>
+          <a:noFill/>
+          <a:ln>
+            <a:noFill/>
+          </a:ln>
+        </p:spPr>
+      </p:pic>
+      <p:sp>
+        <p:nvSpPr>
+          <p:cNvPr id="191" name="Google Shape;191;p25"/>
+          <p:cNvSpPr/>
+          <p:nvPr/>
+        </p:nvSpPr>
+        <p:spPr>
+          <a:xfrm>
+            <a:off x="4074778" y="3569378"/>
+            <a:ext cx="216000" cy="216000"/>
+          </a:xfrm>
+          <a:prstGeom prst="rect">
+            <a:avLst/>
+          </a:prstGeom>
+          <a:noFill/>
+          <a:ln w="22225" cap="flat" cmpd="sng">
+            <a:solidFill>
+              <a:srgbClr val="FF0000"/>
+            </a:solidFill>
+            <a:prstDash val="solid"/>
+            <a:round/>
+            <a:headEnd type="none" w="sm" len="sm"/>
+            <a:tailEnd type="none" w="sm" len="sm"/>
+          </a:ln>
+        </p:spPr>
+        <p:txBody>
+          <a:bodyPr spcFirstLastPara="1" wrap="square" lIns="91425" tIns="45700" rIns="91425" bIns="45700" anchor="ctr" anchorCtr="0">
+            <a:noAutofit/>
+          </a:bodyPr>
+          <a:lstStyle/>
+          <a:p>
+            <a:pPr marL="0" marR="0" lvl="0" indent="0" algn="ctr" rtl="0">
+              <a:spcBef>
+                <a:spcPts val="0"/>
+              </a:spcBef>
+              <a:spcAft>
+                <a:spcPts val="0"/>
+              </a:spcAft>
+              <a:buNone/>
+            </a:pPr>
+            <a:endParaRPr sz="1800" b="0" i="0" u="none" strike="noStrike" cap="none">
+              <a:solidFill>
+                <a:schemeClr val="lt1"/>
+              </a:solidFill>
+              <a:highlight>
+                <a:srgbClr val="008000"/>
+              </a:highlight>
+              <a:latin typeface="Libre Franklin"/>
+              <a:ea typeface="Libre Franklin"/>
+              <a:cs typeface="Libre Franklin"/>
+              <a:sym typeface="Libre Franklin"/>
+            </a:endParaRPr>
+          </a:p>
+        </p:txBody>
+      </p:sp>
+      <p:sp>
+        <p:nvSpPr>
+          <p:cNvPr id="192" name="Google Shape;192;p25"/>
+          <p:cNvSpPr txBox="1"/>
+          <p:nvPr/>
+        </p:nvSpPr>
+        <p:spPr>
+          <a:xfrm>
+            <a:off x="8183100" y="883400"/>
+            <a:ext cx="4008900" cy="4471200"/>
+          </a:xfrm>
+          <a:prstGeom prst="rect">
+            <a:avLst/>
+          </a:prstGeom>
+          <a:noFill/>
+          <a:ln>
+            <a:noFill/>
+          </a:ln>
+        </p:spPr>
+        <p:txBody>
+          <a:bodyPr spcFirstLastPara="1" wrap="square" lIns="91425" tIns="45700" rIns="91425" bIns="45700" anchor="t" anchorCtr="0">
+            <a:noAutofit/>
+          </a:bodyPr>
+          <a:lstStyle/>
+          <a:p>
+            <a:pPr marL="0" marR="0" lvl="0" indent="0" algn="l" rtl="0">
+              <a:lnSpc>
+                <a:spcPct val="90000"/>
+              </a:lnSpc>
+              <a:spcBef>
+                <a:spcPts val="0"/>
+              </a:spcBef>
+              <a:spcAft>
+                <a:spcPts val="0"/>
+              </a:spcAft>
+              <a:buClr>
+                <a:srgbClr val="3F3F3F"/>
+              </a:buClr>
+              <a:buSzPts val="2200"/>
+              <a:buFont typeface="Bookman Old Style"/>
+              <a:buNone/>
+            </a:pPr>
+            <a:r>
+              <a:rPr lang="en-SG" sz="2200" dirty="0">
+                <a:solidFill>
+                  <a:srgbClr val="C00000"/>
+                </a:solidFill>
+                <a:latin typeface="Bookman Old Style"/>
+                <a:ea typeface="Bookman Old Style"/>
+                <a:cs typeface="Bookman Old Style"/>
+                <a:sym typeface="Bookman Old Style"/>
+              </a:rPr>
+              <a:t>Lower participation rates are correlated with higher mean test scores.</a:t>
+            </a:r>
+            <a:endParaRPr dirty="0">
+              <a:solidFill>
+                <a:srgbClr val="980000"/>
+              </a:solidFill>
+            </a:endParaRPr>
+          </a:p>
+          <a:p>
+            <a:pPr marL="0" marR="0" lvl="0" indent="0" algn="l" rtl="0">
+              <a:lnSpc>
+                <a:spcPct val="90000"/>
+              </a:lnSpc>
+              <a:spcBef>
+                <a:spcPts val="0"/>
+              </a:spcBef>
+              <a:spcAft>
+                <a:spcPts val="0"/>
+              </a:spcAft>
+              <a:buClr>
+                <a:srgbClr val="3F3F3F"/>
+              </a:buClr>
+              <a:buSzPts val="2200"/>
+              <a:buFont typeface="Bookman Old Style"/>
+              <a:buNone/>
+            </a:pPr>
+            <a:endParaRPr sz="2200" b="0" i="0" u="none" strike="noStrike" cap="none" dirty="0">
+              <a:solidFill>
+                <a:srgbClr val="3F3F3F"/>
+              </a:solidFill>
+              <a:latin typeface="Bookman Old Style"/>
+              <a:ea typeface="Bookman Old Style"/>
+              <a:cs typeface="Bookman Old Style"/>
+              <a:sym typeface="Bookman Old Style"/>
+            </a:endParaRPr>
+          </a:p>
+          <a:p>
+            <a:pPr marL="0" marR="0" lvl="0" indent="0" algn="l" rtl="0">
+              <a:lnSpc>
+                <a:spcPct val="90000"/>
+              </a:lnSpc>
+              <a:spcBef>
+                <a:spcPts val="0"/>
+              </a:spcBef>
+              <a:spcAft>
+                <a:spcPts val="0"/>
+              </a:spcAft>
+              <a:buClr>
+                <a:srgbClr val="3F3F3F"/>
+              </a:buClr>
+              <a:buSzPts val="2200"/>
+              <a:buFont typeface="Bookman Old Style"/>
+              <a:buNone/>
+            </a:pPr>
+            <a:endParaRPr sz="2200" b="0" i="0" u="none" strike="noStrike" cap="none" dirty="0">
+              <a:solidFill>
+                <a:srgbClr val="3F3F3F"/>
+              </a:solidFill>
+              <a:latin typeface="Bookman Old Style"/>
+              <a:ea typeface="Bookman Old Style"/>
+              <a:cs typeface="Bookman Old Style"/>
+              <a:sym typeface="Bookman Old Style"/>
+            </a:endParaRPr>
+          </a:p>
+          <a:p>
+            <a:pPr marL="342900" marR="0" lvl="0" indent="-342900" algn="l" rtl="0">
+              <a:lnSpc>
+                <a:spcPct val="90000"/>
+              </a:lnSpc>
+              <a:spcBef>
+                <a:spcPts val="0"/>
+              </a:spcBef>
+              <a:spcAft>
+                <a:spcPts val="0"/>
+              </a:spcAft>
+              <a:buClr>
+                <a:srgbClr val="3F3F3F"/>
+              </a:buClr>
+              <a:buSzPts val="1600"/>
+              <a:buFont typeface="Arial"/>
+              <a:buChar char="•"/>
+            </a:pPr>
+            <a:r>
+              <a:rPr lang="en-SG" sz="1600" dirty="0">
+                <a:solidFill>
+                  <a:srgbClr val="3F3F3F"/>
+                </a:solidFill>
+              </a:rPr>
+              <a:t>Participation rates are </a:t>
+            </a:r>
+            <a:r>
+              <a:rPr lang="en-SG" sz="1600" dirty="0">
+                <a:solidFill>
+                  <a:srgbClr val="674EA7"/>
+                </a:solidFill>
+              </a:rPr>
+              <a:t>strongly negatively correlated</a:t>
+            </a:r>
+            <a:r>
+              <a:rPr lang="en-SG" sz="1600" dirty="0">
+                <a:solidFill>
+                  <a:srgbClr val="3F3F3F"/>
+                </a:solidFill>
+              </a:rPr>
+              <a:t> to the test’s mean scores, indicating that larger numbers of students participating pull down the average mean scores.</a:t>
+            </a:r>
+            <a:endParaRPr sz="1600" dirty="0">
+              <a:solidFill>
+                <a:srgbClr val="3F3F3F"/>
+              </a:solidFill>
+            </a:endParaRPr>
+          </a:p>
+          <a:p>
+            <a:pPr marL="0" marR="0" lvl="0" indent="0" algn="l" rtl="0">
+              <a:lnSpc>
+                <a:spcPct val="90000"/>
+              </a:lnSpc>
+              <a:spcBef>
+                <a:spcPts val="0"/>
+              </a:spcBef>
+              <a:spcAft>
+                <a:spcPts val="0"/>
+              </a:spcAft>
+              <a:buNone/>
+            </a:pPr>
+            <a:endParaRPr sz="1600" dirty="0">
+              <a:solidFill>
+                <a:srgbClr val="3F3F3F"/>
+              </a:solidFill>
+            </a:endParaRPr>
+          </a:p>
+          <a:p>
+            <a:pPr marL="342900" marR="0" lvl="0" indent="-342900" algn="l" rtl="0">
+              <a:lnSpc>
+                <a:spcPct val="90000"/>
+              </a:lnSpc>
+              <a:spcBef>
+                <a:spcPts val="0"/>
+              </a:spcBef>
+              <a:spcAft>
+                <a:spcPts val="0"/>
+              </a:spcAft>
+              <a:buClr>
+                <a:srgbClr val="3F3F3F"/>
+              </a:buClr>
+              <a:buSzPts val="1600"/>
+              <a:buChar char="•"/>
+            </a:pPr>
+            <a:r>
+              <a:rPr lang="en-SG" sz="1600" dirty="0">
+                <a:solidFill>
+                  <a:srgbClr val="3F3F3F"/>
+                </a:solidFill>
+              </a:rPr>
+              <a:t>Participation rates for each test are also </a:t>
+            </a:r>
+            <a:r>
+              <a:rPr lang="en-SG" sz="1600" dirty="0">
+                <a:solidFill>
+                  <a:srgbClr val="A61C00"/>
+                </a:solidFill>
+              </a:rPr>
+              <a:t>strongly negatively correlated</a:t>
+            </a:r>
+            <a:r>
+              <a:rPr lang="en-SG" sz="1600" dirty="0">
+                <a:solidFill>
+                  <a:srgbClr val="3F3F3F"/>
+                </a:solidFill>
+              </a:rPr>
+              <a:t> with participation rates for the other test. </a:t>
+            </a:r>
+            <a:endParaRPr sz="1600" dirty="0">
+              <a:solidFill>
+                <a:srgbClr val="3F3F3F"/>
+              </a:solidFill>
+            </a:endParaRPr>
+          </a:p>
+          <a:p>
+            <a:pPr marL="0" marR="0" lvl="0" indent="0" algn="l" rtl="0">
+              <a:lnSpc>
+                <a:spcPct val="90000"/>
+              </a:lnSpc>
+              <a:spcBef>
+                <a:spcPts val="0"/>
+              </a:spcBef>
+              <a:spcAft>
+                <a:spcPts val="0"/>
+              </a:spcAft>
+              <a:buNone/>
+            </a:pPr>
+            <a:endParaRPr sz="1600" dirty="0">
+              <a:solidFill>
+                <a:srgbClr val="3F3F3F"/>
+              </a:solidFill>
+            </a:endParaRPr>
+          </a:p>
+          <a:p>
+            <a:pPr marL="360000" marR="0" lvl="0" indent="0" algn="l" rtl="0">
+              <a:lnSpc>
+                <a:spcPct val="90000"/>
+              </a:lnSpc>
+              <a:spcBef>
+                <a:spcPts val="0"/>
+              </a:spcBef>
+              <a:spcAft>
+                <a:spcPts val="0"/>
+              </a:spcAft>
+              <a:buNone/>
+            </a:pPr>
+            <a:r>
+              <a:rPr lang="en-SG" sz="1600" dirty="0">
+                <a:solidFill>
+                  <a:srgbClr val="3F3F3F"/>
+                </a:solidFill>
+              </a:rPr>
+              <a:t>As states move toward higher participation in either test, there is a corresponding decrease in participation for the other test.</a:t>
+            </a:r>
+            <a:endParaRPr sz="1600" dirty="0">
+              <a:solidFill>
+                <a:srgbClr val="3F3F3F"/>
+              </a:solidFill>
+            </a:endParaRPr>
+          </a:p>
+          <a:p>
+            <a:pPr marL="0" marR="0" lvl="0" indent="0" algn="l" rtl="0">
+              <a:lnSpc>
+                <a:spcPct val="90000"/>
+              </a:lnSpc>
+              <a:spcBef>
+                <a:spcPts val="0"/>
+              </a:spcBef>
+              <a:spcAft>
+                <a:spcPts val="0"/>
+              </a:spcAft>
+              <a:buNone/>
+            </a:pPr>
+            <a:endParaRPr sz="1600" dirty="0">
+              <a:solidFill>
+                <a:srgbClr val="3F3F3F"/>
+              </a:solidFill>
+            </a:endParaRPr>
+          </a:p>
+          <a:p>
+            <a:pPr marL="0" marR="0" lvl="0" indent="0" algn="l" rtl="0">
+              <a:lnSpc>
+                <a:spcPct val="90000"/>
+              </a:lnSpc>
+              <a:spcBef>
+                <a:spcPts val="0"/>
+              </a:spcBef>
+              <a:spcAft>
+                <a:spcPts val="0"/>
+              </a:spcAft>
+              <a:buNone/>
+            </a:pPr>
+            <a:endParaRPr sz="1600" dirty="0">
+              <a:solidFill>
+                <a:srgbClr val="3F3F3F"/>
+              </a:solidFill>
+            </a:endParaRPr>
+          </a:p>
+          <a:p>
+            <a:pPr marL="0" marR="0" lvl="0" indent="0" algn="l" rtl="0">
+              <a:lnSpc>
+                <a:spcPct val="90000"/>
+              </a:lnSpc>
+              <a:spcBef>
+                <a:spcPts val="0"/>
+              </a:spcBef>
+              <a:spcAft>
+                <a:spcPts val="0"/>
+              </a:spcAft>
+              <a:buClr>
+                <a:srgbClr val="3F3F3F"/>
+              </a:buClr>
+              <a:buSzPts val="2200"/>
+              <a:buFont typeface="Bookman Old Style"/>
+              <a:buNone/>
+            </a:pPr>
+            <a:endParaRPr sz="2200" b="0" i="0" u="none" strike="noStrike" cap="none" dirty="0">
+              <a:solidFill>
+                <a:srgbClr val="3F3F3F"/>
+              </a:solidFill>
+              <a:latin typeface="Bookman Old Style"/>
+              <a:ea typeface="Bookman Old Style"/>
+              <a:cs typeface="Bookman Old Style"/>
+              <a:sym typeface="Bookman Old Style"/>
+            </a:endParaRPr>
+          </a:p>
+          <a:p>
+            <a:pPr marL="0" marR="0" lvl="0" indent="0" algn="l" rtl="0">
+              <a:lnSpc>
+                <a:spcPct val="90000"/>
+              </a:lnSpc>
+              <a:spcBef>
+                <a:spcPts val="0"/>
+              </a:spcBef>
+              <a:spcAft>
+                <a:spcPts val="0"/>
+              </a:spcAft>
+              <a:buClr>
+                <a:srgbClr val="3F3F3F"/>
+              </a:buClr>
+              <a:buSzPts val="2200"/>
+              <a:buFont typeface="Bookman Old Style"/>
+              <a:buNone/>
+            </a:pPr>
+            <a:endParaRPr sz="2200" b="0" i="0" u="none" strike="noStrike" cap="none" dirty="0">
+              <a:solidFill>
+                <a:srgbClr val="3F3F3F"/>
+              </a:solidFill>
+              <a:latin typeface="Bookman Old Style"/>
+              <a:ea typeface="Bookman Old Style"/>
+              <a:cs typeface="Bookman Old Style"/>
+              <a:sym typeface="Bookman Old Style"/>
+            </a:endParaRPr>
+          </a:p>
+        </p:txBody>
+      </p:sp>
+      <p:cxnSp>
+        <p:nvCxnSpPr>
+          <p:cNvPr id="193" name="Google Shape;193;p25"/>
+          <p:cNvCxnSpPr/>
+          <p:nvPr/>
+        </p:nvCxnSpPr>
+        <p:spPr>
+          <a:xfrm>
+            <a:off x="8296712" y="2013358"/>
+            <a:ext cx="3431100" cy="0"/>
+          </a:xfrm>
+          <a:prstGeom prst="straightConnector1">
+            <a:avLst/>
+          </a:prstGeom>
+          <a:noFill/>
+          <a:ln w="12700" cap="flat" cmpd="sng">
+            <a:solidFill>
+              <a:schemeClr val="dk1"/>
+            </a:solidFill>
+            <a:prstDash val="solid"/>
+            <a:round/>
+            <a:headEnd type="none" w="sm" len="sm"/>
+            <a:tailEnd type="none" w="sm" len="sm"/>
+          </a:ln>
+        </p:spPr>
+      </p:cxnSp>
+      <p:sp>
+        <p:nvSpPr>
+          <p:cNvPr id="194" name="Google Shape;194;p25"/>
+          <p:cNvSpPr/>
+          <p:nvPr/>
+        </p:nvSpPr>
+        <p:spPr>
+          <a:xfrm>
+            <a:off x="2718425" y="1554419"/>
+            <a:ext cx="227400" cy="1098900"/>
+          </a:xfrm>
+          <a:prstGeom prst="rect">
+            <a:avLst/>
+          </a:prstGeom>
+          <a:noFill/>
+          <a:ln w="22225" cap="flat" cmpd="sng">
+            <a:solidFill>
+              <a:srgbClr val="9900FF"/>
+            </a:solidFill>
+            <a:prstDash val="solid"/>
+            <a:round/>
+            <a:headEnd type="none" w="sm" len="sm"/>
+            <a:tailEnd type="none" w="sm" len="sm"/>
+          </a:ln>
+        </p:spPr>
+        <p:txBody>
+          <a:bodyPr spcFirstLastPara="1" wrap="square" lIns="91425" tIns="45700" rIns="91425" bIns="45700" anchor="ctr" anchorCtr="0">
+            <a:noAutofit/>
+          </a:bodyPr>
+          <a:lstStyle/>
+          <a:p>
+            <a:pPr marL="0" marR="0" lvl="0" indent="0" algn="ctr" rtl="0">
+              <a:spcBef>
+                <a:spcPts val="0"/>
+              </a:spcBef>
+              <a:spcAft>
+                <a:spcPts val="0"/>
+              </a:spcAft>
+              <a:buNone/>
+            </a:pPr>
+            <a:endParaRPr sz="1800" b="0" i="0" u="none" strike="noStrike" cap="none">
+              <a:solidFill>
+                <a:schemeClr val="lt1"/>
+              </a:solidFill>
+              <a:highlight>
+                <a:srgbClr val="008000"/>
+              </a:highlight>
+              <a:latin typeface="Libre Franklin"/>
+              <a:ea typeface="Libre Franklin"/>
+              <a:cs typeface="Libre Franklin"/>
+              <a:sym typeface="Libre Franklin"/>
+            </a:endParaRPr>
+          </a:p>
+        </p:txBody>
+      </p:sp>
+      <p:sp>
+        <p:nvSpPr>
+          <p:cNvPr id="195" name="Google Shape;195;p25"/>
+          <p:cNvSpPr/>
+          <p:nvPr/>
+        </p:nvSpPr>
+        <p:spPr>
+          <a:xfrm>
+            <a:off x="4977294" y="3791091"/>
+            <a:ext cx="216000" cy="1098900"/>
+          </a:xfrm>
+          <a:prstGeom prst="rect">
+            <a:avLst/>
+          </a:prstGeom>
+          <a:noFill/>
+          <a:ln w="22225" cap="flat" cmpd="sng">
+            <a:solidFill>
+              <a:srgbClr val="9900FF"/>
+            </a:solidFill>
+            <a:prstDash val="solid"/>
+            <a:round/>
+            <a:headEnd type="none" w="sm" len="sm"/>
+            <a:tailEnd type="none" w="sm" len="sm"/>
+          </a:ln>
+        </p:spPr>
+        <p:txBody>
+          <a:bodyPr spcFirstLastPara="1" wrap="square" lIns="91425" tIns="45700" rIns="91425" bIns="45700" anchor="ctr" anchorCtr="0">
+            <a:noAutofit/>
+          </a:bodyPr>
+          <a:lstStyle/>
+          <a:p>
+            <a:pPr marL="0" marR="0" lvl="0" indent="0" algn="ctr" rtl="0">
+              <a:spcBef>
+                <a:spcPts val="0"/>
+              </a:spcBef>
+              <a:spcAft>
+                <a:spcPts val="0"/>
+              </a:spcAft>
+              <a:buNone/>
+            </a:pPr>
+            <a:endParaRPr sz="1800" b="0" i="0" u="none" strike="noStrike" cap="none">
+              <a:solidFill>
+                <a:schemeClr val="lt1"/>
+              </a:solidFill>
+              <a:highlight>
+                <a:srgbClr val="008000"/>
+              </a:highlight>
+              <a:latin typeface="Libre Franklin"/>
+              <a:ea typeface="Libre Franklin"/>
+              <a:cs typeface="Libre Franklin"/>
+              <a:sym typeface="Libre Franklin"/>
+            </a:endParaRPr>
+          </a:p>
+        </p:txBody>
+      </p:sp>
+      <p:sp>
+        <p:nvSpPr>
+          <p:cNvPr id="196" name="Google Shape;196;p25"/>
+          <p:cNvSpPr/>
+          <p:nvPr/>
+        </p:nvSpPr>
+        <p:spPr>
+          <a:xfrm>
+            <a:off x="4079331" y="2895100"/>
+            <a:ext cx="216000" cy="693000"/>
+          </a:xfrm>
+          <a:prstGeom prst="rect">
+            <a:avLst/>
+          </a:prstGeom>
+          <a:noFill/>
+          <a:ln w="22225" cap="flat" cmpd="sng">
+            <a:solidFill>
+              <a:srgbClr val="9900FF"/>
+            </a:solidFill>
+            <a:prstDash val="solid"/>
+            <a:round/>
+            <a:headEnd type="none" w="sm" len="sm"/>
+            <a:tailEnd type="none" w="sm" len="sm"/>
+          </a:ln>
+        </p:spPr>
+        <p:txBody>
+          <a:bodyPr spcFirstLastPara="1" wrap="square" lIns="91425" tIns="45700" rIns="91425" bIns="45700" anchor="ctr" anchorCtr="0">
+            <a:noAutofit/>
+          </a:bodyPr>
+          <a:lstStyle/>
+          <a:p>
+            <a:pPr marL="0" marR="0" lvl="0" indent="0" algn="ctr" rtl="0">
+              <a:spcBef>
+                <a:spcPts val="0"/>
+              </a:spcBef>
+              <a:spcAft>
+                <a:spcPts val="0"/>
+              </a:spcAft>
+              <a:buNone/>
+            </a:pPr>
+            <a:endParaRPr sz="1800" b="0" i="0" u="none" strike="noStrike" cap="none">
+              <a:solidFill>
+                <a:schemeClr val="lt1"/>
+              </a:solidFill>
+              <a:highlight>
+                <a:srgbClr val="008000"/>
+              </a:highlight>
+              <a:latin typeface="Libre Franklin"/>
+              <a:ea typeface="Libre Franklin"/>
+              <a:cs typeface="Libre Franklin"/>
+              <a:sym typeface="Libre Franklin"/>
+            </a:endParaRPr>
+          </a:p>
+        </p:txBody>
+      </p:sp>
+      <p:sp>
+        <p:nvSpPr>
+          <p:cNvPr id="197" name="Google Shape;197;p25"/>
+          <p:cNvSpPr/>
+          <p:nvPr/>
+        </p:nvSpPr>
+        <p:spPr>
+          <a:xfrm>
+            <a:off x="1815578" y="628000"/>
+            <a:ext cx="216000" cy="693000"/>
+          </a:xfrm>
+          <a:prstGeom prst="rect">
+            <a:avLst/>
+          </a:prstGeom>
+          <a:noFill/>
+          <a:ln w="22225" cap="flat" cmpd="sng">
+            <a:solidFill>
+              <a:srgbClr val="9900FF"/>
+            </a:solidFill>
+            <a:prstDash val="solid"/>
+            <a:round/>
+            <a:headEnd type="none" w="sm" len="sm"/>
+            <a:tailEnd type="none" w="sm" len="sm"/>
+          </a:ln>
+        </p:spPr>
+        <p:txBody>
+          <a:bodyPr spcFirstLastPara="1" wrap="square" lIns="91425" tIns="45700" rIns="91425" bIns="45700" anchor="ctr" anchorCtr="0">
+            <a:noAutofit/>
+          </a:bodyPr>
+          <a:lstStyle/>
+          <a:p>
+            <a:pPr marL="0" marR="0" lvl="0" indent="0" algn="ctr" rtl="0">
+              <a:spcBef>
+                <a:spcPts val="0"/>
+              </a:spcBef>
+              <a:spcAft>
+                <a:spcPts val="0"/>
+              </a:spcAft>
+              <a:buNone/>
+            </a:pPr>
+            <a:endParaRPr sz="1800" b="0" i="0" u="none" strike="noStrike" cap="none">
+              <a:solidFill>
+                <a:schemeClr val="lt1"/>
+              </a:solidFill>
+              <a:highlight>
+                <a:srgbClr val="008000"/>
+              </a:highlight>
+              <a:latin typeface="Libre Franklin"/>
+              <a:ea typeface="Libre Franklin"/>
+              <a:cs typeface="Libre Franklin"/>
+              <a:sym typeface="Libre Franklin"/>
+            </a:endParaRPr>
+          </a:p>
+        </p:txBody>
+      </p:sp>
+      <p:sp>
+        <p:nvSpPr>
+          <p:cNvPr id="198" name="Google Shape;198;p25"/>
+          <p:cNvSpPr/>
+          <p:nvPr/>
+        </p:nvSpPr>
+        <p:spPr>
+          <a:xfrm>
+            <a:off x="1819028" y="1321000"/>
+            <a:ext cx="216000" cy="216000"/>
+          </a:xfrm>
+          <a:prstGeom prst="rect">
+            <a:avLst/>
+          </a:prstGeom>
+          <a:noFill/>
+          <a:ln w="22225" cap="flat" cmpd="sng">
+            <a:solidFill>
+              <a:srgbClr val="FF0000"/>
+            </a:solidFill>
+            <a:prstDash val="solid"/>
+            <a:round/>
+            <a:headEnd type="none" w="sm" len="sm"/>
+            <a:tailEnd type="none" w="sm" len="sm"/>
+          </a:ln>
+        </p:spPr>
+        <p:txBody>
+          <a:bodyPr spcFirstLastPara="1" wrap="square" lIns="91425" tIns="45700" rIns="91425" bIns="45700" anchor="ctr" anchorCtr="0">
+            <a:noAutofit/>
+          </a:bodyPr>
+          <a:lstStyle/>
+          <a:p>
+            <a:pPr marL="0" marR="0" lvl="0" indent="0" algn="ctr" rtl="0">
+              <a:spcBef>
+                <a:spcPts val="0"/>
+              </a:spcBef>
+              <a:spcAft>
+                <a:spcPts val="0"/>
+              </a:spcAft>
+              <a:buNone/>
+            </a:pPr>
+            <a:endParaRPr sz="1800" b="0" i="0" u="none" strike="noStrike" cap="none">
+              <a:solidFill>
+                <a:schemeClr val="lt1"/>
+              </a:solidFill>
+              <a:highlight>
+                <a:srgbClr val="008000"/>
+              </a:highlight>
+              <a:latin typeface="Libre Franklin"/>
+              <a:ea typeface="Libre Franklin"/>
+              <a:cs typeface="Libre Franklin"/>
+              <a:sym typeface="Libre Franklin"/>
+            </a:endParaRPr>
+          </a:p>
+        </p:txBody>
+      </p:sp>
+    </p:spTree>
+  </p:cSld>
+  <p:clrMapOvr>
+    <a:masterClrMapping/>
+  </p:clrMapOvr>
+</p:sld>
+</file>
+
+<file path=ppt/slides/slide14.xml><?xml version="1.0" encoding="utf-8"?>
 <p:sld xmlns:a="http://schemas.openxmlformats.org/drawingml/2006/main" xmlns:r="http://schemas.openxmlformats.org/officeDocument/2006/relationships" xmlns:p="http://schemas.openxmlformats.org/presentationml/2006/main">
   <p:cSld>
     <p:spTree>
@@ -14899,7 +15860,7 @@
 </p:sld>
 </file>
 
-<file path=ppt/slides/slide13.xml><?xml version="1.0" encoding="utf-8"?>
+<file path=ppt/slides/slide15.xml><?xml version="1.0" encoding="utf-8"?>
 <p:sld xmlns:a="http://schemas.openxmlformats.org/drawingml/2006/main" xmlns:r="http://schemas.openxmlformats.org/officeDocument/2006/relationships" xmlns:p="http://schemas.openxmlformats.org/presentationml/2006/main">
   <p:cSld>
     <p:spTree>
@@ -15404,7 +16365,7 @@
 </p:sld>
 </file>
 
-<file path=ppt/slides/slide14.xml><?xml version="1.0" encoding="utf-8"?>
+<file path=ppt/slides/slide16.xml><?xml version="1.0" encoding="utf-8"?>
 <p:sld xmlns:a="http://schemas.openxmlformats.org/drawingml/2006/main" xmlns:r="http://schemas.openxmlformats.org/officeDocument/2006/relationships" xmlns:p="http://schemas.openxmlformats.org/presentationml/2006/main">
   <p:cSld>
     <p:spTree>
@@ -15462,7 +16423,7 @@
 </p:sld>
 </file>
 
-<file path=ppt/slides/slide15.xml><?xml version="1.0" encoding="utf-8"?>
+<file path=ppt/slides/slide17.xml><?xml version="1.0" encoding="utf-8"?>
 <p:sld xmlns:a="http://schemas.openxmlformats.org/drawingml/2006/main" xmlns:r="http://schemas.openxmlformats.org/officeDocument/2006/relationships" xmlns:p="http://schemas.openxmlformats.org/presentationml/2006/main">
   <p:cSld>
     <p:spTree>
@@ -15936,467 +16897,6 @@
 </p:sld>
 </file>
 
-<file path=ppt/slides/slide16.xml><?xml version="1.0" encoding="utf-8"?>
-<p:sld xmlns:a="http://schemas.openxmlformats.org/drawingml/2006/main" xmlns:r="http://schemas.openxmlformats.org/officeDocument/2006/relationships" xmlns:p="http://schemas.openxmlformats.org/presentationml/2006/main">
-  <p:cSld>
-    <p:spTree>
-      <p:nvGrpSpPr>
-        <p:cNvPr id="1" name="Shape 184"/>
-        <p:cNvGrpSpPr/>
-        <p:nvPr/>
-      </p:nvGrpSpPr>
-      <p:grpSpPr>
-        <a:xfrm>
-          <a:off x="0" y="0"/>
-          <a:ext cx="0" cy="0"/>
-          <a:chOff x="0" y="0"/>
-          <a:chExt cx="0" cy="0"/>
-        </a:xfrm>
-      </p:grpSpPr>
-      <p:sp>
-        <p:nvSpPr>
-          <p:cNvPr id="185" name="Google Shape;185;p23"/>
-          <p:cNvSpPr txBox="1">
-            <a:spLocks noGrp="1"/>
-          </p:cNvSpPr>
-          <p:nvPr>
-            <p:ph type="title"/>
-          </p:nvPr>
-        </p:nvSpPr>
-        <p:spPr>
-          <a:xfrm>
-            <a:off x="1097280" y="286603"/>
-            <a:ext cx="10058400" cy="1450757"/>
-          </a:xfrm>
-          <a:prstGeom prst="rect">
-            <a:avLst/>
-          </a:prstGeom>
-          <a:noFill/>
-          <a:ln>
-            <a:noFill/>
-          </a:ln>
-        </p:spPr>
-        <p:txBody>
-          <a:bodyPr spcFirstLastPara="1" wrap="square" lIns="91425" tIns="45700" rIns="91425" bIns="45700" anchor="b" anchorCtr="0">
-            <a:noAutofit/>
-          </a:bodyPr>
-          <a:lstStyle/>
-          <a:p>
-            <a:pPr marL="0" lvl="0" indent="0" algn="l" rtl="0">
-              <a:lnSpc>
-                <a:spcPct val="90000"/>
-              </a:lnSpc>
-              <a:spcBef>
-                <a:spcPts val="0"/>
-              </a:spcBef>
-              <a:spcAft>
-                <a:spcPts val="0"/>
-              </a:spcAft>
-              <a:buClr>
-                <a:srgbClr val="3F3F3F"/>
-              </a:buClr>
-              <a:buSzPts val="3200"/>
-              <a:buFont typeface="Bookman Old Style"/>
-              <a:buNone/>
-            </a:pPr>
-            <a:r>
-              <a:rPr lang="en-SG" sz="3200" dirty="0"/>
-              <a:t>Data Limitation</a:t>
-            </a:r>
-            <a:endParaRPr dirty="0"/>
-          </a:p>
-        </p:txBody>
-      </p:sp>
-      <p:sp>
-        <p:nvSpPr>
-          <p:cNvPr id="186" name="Google Shape;186;p23"/>
-          <p:cNvSpPr txBox="1">
-            <a:spLocks noGrp="1"/>
-          </p:cNvSpPr>
-          <p:nvPr>
-            <p:ph type="body" idx="1"/>
-          </p:nvPr>
-        </p:nvSpPr>
-        <p:spPr>
-          <a:xfrm>
-            <a:off x="1216404" y="2108201"/>
-            <a:ext cx="9939276" cy="3760891"/>
-          </a:xfrm>
-          <a:prstGeom prst="rect">
-            <a:avLst/>
-          </a:prstGeom>
-          <a:noFill/>
-          <a:ln>
-            <a:noFill/>
-          </a:ln>
-        </p:spPr>
-        <p:txBody>
-          <a:bodyPr spcFirstLastPara="1" wrap="square" lIns="0" tIns="45700" rIns="0" bIns="45700" anchor="t" anchorCtr="0">
-            <a:noAutofit/>
-          </a:bodyPr>
-          <a:lstStyle/>
-          <a:p>
-            <a:pPr marL="0" lvl="0" indent="0" algn="l" rtl="0">
-              <a:lnSpc>
-                <a:spcPct val="90000"/>
-              </a:lnSpc>
-              <a:spcBef>
-                <a:spcPts val="0"/>
-              </a:spcBef>
-              <a:spcAft>
-                <a:spcPts val="0"/>
-              </a:spcAft>
-              <a:buSzPts val="1600"/>
-              <a:buNone/>
-            </a:pPr>
-            <a:endParaRPr sz="1600" dirty="0">
-              <a:latin typeface="Arial"/>
-              <a:ea typeface="Arial"/>
-              <a:cs typeface="Arial"/>
-              <a:sym typeface="Arial"/>
-            </a:endParaRPr>
-          </a:p>
-          <a:p>
-            <a:pPr marL="342900" lvl="0" indent="-342900" algn="l" rtl="0">
-              <a:lnSpc>
-                <a:spcPct val="90000"/>
-              </a:lnSpc>
-              <a:spcBef>
-                <a:spcPts val="200"/>
-              </a:spcBef>
-              <a:spcAft>
-                <a:spcPts val="0"/>
-              </a:spcAft>
-              <a:buClr>
-                <a:srgbClr val="3F3F3F"/>
-              </a:buClr>
-              <a:buSzPts val="1600"/>
-              <a:buFont typeface="Arial"/>
-              <a:buChar char="•"/>
-            </a:pPr>
-            <a:r>
-              <a:rPr lang="en-US" sz="1600" dirty="0">
-                <a:latin typeface="Arial"/>
-                <a:ea typeface="Arial"/>
-                <a:cs typeface="Arial"/>
-                <a:sym typeface="Arial"/>
-              </a:rPr>
-              <a:t>Statistical inferences for national population based cannot be made based on the 51 state samples as the samples are not randomly drawn.</a:t>
-            </a:r>
-          </a:p>
-          <a:p>
-            <a:pPr marL="342900" lvl="0" indent="-342900" algn="l" rtl="0">
-              <a:lnSpc>
-                <a:spcPct val="90000"/>
-              </a:lnSpc>
-              <a:spcBef>
-                <a:spcPts val="200"/>
-              </a:spcBef>
-              <a:spcAft>
-                <a:spcPts val="0"/>
-              </a:spcAft>
-              <a:buClr>
-                <a:srgbClr val="3F3F3F"/>
-              </a:buClr>
-              <a:buSzPts val="1600"/>
-              <a:buFont typeface="Arial"/>
-              <a:buChar char="•"/>
-            </a:pPr>
-            <a:endParaRPr lang="en-US" sz="1600" dirty="0">
-              <a:latin typeface="Arial"/>
-              <a:ea typeface="Arial"/>
-              <a:cs typeface="Arial"/>
-              <a:sym typeface="Arial"/>
-            </a:endParaRPr>
-          </a:p>
-          <a:p>
-            <a:pPr marL="342900" lvl="0" indent="-342900" algn="l" rtl="0">
-              <a:lnSpc>
-                <a:spcPct val="90000"/>
-              </a:lnSpc>
-              <a:spcBef>
-                <a:spcPts val="200"/>
-              </a:spcBef>
-              <a:spcAft>
-                <a:spcPts val="0"/>
-              </a:spcAft>
-              <a:buClr>
-                <a:srgbClr val="3F3F3F"/>
-              </a:buClr>
-              <a:buSzPts val="1600"/>
-              <a:buFont typeface="Arial"/>
-              <a:buChar char="•"/>
-            </a:pPr>
-            <a:r>
-              <a:rPr lang="en-US" sz="1600" dirty="0">
-                <a:latin typeface="Arial"/>
-                <a:ea typeface="Arial"/>
-                <a:cs typeface="Arial"/>
-                <a:sym typeface="Arial"/>
-              </a:rPr>
-              <a:t>Given data availability for the year 2017 and 2018 only, and not for subsequent or preceding years, this trend analysis is limited to these 2 years rather than offering a longitudinal view.</a:t>
-            </a:r>
-          </a:p>
-          <a:p>
-            <a:pPr marL="342900" lvl="0" indent="-342900" algn="l" rtl="0">
-              <a:lnSpc>
-                <a:spcPct val="90000"/>
-              </a:lnSpc>
-              <a:spcBef>
-                <a:spcPts val="200"/>
-              </a:spcBef>
-              <a:spcAft>
-                <a:spcPts val="0"/>
-              </a:spcAft>
-              <a:buClr>
-                <a:srgbClr val="3F3F3F"/>
-              </a:buClr>
-              <a:buSzPts val="1600"/>
-              <a:buFont typeface="Arial"/>
-              <a:buChar char="•"/>
-            </a:pPr>
-            <a:endParaRPr lang="en-US" sz="1600" dirty="0">
-              <a:latin typeface="Arial"/>
-              <a:ea typeface="Arial"/>
-              <a:cs typeface="Arial"/>
-              <a:sym typeface="Arial"/>
-            </a:endParaRPr>
-          </a:p>
-          <a:p>
-            <a:pPr marL="342900" lvl="0" indent="-342900" algn="l" rtl="0">
-              <a:lnSpc>
-                <a:spcPct val="90000"/>
-              </a:lnSpc>
-              <a:spcBef>
-                <a:spcPts val="200"/>
-              </a:spcBef>
-              <a:spcAft>
-                <a:spcPts val="0"/>
-              </a:spcAft>
-              <a:buClr>
-                <a:srgbClr val="3F3F3F"/>
-              </a:buClr>
-              <a:buSzPts val="1600"/>
-              <a:buFont typeface="Arial"/>
-              <a:buChar char="•"/>
-            </a:pPr>
-            <a:r>
-              <a:rPr lang="en-US" sz="1600" dirty="0">
-                <a:latin typeface="Arial"/>
-                <a:ea typeface="Arial"/>
-                <a:cs typeface="Arial"/>
-                <a:sym typeface="Arial"/>
-              </a:rPr>
-              <a:t>With the aggregation of data by state, there are only 51 data points per dataset to work with, and more granular analyses on a county or school level cannot be performed.</a:t>
-            </a:r>
-          </a:p>
-          <a:p>
-            <a:pPr marL="342900" lvl="0" indent="-342900" algn="l" rtl="0">
-              <a:lnSpc>
-                <a:spcPct val="90000"/>
-              </a:lnSpc>
-              <a:spcBef>
-                <a:spcPts val="200"/>
-              </a:spcBef>
-              <a:spcAft>
-                <a:spcPts val="0"/>
-              </a:spcAft>
-              <a:buClr>
-                <a:srgbClr val="3F3F3F"/>
-              </a:buClr>
-              <a:buSzPts val="1600"/>
-              <a:buFont typeface="Arial"/>
-              <a:buChar char="•"/>
-            </a:pPr>
-            <a:endParaRPr lang="en-US" sz="1600" dirty="0">
-              <a:latin typeface="Arial"/>
-              <a:ea typeface="Arial"/>
-              <a:cs typeface="Arial"/>
-              <a:sym typeface="Arial"/>
-            </a:endParaRPr>
-          </a:p>
-          <a:p>
-            <a:pPr marL="342900" lvl="0" indent="-342900" algn="l" rtl="0">
-              <a:lnSpc>
-                <a:spcPct val="90000"/>
-              </a:lnSpc>
-              <a:spcBef>
-                <a:spcPts val="200"/>
-              </a:spcBef>
-              <a:spcAft>
-                <a:spcPts val="0"/>
-              </a:spcAft>
-              <a:buClr>
-                <a:srgbClr val="3F3F3F"/>
-              </a:buClr>
-              <a:buSzPts val="1600"/>
-              <a:buFont typeface="Arial"/>
-              <a:buChar char="•"/>
-            </a:pPr>
-            <a:r>
-              <a:rPr lang="en-US" sz="1600" dirty="0">
-                <a:latin typeface="Arial"/>
-                <a:ea typeface="Arial"/>
-                <a:cs typeface="Arial"/>
-                <a:sym typeface="Arial"/>
-              </a:rPr>
-              <a:t>Hence, the conclusions and recommendations made are subjected to these data limitations.</a:t>
-            </a:r>
-          </a:p>
-          <a:p>
-            <a:pPr marL="0" lvl="0" indent="0" algn="l" rtl="0">
-              <a:lnSpc>
-                <a:spcPct val="90000"/>
-              </a:lnSpc>
-              <a:spcBef>
-                <a:spcPts val="200"/>
-              </a:spcBef>
-              <a:spcAft>
-                <a:spcPts val="0"/>
-              </a:spcAft>
-              <a:buNone/>
-            </a:pPr>
-            <a:endParaRPr sz="1800" dirty="0">
-              <a:latin typeface="Arial"/>
-              <a:ea typeface="Arial"/>
-              <a:cs typeface="Arial"/>
-              <a:sym typeface="Arial"/>
-            </a:endParaRPr>
-          </a:p>
-          <a:p>
-            <a:pPr marL="342900" lvl="0" indent="-241300" algn="l" rtl="0">
-              <a:lnSpc>
-                <a:spcPct val="90000"/>
-              </a:lnSpc>
-              <a:spcBef>
-                <a:spcPts val="200"/>
-              </a:spcBef>
-              <a:spcAft>
-                <a:spcPts val="0"/>
-              </a:spcAft>
-              <a:buClr>
-                <a:srgbClr val="3F3F3F"/>
-              </a:buClr>
-              <a:buSzPts val="1600"/>
-              <a:buFont typeface="Arial"/>
-              <a:buNone/>
-            </a:pPr>
-            <a:endParaRPr sz="1600" dirty="0">
-              <a:latin typeface="Arial"/>
-              <a:ea typeface="Arial"/>
-              <a:cs typeface="Arial"/>
-              <a:sym typeface="Arial"/>
-            </a:endParaRPr>
-          </a:p>
-          <a:p>
-            <a:pPr marL="342900" lvl="0" indent="-241300" algn="l" rtl="0">
-              <a:lnSpc>
-                <a:spcPct val="90000"/>
-              </a:lnSpc>
-              <a:spcBef>
-                <a:spcPts val="200"/>
-              </a:spcBef>
-              <a:spcAft>
-                <a:spcPts val="0"/>
-              </a:spcAft>
-              <a:buClr>
-                <a:srgbClr val="3F3F3F"/>
-              </a:buClr>
-              <a:buSzPts val="1600"/>
-              <a:buFont typeface="Arial"/>
-              <a:buNone/>
-            </a:pPr>
-            <a:endParaRPr sz="1600" dirty="0">
-              <a:latin typeface="Arial"/>
-              <a:ea typeface="Arial"/>
-              <a:cs typeface="Arial"/>
-              <a:sym typeface="Arial"/>
-            </a:endParaRPr>
-          </a:p>
-          <a:p>
-            <a:pPr marL="0" lvl="0" indent="0" algn="l" rtl="0">
-              <a:lnSpc>
-                <a:spcPct val="110000"/>
-              </a:lnSpc>
-              <a:spcBef>
-                <a:spcPts val="1400"/>
-              </a:spcBef>
-              <a:spcAft>
-                <a:spcPts val="0"/>
-              </a:spcAft>
-              <a:buClr>
-                <a:srgbClr val="3F3F3F"/>
-              </a:buClr>
-              <a:buSzPts val="1800"/>
-              <a:buNone/>
-            </a:pPr>
-            <a:endParaRPr sz="1800" dirty="0">
-              <a:latin typeface="Arial"/>
-              <a:ea typeface="Arial"/>
-              <a:cs typeface="Arial"/>
-              <a:sym typeface="Arial"/>
-            </a:endParaRPr>
-          </a:p>
-          <a:p>
-            <a:pPr marL="0" lvl="0" indent="0" algn="l" rtl="0">
-              <a:lnSpc>
-                <a:spcPct val="110000"/>
-              </a:lnSpc>
-              <a:spcBef>
-                <a:spcPts val="1400"/>
-              </a:spcBef>
-              <a:spcAft>
-                <a:spcPts val="0"/>
-              </a:spcAft>
-              <a:buClr>
-                <a:srgbClr val="3F3F3F"/>
-              </a:buClr>
-              <a:buSzPts val="1800"/>
-              <a:buNone/>
-            </a:pPr>
-            <a:endParaRPr sz="1800" dirty="0">
-              <a:latin typeface="Arial"/>
-              <a:ea typeface="Arial"/>
-              <a:cs typeface="Arial"/>
-              <a:sym typeface="Arial"/>
-            </a:endParaRPr>
-          </a:p>
-          <a:p>
-            <a:pPr marL="0" lvl="0" indent="0" algn="l" rtl="0">
-              <a:lnSpc>
-                <a:spcPct val="110000"/>
-              </a:lnSpc>
-              <a:spcBef>
-                <a:spcPts val="1400"/>
-              </a:spcBef>
-              <a:spcAft>
-                <a:spcPts val="0"/>
-              </a:spcAft>
-              <a:buSzPts val="1800"/>
-              <a:buNone/>
-            </a:pPr>
-            <a:endParaRPr sz="1800" dirty="0">
-              <a:latin typeface="Arial"/>
-              <a:ea typeface="Arial"/>
-              <a:cs typeface="Arial"/>
-              <a:sym typeface="Arial"/>
-            </a:endParaRPr>
-          </a:p>
-        </p:txBody>
-      </p:sp>
-    </p:spTree>
-    <p:extLst>
-      <p:ext uri="{BB962C8B-B14F-4D97-AF65-F5344CB8AC3E}">
-        <p14:creationId xmlns:p14="http://schemas.microsoft.com/office/powerpoint/2010/main" val="924768088"/>
-      </p:ext>
-    </p:extLst>
-  </p:cSld>
-  <p:clrMapOvr>
-    <a:masterClrMapping/>
-  </p:clrMapOvr>
-</p:sld>
-</file>
-
 <file path=ppt/slides/slide2.xml><?xml version="1.0" encoding="utf-8"?>
 <p:sld xmlns:a="http://schemas.openxmlformats.org/drawingml/2006/main" xmlns:r="http://schemas.openxmlformats.org/officeDocument/2006/relationships" xmlns:p="http://schemas.openxmlformats.org/presentationml/2006/main">
   <p:cSld>
@@ -16489,6 +16989,16 @@
             </a:pPr>
             <a:r>
               <a:rPr lang="en-SG" dirty="0"/>
+              <a:t>Data Limitations</a:t>
+            </a:r>
+          </a:p>
+          <a:p>
+            <a:pPr>
+              <a:buFont typeface="Arial" panose="020B0604020202020204" pitchFamily="34" charset="0"/>
+              <a:buChar char="•"/>
+            </a:pPr>
+            <a:r>
+              <a:rPr lang="en-SG" dirty="0"/>
               <a:t>Exploratory Data Analysis</a:t>
             </a:r>
           </a:p>
@@ -16501,17 +17011,6 @@
               <a:rPr lang="en-SG" dirty="0"/>
               <a:t>Conclusion &amp; Recommendations</a:t>
             </a:r>
-          </a:p>
-          <a:p>
-            <a:pPr>
-              <a:buFont typeface="Arial" panose="020B0604020202020204" pitchFamily="34" charset="0"/>
-              <a:buChar char="•"/>
-            </a:pPr>
-            <a:r>
-              <a:rPr lang="en-SG"/>
-              <a:t>Data Limitations</a:t>
-            </a:r>
-            <a:endParaRPr lang="en-SG" dirty="0"/>
           </a:p>
           <a:p>
             <a:pPr>
@@ -19116,6 +19615,467 @@
   <p:cSld>
     <p:spTree>
       <p:nvGrpSpPr>
+        <p:cNvPr id="1" name="Shape 184"/>
+        <p:cNvGrpSpPr/>
+        <p:nvPr/>
+      </p:nvGrpSpPr>
+      <p:grpSpPr>
+        <a:xfrm>
+          <a:off x="0" y="0"/>
+          <a:ext cx="0" cy="0"/>
+          <a:chOff x="0" y="0"/>
+          <a:chExt cx="0" cy="0"/>
+        </a:xfrm>
+      </p:grpSpPr>
+      <p:sp>
+        <p:nvSpPr>
+          <p:cNvPr id="185" name="Google Shape;185;p23"/>
+          <p:cNvSpPr txBox="1">
+            <a:spLocks noGrp="1"/>
+          </p:cNvSpPr>
+          <p:nvPr>
+            <p:ph type="title"/>
+          </p:nvPr>
+        </p:nvSpPr>
+        <p:spPr>
+          <a:xfrm>
+            <a:off x="1097280" y="286603"/>
+            <a:ext cx="10058400" cy="1450757"/>
+          </a:xfrm>
+          <a:prstGeom prst="rect">
+            <a:avLst/>
+          </a:prstGeom>
+          <a:noFill/>
+          <a:ln>
+            <a:noFill/>
+          </a:ln>
+        </p:spPr>
+        <p:txBody>
+          <a:bodyPr spcFirstLastPara="1" wrap="square" lIns="91425" tIns="45700" rIns="91425" bIns="45700" anchor="b" anchorCtr="0">
+            <a:noAutofit/>
+          </a:bodyPr>
+          <a:lstStyle/>
+          <a:p>
+            <a:pPr marL="0" lvl="0" indent="0" algn="l" rtl="0">
+              <a:lnSpc>
+                <a:spcPct val="90000"/>
+              </a:lnSpc>
+              <a:spcBef>
+                <a:spcPts val="0"/>
+              </a:spcBef>
+              <a:spcAft>
+                <a:spcPts val="0"/>
+              </a:spcAft>
+              <a:buClr>
+                <a:srgbClr val="3F3F3F"/>
+              </a:buClr>
+              <a:buSzPts val="3200"/>
+              <a:buFont typeface="Bookman Old Style"/>
+              <a:buNone/>
+            </a:pPr>
+            <a:r>
+              <a:rPr lang="en-SG" sz="3200" dirty="0"/>
+              <a:t>Data Limitation</a:t>
+            </a:r>
+            <a:endParaRPr dirty="0"/>
+          </a:p>
+        </p:txBody>
+      </p:sp>
+      <p:sp>
+        <p:nvSpPr>
+          <p:cNvPr id="186" name="Google Shape;186;p23"/>
+          <p:cNvSpPr txBox="1">
+            <a:spLocks noGrp="1"/>
+          </p:cNvSpPr>
+          <p:nvPr>
+            <p:ph type="body" idx="1"/>
+          </p:nvPr>
+        </p:nvSpPr>
+        <p:spPr>
+          <a:xfrm>
+            <a:off x="1216404" y="2108201"/>
+            <a:ext cx="9939276" cy="3760891"/>
+          </a:xfrm>
+          <a:prstGeom prst="rect">
+            <a:avLst/>
+          </a:prstGeom>
+          <a:noFill/>
+          <a:ln>
+            <a:noFill/>
+          </a:ln>
+        </p:spPr>
+        <p:txBody>
+          <a:bodyPr spcFirstLastPara="1" wrap="square" lIns="0" tIns="45700" rIns="0" bIns="45700" anchor="t" anchorCtr="0">
+            <a:noAutofit/>
+          </a:bodyPr>
+          <a:lstStyle/>
+          <a:p>
+            <a:pPr marL="0" lvl="0" indent="0" algn="l" rtl="0">
+              <a:lnSpc>
+                <a:spcPct val="90000"/>
+              </a:lnSpc>
+              <a:spcBef>
+                <a:spcPts val="0"/>
+              </a:spcBef>
+              <a:spcAft>
+                <a:spcPts val="0"/>
+              </a:spcAft>
+              <a:buSzPts val="1600"/>
+              <a:buNone/>
+            </a:pPr>
+            <a:endParaRPr sz="1600" dirty="0">
+              <a:latin typeface="Arial"/>
+              <a:ea typeface="Arial"/>
+              <a:cs typeface="Arial"/>
+              <a:sym typeface="Arial"/>
+            </a:endParaRPr>
+          </a:p>
+          <a:p>
+            <a:pPr marL="342900" lvl="0" indent="-342900" algn="l" rtl="0">
+              <a:lnSpc>
+                <a:spcPct val="90000"/>
+              </a:lnSpc>
+              <a:spcBef>
+                <a:spcPts val="200"/>
+              </a:spcBef>
+              <a:spcAft>
+                <a:spcPts val="0"/>
+              </a:spcAft>
+              <a:buClr>
+                <a:srgbClr val="3F3F3F"/>
+              </a:buClr>
+              <a:buSzPts val="1600"/>
+              <a:buFont typeface="Arial"/>
+              <a:buChar char="•"/>
+            </a:pPr>
+            <a:r>
+              <a:rPr lang="en-US" sz="1600" dirty="0">
+                <a:latin typeface="Arial"/>
+                <a:ea typeface="Arial"/>
+                <a:cs typeface="Arial"/>
+                <a:sym typeface="Arial"/>
+              </a:rPr>
+              <a:t>Statistical inferences for national population based cannot be made based on the 51 state samples as the samples are not randomly drawn. </a:t>
+            </a:r>
+          </a:p>
+          <a:p>
+            <a:pPr marL="342900" lvl="0" indent="-342900" algn="l" rtl="0">
+              <a:lnSpc>
+                <a:spcPct val="90000"/>
+              </a:lnSpc>
+              <a:spcBef>
+                <a:spcPts val="200"/>
+              </a:spcBef>
+              <a:spcAft>
+                <a:spcPts val="0"/>
+              </a:spcAft>
+              <a:buClr>
+                <a:srgbClr val="3F3F3F"/>
+              </a:buClr>
+              <a:buSzPts val="1600"/>
+              <a:buFont typeface="Arial"/>
+              <a:buChar char="•"/>
+            </a:pPr>
+            <a:endParaRPr lang="en-US" sz="1600" dirty="0">
+              <a:latin typeface="Arial"/>
+              <a:ea typeface="Arial"/>
+              <a:cs typeface="Arial"/>
+              <a:sym typeface="Arial"/>
+            </a:endParaRPr>
+          </a:p>
+          <a:p>
+            <a:pPr marL="342900" lvl="0" indent="-342900" algn="l" rtl="0">
+              <a:lnSpc>
+                <a:spcPct val="90000"/>
+              </a:lnSpc>
+              <a:spcBef>
+                <a:spcPts val="200"/>
+              </a:spcBef>
+              <a:spcAft>
+                <a:spcPts val="0"/>
+              </a:spcAft>
+              <a:buClr>
+                <a:srgbClr val="3F3F3F"/>
+              </a:buClr>
+              <a:buSzPts val="1600"/>
+              <a:buFont typeface="Arial"/>
+              <a:buChar char="•"/>
+            </a:pPr>
+            <a:r>
+              <a:rPr lang="en-US" sz="1600" dirty="0">
+                <a:latin typeface="Arial"/>
+                <a:ea typeface="Arial"/>
+                <a:cs typeface="Arial"/>
+                <a:sym typeface="Arial"/>
+              </a:rPr>
+              <a:t>Given data availability for the year 2017 and 2018 only, and not for subsequent or preceding years, this trend analysis is limited to these 2 years rather than offering a longitudinal view.</a:t>
+            </a:r>
+          </a:p>
+          <a:p>
+            <a:pPr marL="342900" lvl="0" indent="-342900" algn="l" rtl="0">
+              <a:lnSpc>
+                <a:spcPct val="90000"/>
+              </a:lnSpc>
+              <a:spcBef>
+                <a:spcPts val="200"/>
+              </a:spcBef>
+              <a:spcAft>
+                <a:spcPts val="0"/>
+              </a:spcAft>
+              <a:buClr>
+                <a:srgbClr val="3F3F3F"/>
+              </a:buClr>
+              <a:buSzPts val="1600"/>
+              <a:buFont typeface="Arial"/>
+              <a:buChar char="•"/>
+            </a:pPr>
+            <a:endParaRPr lang="en-US" sz="1600" dirty="0">
+              <a:latin typeface="Arial"/>
+              <a:ea typeface="Arial"/>
+              <a:cs typeface="Arial"/>
+              <a:sym typeface="Arial"/>
+            </a:endParaRPr>
+          </a:p>
+          <a:p>
+            <a:pPr marL="342900" lvl="0" indent="-342900" algn="l" rtl="0">
+              <a:lnSpc>
+                <a:spcPct val="90000"/>
+              </a:lnSpc>
+              <a:spcBef>
+                <a:spcPts val="200"/>
+              </a:spcBef>
+              <a:spcAft>
+                <a:spcPts val="0"/>
+              </a:spcAft>
+              <a:buClr>
+                <a:srgbClr val="3F3F3F"/>
+              </a:buClr>
+              <a:buSzPts val="1600"/>
+              <a:buFont typeface="Arial"/>
+              <a:buChar char="•"/>
+            </a:pPr>
+            <a:r>
+              <a:rPr lang="en-US" sz="1600" dirty="0">
+                <a:latin typeface="Arial"/>
+                <a:ea typeface="Arial"/>
+                <a:cs typeface="Arial"/>
+                <a:sym typeface="Arial"/>
+              </a:rPr>
+              <a:t>With the aggregation of data by state, there are only 51 data points per dataset to work with, and more granular analyses on a county or school level cannot be performed.</a:t>
+            </a:r>
+          </a:p>
+          <a:p>
+            <a:pPr marL="342900" lvl="0" indent="-342900" algn="l" rtl="0">
+              <a:lnSpc>
+                <a:spcPct val="90000"/>
+              </a:lnSpc>
+              <a:spcBef>
+                <a:spcPts val="200"/>
+              </a:spcBef>
+              <a:spcAft>
+                <a:spcPts val="0"/>
+              </a:spcAft>
+              <a:buClr>
+                <a:srgbClr val="3F3F3F"/>
+              </a:buClr>
+              <a:buSzPts val="1600"/>
+              <a:buFont typeface="Arial"/>
+              <a:buChar char="•"/>
+            </a:pPr>
+            <a:endParaRPr lang="en-US" sz="1600" dirty="0">
+              <a:latin typeface="Arial"/>
+              <a:ea typeface="Arial"/>
+              <a:cs typeface="Arial"/>
+              <a:sym typeface="Arial"/>
+            </a:endParaRPr>
+          </a:p>
+          <a:p>
+            <a:pPr marL="342900" lvl="0" indent="-342900" algn="l" rtl="0">
+              <a:lnSpc>
+                <a:spcPct val="90000"/>
+              </a:lnSpc>
+              <a:spcBef>
+                <a:spcPts val="200"/>
+              </a:spcBef>
+              <a:spcAft>
+                <a:spcPts val="0"/>
+              </a:spcAft>
+              <a:buClr>
+                <a:srgbClr val="3F3F3F"/>
+              </a:buClr>
+              <a:buSzPts val="1600"/>
+              <a:buFont typeface="Arial"/>
+              <a:buChar char="•"/>
+            </a:pPr>
+            <a:r>
+              <a:rPr lang="en-US" sz="1600" dirty="0">
+                <a:latin typeface="Arial"/>
+                <a:ea typeface="Arial"/>
+                <a:cs typeface="Arial"/>
+                <a:sym typeface="Arial"/>
+              </a:rPr>
+              <a:t>Hence, the conclusions and recommendations made are subjected to these data limitations.</a:t>
+            </a:r>
+          </a:p>
+          <a:p>
+            <a:pPr marL="0" lvl="0" indent="0" algn="l" rtl="0">
+              <a:lnSpc>
+                <a:spcPct val="90000"/>
+              </a:lnSpc>
+              <a:spcBef>
+                <a:spcPts val="200"/>
+              </a:spcBef>
+              <a:spcAft>
+                <a:spcPts val="0"/>
+              </a:spcAft>
+              <a:buNone/>
+            </a:pPr>
+            <a:endParaRPr sz="1800" dirty="0">
+              <a:latin typeface="Arial"/>
+              <a:ea typeface="Arial"/>
+              <a:cs typeface="Arial"/>
+              <a:sym typeface="Arial"/>
+            </a:endParaRPr>
+          </a:p>
+          <a:p>
+            <a:pPr marL="342900" lvl="0" indent="-241300" algn="l" rtl="0">
+              <a:lnSpc>
+                <a:spcPct val="90000"/>
+              </a:lnSpc>
+              <a:spcBef>
+                <a:spcPts val="200"/>
+              </a:spcBef>
+              <a:spcAft>
+                <a:spcPts val="0"/>
+              </a:spcAft>
+              <a:buClr>
+                <a:srgbClr val="3F3F3F"/>
+              </a:buClr>
+              <a:buSzPts val="1600"/>
+              <a:buFont typeface="Arial"/>
+              <a:buNone/>
+            </a:pPr>
+            <a:endParaRPr sz="1600" dirty="0">
+              <a:latin typeface="Arial"/>
+              <a:ea typeface="Arial"/>
+              <a:cs typeface="Arial"/>
+              <a:sym typeface="Arial"/>
+            </a:endParaRPr>
+          </a:p>
+          <a:p>
+            <a:pPr marL="342900" lvl="0" indent="-241300" algn="l" rtl="0">
+              <a:lnSpc>
+                <a:spcPct val="90000"/>
+              </a:lnSpc>
+              <a:spcBef>
+                <a:spcPts val="200"/>
+              </a:spcBef>
+              <a:spcAft>
+                <a:spcPts val="0"/>
+              </a:spcAft>
+              <a:buClr>
+                <a:srgbClr val="3F3F3F"/>
+              </a:buClr>
+              <a:buSzPts val="1600"/>
+              <a:buFont typeface="Arial"/>
+              <a:buNone/>
+            </a:pPr>
+            <a:endParaRPr sz="1600" dirty="0">
+              <a:latin typeface="Arial"/>
+              <a:ea typeface="Arial"/>
+              <a:cs typeface="Arial"/>
+              <a:sym typeface="Arial"/>
+            </a:endParaRPr>
+          </a:p>
+          <a:p>
+            <a:pPr marL="0" lvl="0" indent="0" algn="l" rtl="0">
+              <a:lnSpc>
+                <a:spcPct val="110000"/>
+              </a:lnSpc>
+              <a:spcBef>
+                <a:spcPts val="1400"/>
+              </a:spcBef>
+              <a:spcAft>
+                <a:spcPts val="0"/>
+              </a:spcAft>
+              <a:buClr>
+                <a:srgbClr val="3F3F3F"/>
+              </a:buClr>
+              <a:buSzPts val="1800"/>
+              <a:buNone/>
+            </a:pPr>
+            <a:endParaRPr sz="1800" dirty="0">
+              <a:latin typeface="Arial"/>
+              <a:ea typeface="Arial"/>
+              <a:cs typeface="Arial"/>
+              <a:sym typeface="Arial"/>
+            </a:endParaRPr>
+          </a:p>
+          <a:p>
+            <a:pPr marL="0" lvl="0" indent="0" algn="l" rtl="0">
+              <a:lnSpc>
+                <a:spcPct val="110000"/>
+              </a:lnSpc>
+              <a:spcBef>
+                <a:spcPts val="1400"/>
+              </a:spcBef>
+              <a:spcAft>
+                <a:spcPts val="0"/>
+              </a:spcAft>
+              <a:buClr>
+                <a:srgbClr val="3F3F3F"/>
+              </a:buClr>
+              <a:buSzPts val="1800"/>
+              <a:buNone/>
+            </a:pPr>
+            <a:endParaRPr sz="1800" dirty="0">
+              <a:latin typeface="Arial"/>
+              <a:ea typeface="Arial"/>
+              <a:cs typeface="Arial"/>
+              <a:sym typeface="Arial"/>
+            </a:endParaRPr>
+          </a:p>
+          <a:p>
+            <a:pPr marL="0" lvl="0" indent="0" algn="l" rtl="0">
+              <a:lnSpc>
+                <a:spcPct val="110000"/>
+              </a:lnSpc>
+              <a:spcBef>
+                <a:spcPts val="1400"/>
+              </a:spcBef>
+              <a:spcAft>
+                <a:spcPts val="0"/>
+              </a:spcAft>
+              <a:buSzPts val="1800"/>
+              <a:buNone/>
+            </a:pPr>
+            <a:endParaRPr sz="1800" dirty="0">
+              <a:latin typeface="Arial"/>
+              <a:ea typeface="Arial"/>
+              <a:cs typeface="Arial"/>
+              <a:sym typeface="Arial"/>
+            </a:endParaRPr>
+          </a:p>
+        </p:txBody>
+      </p:sp>
+    </p:spTree>
+    <p:extLst>
+      <p:ext uri="{BB962C8B-B14F-4D97-AF65-F5344CB8AC3E}">
+        <p14:creationId xmlns:p14="http://schemas.microsoft.com/office/powerpoint/2010/main" val="3308334321"/>
+      </p:ext>
+    </p:extLst>
+  </p:cSld>
+  <p:clrMapOvr>
+    <a:masterClrMapping/>
+  </p:clrMapOvr>
+</p:sld>
+</file>
+
+<file path=ppt/slides/slide9.xml><?xml version="1.0" encoding="utf-8"?>
+<p:sld xmlns:a="http://schemas.openxmlformats.org/drawingml/2006/main" xmlns:r="http://schemas.openxmlformats.org/officeDocument/2006/relationships" xmlns:p="http://schemas.openxmlformats.org/presentationml/2006/main">
+  <p:cSld>
+    <p:spTree>
+      <p:nvGrpSpPr>
         <p:cNvPr id="1" name=""/>
         <p:cNvGrpSpPr/>
         <p:nvPr/>
@@ -19162,150 +20122,6 @@
         <p14:creationId xmlns:p14="http://schemas.microsoft.com/office/powerpoint/2010/main" val="3079847477"/>
       </p:ext>
     </p:extLst>
-  </p:cSld>
-  <p:clrMapOvr>
-    <a:masterClrMapping/>
-  </p:clrMapOvr>
-</p:sld>
-</file>
-
-<file path=ppt/slides/slide9.xml><?xml version="1.0" encoding="utf-8"?>
-<p:sld xmlns:a="http://schemas.openxmlformats.org/drawingml/2006/main" xmlns:r="http://schemas.openxmlformats.org/officeDocument/2006/relationships" xmlns:p="http://schemas.openxmlformats.org/presentationml/2006/main">
-  <p:cSld>
-    <p:spTree>
-      <p:nvGrpSpPr>
-        <p:cNvPr id="1" name="Shape 121"/>
-        <p:cNvGrpSpPr/>
-        <p:nvPr/>
-      </p:nvGrpSpPr>
-      <p:grpSpPr>
-        <a:xfrm>
-          <a:off x="0" y="0"/>
-          <a:ext cx="0" cy="0"/>
-          <a:chOff x="0" y="0"/>
-          <a:chExt cx="0" cy="0"/>
-        </a:xfrm>
-      </p:grpSpPr>
-      <p:sp>
-        <p:nvSpPr>
-          <p:cNvPr id="122" name="Google Shape;122;p17"/>
-          <p:cNvSpPr txBox="1">
-            <a:spLocks noGrp="1"/>
-          </p:cNvSpPr>
-          <p:nvPr>
-            <p:ph type="title"/>
-          </p:nvPr>
-        </p:nvSpPr>
-        <p:spPr>
-          <a:xfrm>
-            <a:off x="1097280" y="286603"/>
-            <a:ext cx="10278476" cy="1450757"/>
-          </a:xfrm>
-          <a:prstGeom prst="rect">
-            <a:avLst/>
-          </a:prstGeom>
-          <a:noFill/>
-          <a:ln>
-            <a:noFill/>
-          </a:ln>
-        </p:spPr>
-        <p:txBody>
-          <a:bodyPr spcFirstLastPara="1" wrap="square" lIns="91425" tIns="45700" rIns="91425" bIns="45700" anchor="b" anchorCtr="0">
-            <a:noAutofit/>
-          </a:bodyPr>
-          <a:lstStyle/>
-          <a:p>
-            <a:pPr marL="0" lvl="0" indent="0" algn="l" rtl="0">
-              <a:lnSpc>
-                <a:spcPct val="90000"/>
-              </a:lnSpc>
-              <a:spcBef>
-                <a:spcPts val="0"/>
-              </a:spcBef>
-              <a:spcAft>
-                <a:spcPts val="0"/>
-              </a:spcAft>
-              <a:buClr>
-                <a:srgbClr val="3F3F3F"/>
-              </a:buClr>
-              <a:buSzPts val="2400"/>
-              <a:buFont typeface="Bookman Old Style"/>
-              <a:buNone/>
-            </a:pPr>
-            <a:r>
-              <a:rPr lang="en-SG" sz="2400"/>
-              <a:t>In both 2017 and 2018, the </a:t>
-            </a:r>
-            <a:r>
-              <a:rPr lang="en-SG" sz="2400">
-                <a:solidFill>
-                  <a:srgbClr val="C00000"/>
-                </a:solidFill>
-              </a:rPr>
-              <a:t>ACT had a higher median participation rate </a:t>
-            </a:r>
-            <a:r>
-              <a:rPr lang="en-SG" sz="2400"/>
-              <a:t>than the SAT. </a:t>
-            </a:r>
-            <a:endParaRPr/>
-          </a:p>
-        </p:txBody>
-      </p:sp>
-      <p:pic>
-        <p:nvPicPr>
-          <p:cNvPr id="123" name="Google Shape;123;p17"/>
-          <p:cNvPicPr preferRelativeResize="0"/>
-          <p:nvPr/>
-        </p:nvPicPr>
-        <p:blipFill rotWithShape="1">
-          <a:blip r:embed="rId3">
-            <a:alphaModFix/>
-          </a:blip>
-          <a:srcRect/>
-          <a:stretch/>
-        </p:blipFill>
-        <p:spPr>
-          <a:xfrm>
-            <a:off x="2665062" y="2106237"/>
-            <a:ext cx="6551193" cy="4116333"/>
-          </a:xfrm>
-          <a:prstGeom prst="rect">
-            <a:avLst/>
-          </a:prstGeom>
-          <a:noFill/>
-          <a:ln>
-            <a:noFill/>
-          </a:ln>
-        </p:spPr>
-      </p:pic>
-      <p:cxnSp>
-        <p:nvCxnSpPr>
-          <p:cNvPr id="124" name="Google Shape;124;p17"/>
-          <p:cNvCxnSpPr/>
-          <p:nvPr/>
-        </p:nvCxnSpPr>
-        <p:spPr>
-          <a:xfrm>
-            <a:off x="6087664" y="2496710"/>
-            <a:ext cx="0" cy="3348000"/>
-          </a:xfrm>
-          <a:prstGeom prst="straightConnector1">
-            <a:avLst/>
-          </a:prstGeom>
-          <a:noFill/>
-          <a:ln w="12700" cap="flat" cmpd="sng">
-            <a:solidFill>
-              <a:srgbClr val="A5A5A5"/>
-            </a:solidFill>
-            <a:prstDash val="dash"/>
-            <a:round/>
-            <a:headEnd type="none" w="sm" len="sm"/>
-            <a:tailEnd type="none" w="sm" len="sm"/>
-          </a:ln>
-        </p:spPr>
-      </p:cxnSp>
-    </p:spTree>
   </p:cSld>
   <p:clrMapOvr>
     <a:masterClrMapping/>

</xml_diff>